<commit_message>
More Methods lecture updated
</commit_message>
<xml_diff>
--- a/slides/On-Campus/06_02_MoreMethods_Fall2023.pptx
+++ b/slides/On-Campus/06_02_MoreMethods_Fall2023.pptx
@@ -152,31 +152,31 @@
 <pc:chgInfo xmlns:a="http://schemas.openxmlformats.org/drawingml/2006/main" xmlns:r="http://schemas.openxmlformats.org/officeDocument/2006/relationships" xmlns:ac="http://schemas.microsoft.com/office/drawing/2013/main/command" xmlns:pc="http://schemas.microsoft.com/office/powerpoint/2013/main/command">
   <pc:docChgLst>
     <pc:chgData name="Marcia Moraes" userId="c9c67e8a-58e2-4733-9a1c-5d44fec4775b" providerId="ADAL" clId="{0251B3BA-5450-4D15-BEE8-7017FEF9B9ED}"/>
-    <pc:docChg chg="delSld">
-      <pc:chgData name="Marcia Moraes" userId="c9c67e8a-58e2-4733-9a1c-5d44fec4775b" providerId="ADAL" clId="{0251B3BA-5450-4D15-BEE8-7017FEF9B9ED}" dt="2023-09-20T19:36:01.078" v="2" actId="2696"/>
+  </pc:docChgLst>
+  <pc:docChgLst>
+    <pc:chgData name="Marcia Moraes" userId="c9c67e8a-58e2-4733-9a1c-5d44fec4775b" providerId="ADAL" clId="{4AB33155-72F7-49EC-B6C3-13C94D56D0EA}"/>
+  </pc:docChgLst>
+  <pc:docChgLst>
+    <pc:chgData name="Marcia Moraes" userId="c9c67e8a-58e2-4733-9a1c-5d44fec4775b" providerId="ADAL" clId="{C10AEB5B-710E-47CE-BE22-893E8530431B}"/>
+    <pc:docChg chg="modSld">
+      <pc:chgData name="Marcia Moraes" userId="c9c67e8a-58e2-4733-9a1c-5d44fec4775b" providerId="ADAL" clId="{C10AEB5B-710E-47CE-BE22-893E8530431B}" dt="2024-02-16T17:32:08.988" v="4" actId="20577"/>
       <pc:docMkLst>
         <pc:docMk/>
       </pc:docMkLst>
-      <pc:sldChg chg="del">
-        <pc:chgData name="Marcia Moraes" userId="c9c67e8a-58e2-4733-9a1c-5d44fec4775b" providerId="ADAL" clId="{0251B3BA-5450-4D15-BEE8-7017FEF9B9ED}" dt="2023-09-20T19:35:54.945" v="0" actId="2696"/>
+      <pc:sldChg chg="modSp">
+        <pc:chgData name="Marcia Moraes" userId="c9c67e8a-58e2-4733-9a1c-5d44fec4775b" providerId="ADAL" clId="{C10AEB5B-710E-47CE-BE22-893E8530431B}" dt="2024-02-16T17:32:08.988" v="4" actId="20577"/>
         <pc:sldMkLst>
           <pc:docMk/>
-          <pc:sldMk cId="2777855015" sldId="260"/>
+          <pc:sldMk cId="2019265180" sldId="270"/>
         </pc:sldMkLst>
-      </pc:sldChg>
-      <pc:sldChg chg="del">
-        <pc:chgData name="Marcia Moraes" userId="c9c67e8a-58e2-4733-9a1c-5d44fec4775b" providerId="ADAL" clId="{0251B3BA-5450-4D15-BEE8-7017FEF9B9ED}" dt="2023-09-20T19:36:00.157" v="1" actId="2696"/>
-        <pc:sldMkLst>
-          <pc:docMk/>
-          <pc:sldMk cId="4197111675" sldId="261"/>
-        </pc:sldMkLst>
-      </pc:sldChg>
-      <pc:sldChg chg="del">
-        <pc:chgData name="Marcia Moraes" userId="c9c67e8a-58e2-4733-9a1c-5d44fec4775b" providerId="ADAL" clId="{0251B3BA-5450-4D15-BEE8-7017FEF9B9ED}" dt="2023-09-20T19:36:01.078" v="2" actId="2696"/>
-        <pc:sldMkLst>
-          <pc:docMk/>
-          <pc:sldMk cId="157662999" sldId="262"/>
-        </pc:sldMkLst>
+        <pc:graphicFrameChg chg="modGraphic">
+          <ac:chgData name="Marcia Moraes" userId="c9c67e8a-58e2-4733-9a1c-5d44fec4775b" providerId="ADAL" clId="{C10AEB5B-710E-47CE-BE22-893E8530431B}" dt="2024-02-16T17:32:08.988" v="4" actId="20577"/>
+          <ac:graphicFrameMkLst>
+            <pc:docMk/>
+            <pc:sldMk cId="2019265180" sldId="270"/>
+            <ac:graphicFrameMk id="6" creationId="{EDFDECD2-5FE8-4786-81E5-DD1620705A1D}"/>
+          </ac:graphicFrameMkLst>
+        </pc:graphicFrameChg>
       </pc:sldChg>
     </pc:docChg>
   </pc:docChgLst>
@@ -265,7 +265,7 @@
           <a:p>
             <a:fld id="{4D7E51A5-B478-1E40-8CBB-0DAA8831E99D}" type="datetimeFigureOut">
               <a:rPr lang="en-US" smtClean="0"/>
-              <a:t>9/20/2023</a:t>
+              <a:t>2/16/2024</a:t>
             </a:fld>
             <a:endParaRPr lang="en-US"/>
           </a:p>
@@ -763,7 +763,7 @@
           <a:p>
             <a:fld id="{D0ED587F-861E-6740-9643-E3DDAE89B8D6}" type="datetimeFigureOut">
               <a:rPr lang="en-US" smtClean="0"/>
-              <a:t>9/20/2023</a:t>
+              <a:t>2/16/2024</a:t>
             </a:fld>
             <a:endParaRPr lang="en-US"/>
           </a:p>
@@ -7609,7 +7609,7 @@
           <a:p>
             <a:r>
               <a:rPr lang="en-US" dirty="0"/>
-              <a:t>Method Overloading, Asserts, and Objects as Parameters of Methods</a:t>
+              <a:t>Method Overloading and Objects as Parameters of Methods</a:t>
             </a:r>
           </a:p>
         </p:txBody>
@@ -9018,20 +9018,7 @@
                 <a:effectLst/>
                 <a:latin typeface="JetBrains Mono"/>
               </a:rPr>
-              <a:t>// the "L" at the end is how we tell java it </a:t>
-            </a:r>
-            <a:r>
-              <a:rPr kumimoji="0" lang="en-US" altLang="en-US" sz="1800" b="0" i="1" u="none" strike="noStrike" cap="none" normalizeH="0" baseline="0">
-                <a:ln>
-                  <a:noFill/>
-                </a:ln>
-                <a:solidFill>
-                  <a:srgbClr val="8C8C8C"/>
-                </a:solidFill>
-                <a:effectLst/>
-                <a:latin typeface="JetBrains Mono"/>
-              </a:rPr>
-              <a:t>is a long number</a:t>
+              <a:t>// the "L" at the end is how we tell java it is a long number</a:t>
             </a:r>
             <a:br>
               <a:rPr kumimoji="0" lang="en-US" altLang="en-US" sz="1800" b="0" i="1" u="none" strike="noStrike" cap="none" normalizeH="0" baseline="0" dirty="0">
@@ -10422,7 +10409,7 @@
         </p:nvSpPr>
         <p:spPr>
           <a:xfrm>
-            <a:off x="628075" y="601948"/>
+            <a:off x="384794" y="25651"/>
             <a:ext cx="12561453" cy="861774"/>
           </a:xfrm>
         </p:spPr>
@@ -10550,8 +10537,8 @@
         </p:nvSpPr>
         <p:spPr bwMode="auto">
           <a:xfrm>
-            <a:off x="10174515" y="716101"/>
-            <a:ext cx="3352800" cy="6340197"/>
+            <a:off x="10174515" y="30852"/>
+            <a:ext cx="3352800" cy="7478970"/>
           </a:xfrm>
           <a:prstGeom prst="rect">
             <a:avLst/>
@@ -10590,7 +10577,7 @@
               <a:tabLst/>
             </a:pPr>
             <a:r>
-              <a:rPr kumimoji="0" lang="en-US" altLang="en-US" sz="1400" b="1" i="0" u="none" strike="noStrike" cap="none" normalizeH="0" baseline="0" dirty="0">
+              <a:rPr kumimoji="0" lang="en-US" altLang="en-US" sz="1600" b="1" i="0" u="none" strike="noStrike" cap="none" normalizeH="0" baseline="0" dirty="0">
                 <a:ln>
                   <a:noFill/>
                 </a:ln>
@@ -10603,7 +10590,7 @@
               <a:t>public class </a:t>
             </a:r>
             <a:r>
-              <a:rPr kumimoji="0" lang="en-US" altLang="en-US" sz="1400" b="0" i="0" u="none" strike="noStrike" cap="none" normalizeH="0" baseline="0" dirty="0">
+              <a:rPr kumimoji="0" lang="en-US" altLang="en-US" sz="1600" b="0" i="0" u="none" strike="noStrike" cap="none" normalizeH="0" baseline="0" dirty="0">
                 <a:ln>
                   <a:noFill/>
                 </a:ln>
@@ -10616,7 +10603,7 @@
               <a:t>Rectangle {</a:t>
             </a:r>
             <a:br>
-              <a:rPr kumimoji="0" lang="en-US" altLang="en-US" sz="1400" b="0" i="0" u="none" strike="noStrike" cap="none" normalizeH="0" baseline="0" dirty="0">
+              <a:rPr kumimoji="0" lang="en-US" altLang="en-US" sz="1600" b="0" i="0" u="none" strike="noStrike" cap="none" normalizeH="0" baseline="0" dirty="0">
                 <a:ln>
                   <a:noFill/>
                 </a:ln>
@@ -10628,7 +10615,7 @@
               </a:rPr>
             </a:br>
             <a:r>
-              <a:rPr kumimoji="0" lang="en-US" altLang="en-US" sz="1400" b="0" i="0" u="none" strike="noStrike" cap="none" normalizeH="0" baseline="0" dirty="0">
+              <a:rPr kumimoji="0" lang="en-US" altLang="en-US" sz="1600" b="0" i="0" u="none" strike="noStrike" cap="none" normalizeH="0" baseline="0" dirty="0">
                 <a:ln>
                   <a:noFill/>
                 </a:ln>
@@ -10641,7 +10628,7 @@
               <a:t>    </a:t>
             </a:r>
             <a:r>
-              <a:rPr kumimoji="0" lang="en-US" altLang="en-US" sz="1400" b="1" i="0" u="none" strike="noStrike" cap="none" normalizeH="0" baseline="0" dirty="0">
+              <a:rPr kumimoji="0" lang="en-US" altLang="en-US" sz="1600" b="1" i="0" u="none" strike="noStrike" cap="none" normalizeH="0" baseline="0" dirty="0">
                 <a:ln>
                   <a:noFill/>
                 </a:ln>
@@ -10654,7 +10641,7 @@
               <a:t>private int </a:t>
             </a:r>
             <a:r>
-              <a:rPr kumimoji="0" lang="en-US" altLang="en-US" sz="1400" b="1" i="0" u="none" strike="noStrike" cap="none" normalizeH="0" baseline="0" dirty="0">
+              <a:rPr kumimoji="0" lang="en-US" altLang="en-US" sz="1600" b="1" i="0" u="none" strike="noStrike" cap="none" normalizeH="0" baseline="0" dirty="0">
                 <a:ln>
                   <a:noFill/>
                 </a:ln>
@@ -10667,7 +10654,7 @@
               <a:t>length </a:t>
             </a:r>
             <a:r>
-              <a:rPr kumimoji="0" lang="en-US" altLang="en-US" sz="1400" b="0" i="0" u="none" strike="noStrike" cap="none" normalizeH="0" baseline="0" dirty="0">
+              <a:rPr kumimoji="0" lang="en-US" altLang="en-US" sz="1600" b="0" i="0" u="none" strike="noStrike" cap="none" normalizeH="0" baseline="0" dirty="0">
                 <a:ln>
                   <a:noFill/>
                 </a:ln>
@@ -10680,7 +10667,7 @@
               <a:t>= </a:t>
             </a:r>
             <a:r>
-              <a:rPr kumimoji="0" lang="en-US" altLang="en-US" sz="1400" b="0" i="0" u="none" strike="noStrike" cap="none" normalizeH="0" baseline="0" dirty="0">
+              <a:rPr kumimoji="0" lang="en-US" altLang="en-US" sz="1600" b="0" i="0" u="none" strike="noStrike" cap="none" normalizeH="0" baseline="0" dirty="0">
                 <a:ln>
                   <a:noFill/>
                 </a:ln>
@@ -10693,7 +10680,7 @@
               <a:t>0</a:t>
             </a:r>
             <a:r>
-              <a:rPr kumimoji="0" lang="en-US" altLang="en-US" sz="1400" b="0" i="0" u="none" strike="noStrike" cap="none" normalizeH="0" baseline="0" dirty="0">
+              <a:rPr kumimoji="0" lang="en-US" altLang="en-US" sz="1600" b="0" i="0" u="none" strike="noStrike" cap="none" normalizeH="0" baseline="0" dirty="0">
                 <a:ln>
                   <a:noFill/>
                 </a:ln>
@@ -10706,7 +10693,7 @@
               <a:t>;</a:t>
             </a:r>
             <a:br>
-              <a:rPr kumimoji="0" lang="en-US" altLang="en-US" sz="1400" b="0" i="0" u="none" strike="noStrike" cap="none" normalizeH="0" baseline="0" dirty="0">
+              <a:rPr kumimoji="0" lang="en-US" altLang="en-US" sz="1600" b="0" i="0" u="none" strike="noStrike" cap="none" normalizeH="0" baseline="0" dirty="0">
                 <a:ln>
                   <a:noFill/>
                 </a:ln>
@@ -10718,7 +10705,7 @@
               </a:rPr>
             </a:br>
             <a:r>
-              <a:rPr kumimoji="0" lang="en-US" altLang="en-US" sz="1400" b="0" i="0" u="none" strike="noStrike" cap="none" normalizeH="0" baseline="0" dirty="0">
+              <a:rPr kumimoji="0" lang="en-US" altLang="en-US" sz="1600" b="0" i="0" u="none" strike="noStrike" cap="none" normalizeH="0" baseline="0" dirty="0">
                 <a:ln>
                   <a:noFill/>
                 </a:ln>
@@ -10731,7 +10718,7 @@
               <a:t>    </a:t>
             </a:r>
             <a:r>
-              <a:rPr kumimoji="0" lang="en-US" altLang="en-US" sz="1400" b="1" i="0" u="none" strike="noStrike" cap="none" normalizeH="0" baseline="0" dirty="0">
+              <a:rPr kumimoji="0" lang="en-US" altLang="en-US" sz="1600" b="1" i="0" u="none" strike="noStrike" cap="none" normalizeH="0" baseline="0" dirty="0">
                 <a:ln>
                   <a:noFill/>
                 </a:ln>
@@ -10744,7 +10731,7 @@
               <a:t>private int </a:t>
             </a:r>
             <a:r>
-              <a:rPr kumimoji="0" lang="en-US" altLang="en-US" sz="1400" b="1" i="0" u="none" strike="noStrike" cap="none" normalizeH="0" baseline="0" dirty="0">
+              <a:rPr kumimoji="0" lang="en-US" altLang="en-US" sz="1600" b="1" i="0" u="none" strike="noStrike" cap="none" normalizeH="0" baseline="0" dirty="0">
                 <a:ln>
                   <a:noFill/>
                 </a:ln>
@@ -10757,7 +10744,7 @@
               <a:t>width </a:t>
             </a:r>
             <a:r>
-              <a:rPr kumimoji="0" lang="en-US" altLang="en-US" sz="1400" b="0" i="0" u="none" strike="noStrike" cap="none" normalizeH="0" baseline="0" dirty="0">
+              <a:rPr kumimoji="0" lang="en-US" altLang="en-US" sz="1600" b="0" i="0" u="none" strike="noStrike" cap="none" normalizeH="0" baseline="0" dirty="0">
                 <a:ln>
                   <a:noFill/>
                 </a:ln>
@@ -10770,7 +10757,7 @@
               <a:t>= </a:t>
             </a:r>
             <a:r>
-              <a:rPr kumimoji="0" lang="en-US" altLang="en-US" sz="1400" b="0" i="0" u="none" strike="noStrike" cap="none" normalizeH="0" baseline="0" dirty="0">
+              <a:rPr kumimoji="0" lang="en-US" altLang="en-US" sz="1600" b="0" i="0" u="none" strike="noStrike" cap="none" normalizeH="0" baseline="0" dirty="0">
                 <a:ln>
                   <a:noFill/>
                 </a:ln>
@@ -10783,7 +10770,7 @@
               <a:t>0</a:t>
             </a:r>
             <a:r>
-              <a:rPr kumimoji="0" lang="en-US" altLang="en-US" sz="1400" b="0" i="0" u="none" strike="noStrike" cap="none" normalizeH="0" baseline="0" dirty="0">
+              <a:rPr kumimoji="0" lang="en-US" altLang="en-US" sz="1600" b="0" i="0" u="none" strike="noStrike" cap="none" normalizeH="0" baseline="0" dirty="0">
                 <a:ln>
                   <a:noFill/>
                 </a:ln>
@@ -10796,7 +10783,7 @@
               <a:t>;</a:t>
             </a:r>
             <a:br>
-              <a:rPr kumimoji="0" lang="en-US" altLang="en-US" sz="1400" b="0" i="0" u="none" strike="noStrike" cap="none" normalizeH="0" baseline="0" dirty="0">
+              <a:rPr kumimoji="0" lang="en-US" altLang="en-US" sz="1600" b="0" i="0" u="none" strike="noStrike" cap="none" normalizeH="0" baseline="0" dirty="0">
                 <a:ln>
                   <a:noFill/>
                 </a:ln>
@@ -10808,7 +10795,7 @@
               </a:rPr>
             </a:br>
             <a:r>
-              <a:rPr kumimoji="0" lang="en-US" altLang="en-US" sz="1400" b="0" i="0" u="none" strike="noStrike" cap="none" normalizeH="0" baseline="0" dirty="0">
+              <a:rPr kumimoji="0" lang="en-US" altLang="en-US" sz="1600" b="0" i="0" u="none" strike="noStrike" cap="none" normalizeH="0" baseline="0" dirty="0">
                 <a:ln>
                   <a:noFill/>
                 </a:ln>
@@ -10821,7 +10808,7 @@
               <a:t>    </a:t>
             </a:r>
             <a:br>
-              <a:rPr kumimoji="0" lang="en-US" altLang="en-US" sz="1400" b="0" i="0" u="none" strike="noStrike" cap="none" normalizeH="0" baseline="0" dirty="0">
+              <a:rPr kumimoji="0" lang="en-US" altLang="en-US" sz="1600" b="0" i="0" u="none" strike="noStrike" cap="none" normalizeH="0" baseline="0" dirty="0">
                 <a:ln>
                   <a:noFill/>
                 </a:ln>
@@ -10833,7 +10820,7 @@
               </a:rPr>
             </a:br>
             <a:r>
-              <a:rPr kumimoji="0" lang="en-US" altLang="en-US" sz="1400" b="0" i="0" u="none" strike="noStrike" cap="none" normalizeH="0" baseline="0" dirty="0">
+              <a:rPr kumimoji="0" lang="en-US" altLang="en-US" sz="1600" b="0" i="0" u="none" strike="noStrike" cap="none" normalizeH="0" baseline="0" dirty="0">
                 <a:ln>
                   <a:noFill/>
                 </a:ln>
@@ -10846,7 +10833,7 @@
               <a:t>    </a:t>
             </a:r>
             <a:r>
-              <a:rPr kumimoji="0" lang="en-US" altLang="en-US" sz="1400" b="1" i="0" u="none" strike="noStrike" cap="none" normalizeH="0" baseline="0" dirty="0">
+              <a:rPr kumimoji="0" lang="en-US" altLang="en-US" sz="1600" b="1" i="0" u="none" strike="noStrike" cap="none" normalizeH="0" baseline="0" dirty="0">
                 <a:ln>
                   <a:noFill/>
                 </a:ln>
@@ -10859,7 +10846,7 @@
               <a:t>public </a:t>
             </a:r>
             <a:r>
-              <a:rPr kumimoji="0" lang="en-US" altLang="en-US" sz="1400" b="0" i="0" u="none" strike="noStrike" cap="none" normalizeH="0" baseline="0" dirty="0">
+              <a:rPr kumimoji="0" lang="en-US" altLang="en-US" sz="1600" b="0" i="0" u="none" strike="noStrike" cap="none" normalizeH="0" baseline="0" dirty="0">
                 <a:ln>
                   <a:noFill/>
                 </a:ln>
@@ -10872,7 +10859,7 @@
               <a:t>Rectangle(</a:t>
             </a:r>
             <a:r>
-              <a:rPr kumimoji="0" lang="en-US" altLang="en-US" sz="1400" b="1" i="0" u="none" strike="noStrike" cap="none" normalizeH="0" baseline="0" dirty="0">
+              <a:rPr kumimoji="0" lang="en-US" altLang="en-US" sz="1600" b="1" i="0" u="none" strike="noStrike" cap="none" normalizeH="0" baseline="0" dirty="0">
                 <a:ln>
                   <a:noFill/>
                 </a:ln>
@@ -10885,7 +10872,7 @@
               <a:t>int </a:t>
             </a:r>
             <a:r>
-              <a:rPr kumimoji="0" lang="en-US" altLang="en-US" sz="1400" b="0" i="0" u="none" strike="noStrike" cap="none" normalizeH="0" baseline="0" dirty="0">
+              <a:rPr kumimoji="0" lang="en-US" altLang="en-US" sz="1600" b="0" i="0" u="none" strike="noStrike" cap="none" normalizeH="0" baseline="0" dirty="0">
                 <a:ln>
                   <a:noFill/>
                 </a:ln>
@@ -10898,7 +10885,7 @@
               <a:t>width, </a:t>
             </a:r>
             <a:r>
-              <a:rPr kumimoji="0" lang="en-US" altLang="en-US" sz="1400" b="1" i="0" u="none" strike="noStrike" cap="none" normalizeH="0" baseline="0" dirty="0">
+              <a:rPr kumimoji="0" lang="en-US" altLang="en-US" sz="1600" b="1" i="0" u="none" strike="noStrike" cap="none" normalizeH="0" baseline="0" dirty="0">
                 <a:ln>
                   <a:noFill/>
                 </a:ln>
@@ -10911,7 +10898,7 @@
               <a:t>int </a:t>
             </a:r>
             <a:r>
-              <a:rPr kumimoji="0" lang="en-US" altLang="en-US" sz="1400" b="0" i="0" u="none" strike="noStrike" cap="none" normalizeH="0" baseline="0" dirty="0">
+              <a:rPr kumimoji="0" lang="en-US" altLang="en-US" sz="1600" b="0" i="0" u="none" strike="noStrike" cap="none" normalizeH="0" baseline="0" dirty="0">
                 <a:ln>
                   <a:noFill/>
                 </a:ln>
@@ -10924,7 +10911,7 @@
               <a:t>length) {</a:t>
             </a:r>
             <a:br>
-              <a:rPr kumimoji="0" lang="en-US" altLang="en-US" sz="1400" b="0" i="0" u="none" strike="noStrike" cap="none" normalizeH="0" baseline="0" dirty="0">
+              <a:rPr kumimoji="0" lang="en-US" altLang="en-US" sz="1600" b="0" i="0" u="none" strike="noStrike" cap="none" normalizeH="0" baseline="0" dirty="0">
                 <a:ln>
                   <a:noFill/>
                 </a:ln>
@@ -10936,7 +10923,7 @@
               </a:rPr>
             </a:br>
             <a:r>
-              <a:rPr kumimoji="0" lang="en-US" altLang="en-US" sz="1400" b="0" i="0" u="none" strike="noStrike" cap="none" normalizeH="0" baseline="0" dirty="0">
+              <a:rPr kumimoji="0" lang="en-US" altLang="en-US" sz="1600" b="0" i="0" u="none" strike="noStrike" cap="none" normalizeH="0" baseline="0" dirty="0">
                 <a:ln>
                   <a:noFill/>
                 </a:ln>
@@ -10949,7 +10936,7 @@
               <a:t>        </a:t>
             </a:r>
             <a:r>
-              <a:rPr kumimoji="0" lang="en-US" altLang="en-US" sz="1400" b="0" i="0" u="none" strike="noStrike" cap="none" normalizeH="0" baseline="0" dirty="0" err="1">
+              <a:rPr kumimoji="0" lang="en-US" altLang="en-US" sz="1600" b="0" i="0" u="none" strike="noStrike" cap="none" normalizeH="0" baseline="0" dirty="0" err="1">
                 <a:ln>
                   <a:noFill/>
                 </a:ln>
@@ -10962,7 +10949,7 @@
               <a:t>setWidth</a:t>
             </a:r>
             <a:r>
-              <a:rPr kumimoji="0" lang="en-US" altLang="en-US" sz="1400" b="0" i="0" u="none" strike="noStrike" cap="none" normalizeH="0" baseline="0" dirty="0">
+              <a:rPr kumimoji="0" lang="en-US" altLang="en-US" sz="1600" b="0" i="0" u="none" strike="noStrike" cap="none" normalizeH="0" baseline="0" dirty="0">
                 <a:ln>
                   <a:noFill/>
                 </a:ln>
@@ -10975,7 +10962,7 @@
               <a:t>(width);</a:t>
             </a:r>
             <a:br>
-              <a:rPr kumimoji="0" lang="en-US" altLang="en-US" sz="1400" b="0" i="0" u="none" strike="noStrike" cap="none" normalizeH="0" baseline="0" dirty="0">
+              <a:rPr kumimoji="0" lang="en-US" altLang="en-US" sz="1600" b="0" i="0" u="none" strike="noStrike" cap="none" normalizeH="0" baseline="0" dirty="0">
                 <a:ln>
                   <a:noFill/>
                 </a:ln>
@@ -10987,7 +10974,7 @@
               </a:rPr>
             </a:br>
             <a:r>
-              <a:rPr kumimoji="0" lang="en-US" altLang="en-US" sz="1400" b="0" i="0" u="none" strike="noStrike" cap="none" normalizeH="0" baseline="0" dirty="0">
+              <a:rPr kumimoji="0" lang="en-US" altLang="en-US" sz="1600" b="0" i="0" u="none" strike="noStrike" cap="none" normalizeH="0" baseline="0" dirty="0">
                 <a:ln>
                   <a:noFill/>
                 </a:ln>
@@ -11000,7 +10987,7 @@
               <a:t>        </a:t>
             </a:r>
             <a:r>
-              <a:rPr kumimoji="0" lang="en-US" altLang="en-US" sz="1400" b="0" i="0" u="none" strike="noStrike" cap="none" normalizeH="0" baseline="0" dirty="0" err="1">
+              <a:rPr kumimoji="0" lang="en-US" altLang="en-US" sz="1600" b="0" i="0" u="none" strike="noStrike" cap="none" normalizeH="0" baseline="0" dirty="0" err="1">
                 <a:ln>
                   <a:noFill/>
                 </a:ln>
@@ -11013,7 +11000,7 @@
               <a:t>setLength</a:t>
             </a:r>
             <a:r>
-              <a:rPr kumimoji="0" lang="en-US" altLang="en-US" sz="1400" b="0" i="0" u="none" strike="noStrike" cap="none" normalizeH="0" baseline="0" dirty="0">
+              <a:rPr kumimoji="0" lang="en-US" altLang="en-US" sz="1600" b="0" i="0" u="none" strike="noStrike" cap="none" normalizeH="0" baseline="0" dirty="0">
                 <a:ln>
                   <a:noFill/>
                 </a:ln>
@@ -11026,7 +11013,7 @@
               <a:t>(length);</a:t>
             </a:r>
             <a:br>
-              <a:rPr kumimoji="0" lang="en-US" altLang="en-US" sz="1400" b="0" i="0" u="none" strike="noStrike" cap="none" normalizeH="0" baseline="0" dirty="0">
+              <a:rPr kumimoji="0" lang="en-US" altLang="en-US" sz="1600" b="0" i="0" u="none" strike="noStrike" cap="none" normalizeH="0" baseline="0" dirty="0">
                 <a:ln>
                   <a:noFill/>
                 </a:ln>
@@ -11038,7 +11025,7 @@
               </a:rPr>
             </a:br>
             <a:r>
-              <a:rPr kumimoji="0" lang="en-US" altLang="en-US" sz="1400" b="0" i="0" u="none" strike="noStrike" cap="none" normalizeH="0" baseline="0" dirty="0">
+              <a:rPr kumimoji="0" lang="en-US" altLang="en-US" sz="1600" b="0" i="0" u="none" strike="noStrike" cap="none" normalizeH="0" baseline="0" dirty="0">
                 <a:ln>
                   <a:noFill/>
                 </a:ln>
@@ -11051,7 +11038,7 @@
               <a:t>    }</a:t>
             </a:r>
             <a:br>
-              <a:rPr kumimoji="0" lang="en-US" altLang="en-US" sz="1400" b="0" i="0" u="none" strike="noStrike" cap="none" normalizeH="0" baseline="0" dirty="0">
+              <a:rPr kumimoji="0" lang="en-US" altLang="en-US" sz="1600" b="0" i="0" u="none" strike="noStrike" cap="none" normalizeH="0" baseline="0" dirty="0">
                 <a:ln>
                   <a:noFill/>
                 </a:ln>
@@ -11063,7 +11050,7 @@
               </a:rPr>
             </a:br>
             <a:br>
-              <a:rPr kumimoji="0" lang="en-US" altLang="en-US" sz="1400" b="0" i="0" u="none" strike="noStrike" cap="none" normalizeH="0" baseline="0" dirty="0">
+              <a:rPr kumimoji="0" lang="en-US" altLang="en-US" sz="1600" b="0" i="0" u="none" strike="noStrike" cap="none" normalizeH="0" baseline="0" dirty="0">
                 <a:ln>
                   <a:noFill/>
                 </a:ln>
@@ -11075,7 +11062,7 @@
               </a:rPr>
             </a:br>
             <a:r>
-              <a:rPr kumimoji="0" lang="en-US" altLang="en-US" sz="1400" b="0" i="0" u="none" strike="noStrike" cap="none" normalizeH="0" baseline="0" dirty="0">
+              <a:rPr kumimoji="0" lang="en-US" altLang="en-US" sz="1600" b="0" i="0" u="none" strike="noStrike" cap="none" normalizeH="0" baseline="0" dirty="0">
                 <a:ln>
                   <a:noFill/>
                 </a:ln>
@@ -11088,7 +11075,7 @@
               <a:t>    </a:t>
             </a:r>
             <a:r>
-              <a:rPr kumimoji="0" lang="en-US" altLang="en-US" sz="1400" b="1" i="0" u="none" strike="noStrike" cap="none" normalizeH="0" baseline="0" dirty="0">
+              <a:rPr kumimoji="0" lang="en-US" altLang="en-US" sz="1600" b="1" i="0" u="none" strike="noStrike" cap="none" normalizeH="0" baseline="0" dirty="0">
                 <a:ln>
                   <a:noFill/>
                 </a:ln>
@@ -11101,7 +11088,7 @@
               <a:t>public void </a:t>
             </a:r>
             <a:r>
-              <a:rPr kumimoji="0" lang="en-US" altLang="en-US" sz="1400" b="0" i="0" u="none" strike="noStrike" cap="none" normalizeH="0" baseline="0" dirty="0" err="1">
+              <a:rPr kumimoji="0" lang="en-US" altLang="en-US" sz="1600" b="0" i="0" u="none" strike="noStrike" cap="none" normalizeH="0" baseline="0" dirty="0" err="1">
                 <a:ln>
                   <a:noFill/>
                 </a:ln>
@@ -11114,7 +11101,7 @@
               <a:t>setLength</a:t>
             </a:r>
             <a:r>
-              <a:rPr kumimoji="0" lang="en-US" altLang="en-US" sz="1400" b="0" i="0" u="none" strike="noStrike" cap="none" normalizeH="0" baseline="0" dirty="0">
+              <a:rPr kumimoji="0" lang="en-US" altLang="en-US" sz="1600" b="0" i="0" u="none" strike="noStrike" cap="none" normalizeH="0" baseline="0" dirty="0">
                 <a:ln>
                   <a:noFill/>
                 </a:ln>
@@ -11127,7 +11114,7 @@
               <a:t>(</a:t>
             </a:r>
             <a:r>
-              <a:rPr kumimoji="0" lang="en-US" altLang="en-US" sz="1400" b="1" i="0" u="none" strike="noStrike" cap="none" normalizeH="0" baseline="0" dirty="0">
+              <a:rPr kumimoji="0" lang="en-US" altLang="en-US" sz="1600" b="1" i="0" u="none" strike="noStrike" cap="none" normalizeH="0" baseline="0" dirty="0">
                 <a:ln>
                   <a:noFill/>
                 </a:ln>
@@ -11140,7 +11127,7 @@
               <a:t>int </a:t>
             </a:r>
             <a:r>
-              <a:rPr kumimoji="0" lang="en-US" altLang="en-US" sz="1400" b="0" i="0" u="none" strike="noStrike" cap="none" normalizeH="0" baseline="0" dirty="0">
+              <a:rPr kumimoji="0" lang="en-US" altLang="en-US" sz="1600" b="0" i="0" u="none" strike="noStrike" cap="none" normalizeH="0" baseline="0" dirty="0">
                 <a:ln>
                   <a:noFill/>
                 </a:ln>
@@ -11153,7 +11140,7 @@
               <a:t>length) {</a:t>
             </a:r>
             <a:br>
-              <a:rPr kumimoji="0" lang="en-US" altLang="en-US" sz="1400" b="0" i="0" u="none" strike="noStrike" cap="none" normalizeH="0" baseline="0" dirty="0">
+              <a:rPr kumimoji="0" lang="en-US" altLang="en-US" sz="1600" b="0" i="0" u="none" strike="noStrike" cap="none" normalizeH="0" baseline="0" dirty="0">
                 <a:ln>
                   <a:noFill/>
                 </a:ln>
@@ -11165,7 +11152,7 @@
               </a:rPr>
             </a:br>
             <a:r>
-              <a:rPr kumimoji="0" lang="en-US" altLang="en-US" sz="1400" b="0" i="0" u="none" strike="noStrike" cap="none" normalizeH="0" baseline="0" dirty="0">
+              <a:rPr kumimoji="0" lang="en-US" altLang="en-US" sz="1600" b="0" i="0" u="none" strike="noStrike" cap="none" normalizeH="0" baseline="0" dirty="0">
                 <a:ln>
                   <a:noFill/>
                 </a:ln>
@@ -11178,7 +11165,7 @@
               <a:t>        </a:t>
             </a:r>
             <a:r>
-              <a:rPr kumimoji="0" lang="en-US" altLang="en-US" sz="1400" b="1" i="0" u="none" strike="noStrike" cap="none" normalizeH="0" baseline="0" dirty="0">
+              <a:rPr kumimoji="0" lang="en-US" altLang="en-US" sz="1600" b="1" i="0" u="none" strike="noStrike" cap="none" normalizeH="0" baseline="0" dirty="0">
                 <a:ln>
                   <a:noFill/>
                 </a:ln>
@@ -11191,7 +11178,7 @@
               <a:t>if</a:t>
             </a:r>
             <a:r>
-              <a:rPr kumimoji="0" lang="en-US" altLang="en-US" sz="1400" b="0" i="0" u="none" strike="noStrike" cap="none" normalizeH="0" baseline="0" dirty="0">
+              <a:rPr kumimoji="0" lang="en-US" altLang="en-US" sz="1600" b="0" i="0" u="none" strike="noStrike" cap="none" normalizeH="0" baseline="0" dirty="0">
                 <a:ln>
                   <a:noFill/>
                 </a:ln>
@@ -11204,7 +11191,7 @@
               <a:t>(length&gt;</a:t>
             </a:r>
             <a:r>
-              <a:rPr kumimoji="0" lang="en-US" altLang="en-US" sz="1400" b="0" i="0" u="none" strike="noStrike" cap="none" normalizeH="0" baseline="0" dirty="0">
+              <a:rPr kumimoji="0" lang="en-US" altLang="en-US" sz="1600" b="0" i="0" u="none" strike="noStrike" cap="none" normalizeH="0" baseline="0" dirty="0">
                 <a:ln>
                   <a:noFill/>
                 </a:ln>
@@ -11217,7 +11204,7 @@
               <a:t>0</a:t>
             </a:r>
             <a:r>
-              <a:rPr kumimoji="0" lang="en-US" altLang="en-US" sz="1400" b="0" i="0" u="none" strike="noStrike" cap="none" normalizeH="0" baseline="0" dirty="0">
+              <a:rPr kumimoji="0" lang="en-US" altLang="en-US" sz="1600" b="0" i="0" u="none" strike="noStrike" cap="none" normalizeH="0" baseline="0" dirty="0">
                 <a:ln>
                   <a:noFill/>
                 </a:ln>
@@ -11230,7 +11217,7 @@
               <a:t>) </a:t>
             </a:r>
             <a:r>
-              <a:rPr kumimoji="0" lang="en-US" altLang="en-US" sz="1400" b="1" i="0" u="none" strike="noStrike" cap="none" normalizeH="0" baseline="0" dirty="0" err="1">
+              <a:rPr kumimoji="0" lang="en-US" altLang="en-US" sz="1600" b="1" i="0" u="none" strike="noStrike" cap="none" normalizeH="0" baseline="0" dirty="0" err="1">
                 <a:ln>
                   <a:noFill/>
                 </a:ln>
@@ -11243,7 +11230,7 @@
               <a:t>this</a:t>
             </a:r>
             <a:r>
-              <a:rPr kumimoji="0" lang="en-US" altLang="en-US" sz="1400" b="0" i="0" u="none" strike="noStrike" cap="none" normalizeH="0" baseline="0" dirty="0" err="1">
+              <a:rPr kumimoji="0" lang="en-US" altLang="en-US" sz="1600" b="0" i="0" u="none" strike="noStrike" cap="none" normalizeH="0" baseline="0" dirty="0" err="1">
                 <a:ln>
                   <a:noFill/>
                 </a:ln>
@@ -11256,7 +11243,7 @@
               <a:t>.</a:t>
             </a:r>
             <a:r>
-              <a:rPr kumimoji="0" lang="en-US" altLang="en-US" sz="1400" b="1" i="0" u="none" strike="noStrike" cap="none" normalizeH="0" baseline="0" dirty="0" err="1">
+              <a:rPr kumimoji="0" lang="en-US" altLang="en-US" sz="1600" b="1" i="0" u="none" strike="noStrike" cap="none" normalizeH="0" baseline="0" dirty="0" err="1">
                 <a:ln>
                   <a:noFill/>
                 </a:ln>
@@ -11269,7 +11256,7 @@
               <a:t>length</a:t>
             </a:r>
             <a:r>
-              <a:rPr kumimoji="0" lang="en-US" altLang="en-US" sz="1400" b="1" i="0" u="none" strike="noStrike" cap="none" normalizeH="0" baseline="0" dirty="0">
+              <a:rPr kumimoji="0" lang="en-US" altLang="en-US" sz="1600" b="1" i="0" u="none" strike="noStrike" cap="none" normalizeH="0" baseline="0" dirty="0">
                 <a:ln>
                   <a:noFill/>
                 </a:ln>
@@ -11282,7 +11269,7 @@
               <a:t> </a:t>
             </a:r>
             <a:r>
-              <a:rPr kumimoji="0" lang="en-US" altLang="en-US" sz="1400" b="0" i="0" u="none" strike="noStrike" cap="none" normalizeH="0" baseline="0" dirty="0">
+              <a:rPr kumimoji="0" lang="en-US" altLang="en-US" sz="1600" b="0" i="0" u="none" strike="noStrike" cap="none" normalizeH="0" baseline="0" dirty="0">
                 <a:ln>
                   <a:noFill/>
                 </a:ln>
@@ -11295,7 +11282,7 @@
               <a:t>= length;</a:t>
             </a:r>
             <a:br>
-              <a:rPr kumimoji="0" lang="en-US" altLang="en-US" sz="1400" b="0" i="0" u="none" strike="noStrike" cap="none" normalizeH="0" baseline="0" dirty="0">
+              <a:rPr kumimoji="0" lang="en-US" altLang="en-US" sz="1600" b="0" i="0" u="none" strike="noStrike" cap="none" normalizeH="0" baseline="0" dirty="0">
                 <a:ln>
                   <a:noFill/>
                 </a:ln>
@@ -11307,7 +11294,7 @@
               </a:rPr>
             </a:br>
             <a:r>
-              <a:rPr kumimoji="0" lang="en-US" altLang="en-US" sz="1400" b="0" i="0" u="none" strike="noStrike" cap="none" normalizeH="0" baseline="0" dirty="0">
+              <a:rPr kumimoji="0" lang="en-US" altLang="en-US" sz="1600" b="0" i="0" u="none" strike="noStrike" cap="none" normalizeH="0" baseline="0" dirty="0">
                 <a:ln>
                   <a:noFill/>
                 </a:ln>
@@ -11320,7 +11307,7 @@
               <a:t>    }</a:t>
             </a:r>
             <a:br>
-              <a:rPr kumimoji="0" lang="en-US" altLang="en-US" sz="1400" b="0" i="0" u="none" strike="noStrike" cap="none" normalizeH="0" baseline="0" dirty="0">
+              <a:rPr kumimoji="0" lang="en-US" altLang="en-US" sz="1600" b="0" i="0" u="none" strike="noStrike" cap="none" normalizeH="0" baseline="0" dirty="0">
                 <a:ln>
                   <a:noFill/>
                 </a:ln>
@@ -11332,7 +11319,7 @@
               </a:rPr>
             </a:br>
             <a:br>
-              <a:rPr kumimoji="0" lang="en-US" altLang="en-US" sz="1400" b="0" i="0" u="none" strike="noStrike" cap="none" normalizeH="0" baseline="0" dirty="0">
+              <a:rPr kumimoji="0" lang="en-US" altLang="en-US" sz="1600" b="0" i="0" u="none" strike="noStrike" cap="none" normalizeH="0" baseline="0" dirty="0">
                 <a:ln>
                   <a:noFill/>
                 </a:ln>
@@ -11344,7 +11331,7 @@
               </a:rPr>
             </a:br>
             <a:r>
-              <a:rPr kumimoji="0" lang="en-US" altLang="en-US" sz="1400" b="0" i="0" u="none" strike="noStrike" cap="none" normalizeH="0" baseline="0" dirty="0">
+              <a:rPr kumimoji="0" lang="en-US" altLang="en-US" sz="1600" b="0" i="0" u="none" strike="noStrike" cap="none" normalizeH="0" baseline="0" dirty="0">
                 <a:ln>
                   <a:noFill/>
                 </a:ln>
@@ -11357,7 +11344,7 @@
               <a:t>    </a:t>
             </a:r>
             <a:r>
-              <a:rPr kumimoji="0" lang="en-US" altLang="en-US" sz="1400" b="1" i="0" u="none" strike="noStrike" cap="none" normalizeH="0" baseline="0" dirty="0">
+              <a:rPr kumimoji="0" lang="en-US" altLang="en-US" sz="1600" b="1" i="0" u="none" strike="noStrike" cap="none" normalizeH="0" baseline="0" dirty="0">
                 <a:ln>
                   <a:noFill/>
                 </a:ln>
@@ -11370,7 +11357,7 @@
               <a:t>public void </a:t>
             </a:r>
             <a:r>
-              <a:rPr kumimoji="0" lang="en-US" altLang="en-US" sz="1400" b="0" i="0" u="none" strike="noStrike" cap="none" normalizeH="0" baseline="0" dirty="0" err="1">
+              <a:rPr kumimoji="0" lang="en-US" altLang="en-US" sz="1600" b="0" i="0" u="none" strike="noStrike" cap="none" normalizeH="0" baseline="0" dirty="0" err="1">
                 <a:ln>
                   <a:noFill/>
                 </a:ln>
@@ -11383,7 +11370,7 @@
               <a:t>setWidth</a:t>
             </a:r>
             <a:r>
-              <a:rPr kumimoji="0" lang="en-US" altLang="en-US" sz="1400" b="0" i="0" u="none" strike="noStrike" cap="none" normalizeH="0" baseline="0" dirty="0">
+              <a:rPr kumimoji="0" lang="en-US" altLang="en-US" sz="1600" b="0" i="0" u="none" strike="noStrike" cap="none" normalizeH="0" baseline="0" dirty="0">
                 <a:ln>
                   <a:noFill/>
                 </a:ln>
@@ -11396,7 +11383,7 @@
               <a:t>(</a:t>
             </a:r>
             <a:r>
-              <a:rPr kumimoji="0" lang="en-US" altLang="en-US" sz="1400" b="1" i="0" u="none" strike="noStrike" cap="none" normalizeH="0" baseline="0" dirty="0">
+              <a:rPr kumimoji="0" lang="en-US" altLang="en-US" sz="1600" b="1" i="0" u="none" strike="noStrike" cap="none" normalizeH="0" baseline="0" dirty="0">
                 <a:ln>
                   <a:noFill/>
                 </a:ln>
@@ -11409,7 +11396,7 @@
               <a:t>int </a:t>
             </a:r>
             <a:r>
-              <a:rPr kumimoji="0" lang="en-US" altLang="en-US" sz="1400" b="0" i="0" u="none" strike="noStrike" cap="none" normalizeH="0" baseline="0" dirty="0">
+              <a:rPr kumimoji="0" lang="en-US" altLang="en-US" sz="1600" b="0" i="0" u="none" strike="noStrike" cap="none" normalizeH="0" baseline="0" dirty="0">
                 <a:ln>
                   <a:noFill/>
                 </a:ln>
@@ -11422,7 +11409,7 @@
               <a:t>width) {</a:t>
             </a:r>
             <a:br>
-              <a:rPr kumimoji="0" lang="en-US" altLang="en-US" sz="1400" b="0" i="0" u="none" strike="noStrike" cap="none" normalizeH="0" baseline="0" dirty="0">
+              <a:rPr kumimoji="0" lang="en-US" altLang="en-US" sz="1600" b="0" i="0" u="none" strike="noStrike" cap="none" normalizeH="0" baseline="0" dirty="0">
                 <a:ln>
                   <a:noFill/>
                 </a:ln>
@@ -11434,7 +11421,7 @@
               </a:rPr>
             </a:br>
             <a:r>
-              <a:rPr kumimoji="0" lang="en-US" altLang="en-US" sz="1400" b="0" i="0" u="none" strike="noStrike" cap="none" normalizeH="0" baseline="0" dirty="0">
+              <a:rPr kumimoji="0" lang="en-US" altLang="en-US" sz="1600" b="0" i="0" u="none" strike="noStrike" cap="none" normalizeH="0" baseline="0" dirty="0">
                 <a:ln>
                   <a:noFill/>
                 </a:ln>
@@ -11447,7 +11434,7 @@
               <a:t>        </a:t>
             </a:r>
             <a:r>
-              <a:rPr kumimoji="0" lang="en-US" altLang="en-US" sz="1400" b="1" i="0" u="none" strike="noStrike" cap="none" normalizeH="0" baseline="0" dirty="0">
+              <a:rPr kumimoji="0" lang="en-US" altLang="en-US" sz="1600" b="1" i="0" u="none" strike="noStrike" cap="none" normalizeH="0" baseline="0" dirty="0">
                 <a:ln>
                   <a:noFill/>
                 </a:ln>
@@ -11460,7 +11447,7 @@
               <a:t>if</a:t>
             </a:r>
             <a:r>
-              <a:rPr kumimoji="0" lang="en-US" altLang="en-US" sz="1400" b="0" i="0" u="none" strike="noStrike" cap="none" normalizeH="0" baseline="0" dirty="0">
+              <a:rPr kumimoji="0" lang="en-US" altLang="en-US" sz="1600" b="0" i="0" u="none" strike="noStrike" cap="none" normalizeH="0" baseline="0" dirty="0">
                 <a:ln>
                   <a:noFill/>
                 </a:ln>
@@ -11473,7 +11460,7 @@
               <a:t>(width &gt; </a:t>
             </a:r>
             <a:r>
-              <a:rPr kumimoji="0" lang="en-US" altLang="en-US" sz="1400" b="0" i="0" u="none" strike="noStrike" cap="none" normalizeH="0" baseline="0" dirty="0">
+              <a:rPr kumimoji="0" lang="en-US" altLang="en-US" sz="1600" b="0" i="0" u="none" strike="noStrike" cap="none" normalizeH="0" baseline="0" dirty="0">
                 <a:ln>
                   <a:noFill/>
                 </a:ln>
@@ -11486,7 +11473,7 @@
               <a:t>0</a:t>
             </a:r>
             <a:r>
-              <a:rPr kumimoji="0" lang="en-US" altLang="en-US" sz="1400" b="0" i="0" u="none" strike="noStrike" cap="none" normalizeH="0" baseline="0" dirty="0">
+              <a:rPr kumimoji="0" lang="en-US" altLang="en-US" sz="1600" b="0" i="0" u="none" strike="noStrike" cap="none" normalizeH="0" baseline="0" dirty="0">
                 <a:ln>
                   <a:noFill/>
                 </a:ln>
@@ -11499,7 +11486,7 @@
               <a:t>) </a:t>
             </a:r>
             <a:r>
-              <a:rPr kumimoji="0" lang="en-US" altLang="en-US" sz="1400" b="1" i="0" u="none" strike="noStrike" cap="none" normalizeH="0" baseline="0" dirty="0" err="1">
+              <a:rPr kumimoji="0" lang="en-US" altLang="en-US" sz="1600" b="1" i="0" u="none" strike="noStrike" cap="none" normalizeH="0" baseline="0" dirty="0" err="1">
                 <a:ln>
                   <a:noFill/>
                 </a:ln>
@@ -11512,7 +11499,7 @@
               <a:t>this</a:t>
             </a:r>
             <a:r>
-              <a:rPr kumimoji="0" lang="en-US" altLang="en-US" sz="1400" b="0" i="0" u="none" strike="noStrike" cap="none" normalizeH="0" baseline="0" dirty="0" err="1">
+              <a:rPr kumimoji="0" lang="en-US" altLang="en-US" sz="1600" b="0" i="0" u="none" strike="noStrike" cap="none" normalizeH="0" baseline="0" dirty="0" err="1">
                 <a:ln>
                   <a:noFill/>
                 </a:ln>
@@ -11525,7 +11512,7 @@
               <a:t>.</a:t>
             </a:r>
             <a:r>
-              <a:rPr kumimoji="0" lang="en-US" altLang="en-US" sz="1400" b="1" i="0" u="none" strike="noStrike" cap="none" normalizeH="0" baseline="0" dirty="0" err="1">
+              <a:rPr kumimoji="0" lang="en-US" altLang="en-US" sz="1600" b="1" i="0" u="none" strike="noStrike" cap="none" normalizeH="0" baseline="0" dirty="0" err="1">
                 <a:ln>
                   <a:noFill/>
                 </a:ln>
@@ -11538,7 +11525,7 @@
               <a:t>width</a:t>
             </a:r>
             <a:r>
-              <a:rPr kumimoji="0" lang="en-US" altLang="en-US" sz="1400" b="1" i="0" u="none" strike="noStrike" cap="none" normalizeH="0" baseline="0" dirty="0">
+              <a:rPr kumimoji="0" lang="en-US" altLang="en-US" sz="1600" b="1" i="0" u="none" strike="noStrike" cap="none" normalizeH="0" baseline="0" dirty="0">
                 <a:ln>
                   <a:noFill/>
                 </a:ln>
@@ -11551,7 +11538,7 @@
               <a:t> </a:t>
             </a:r>
             <a:r>
-              <a:rPr kumimoji="0" lang="en-US" altLang="en-US" sz="1400" b="0" i="0" u="none" strike="noStrike" cap="none" normalizeH="0" baseline="0" dirty="0">
+              <a:rPr kumimoji="0" lang="en-US" altLang="en-US" sz="1600" b="0" i="0" u="none" strike="noStrike" cap="none" normalizeH="0" baseline="0" dirty="0">
                 <a:ln>
                   <a:noFill/>
                 </a:ln>
@@ -11564,7 +11551,7 @@
               <a:t>= width;</a:t>
             </a:r>
             <a:br>
-              <a:rPr kumimoji="0" lang="en-US" altLang="en-US" sz="1400" b="0" i="0" u="none" strike="noStrike" cap="none" normalizeH="0" baseline="0" dirty="0">
+              <a:rPr kumimoji="0" lang="en-US" altLang="en-US" sz="1600" b="0" i="0" u="none" strike="noStrike" cap="none" normalizeH="0" baseline="0" dirty="0">
                 <a:ln>
                   <a:noFill/>
                 </a:ln>
@@ -11576,7 +11563,7 @@
               </a:rPr>
             </a:br>
             <a:r>
-              <a:rPr kumimoji="0" lang="en-US" altLang="en-US" sz="1400" b="0" i="0" u="none" strike="noStrike" cap="none" normalizeH="0" baseline="0" dirty="0">
+              <a:rPr kumimoji="0" lang="en-US" altLang="en-US" sz="1600" b="0" i="0" u="none" strike="noStrike" cap="none" normalizeH="0" baseline="0" dirty="0">
                 <a:ln>
                   <a:noFill/>
                 </a:ln>
@@ -11589,7 +11576,7 @@
               <a:t>    }</a:t>
             </a:r>
             <a:br>
-              <a:rPr kumimoji="0" lang="en-US" altLang="en-US" sz="1400" b="0" i="0" u="none" strike="noStrike" cap="none" normalizeH="0" baseline="0" dirty="0">
+              <a:rPr kumimoji="0" lang="en-US" altLang="en-US" sz="1600" b="0" i="0" u="none" strike="noStrike" cap="none" normalizeH="0" baseline="0" dirty="0">
                 <a:ln>
                   <a:noFill/>
                 </a:ln>
@@ -11601,7 +11588,7 @@
               </a:rPr>
             </a:br>
             <a:r>
-              <a:rPr kumimoji="0" lang="en-US" altLang="en-US" sz="1400" b="0" i="0" u="none" strike="noStrike" cap="none" normalizeH="0" baseline="0" dirty="0">
+              <a:rPr kumimoji="0" lang="en-US" altLang="en-US" sz="1600" b="0" i="0" u="none" strike="noStrike" cap="none" normalizeH="0" baseline="0" dirty="0">
                 <a:ln>
                   <a:noFill/>
                 </a:ln>
@@ -11614,7 +11601,7 @@
               <a:t>    </a:t>
             </a:r>
             <a:br>
-              <a:rPr kumimoji="0" lang="en-US" altLang="en-US" sz="1400" b="0" i="0" u="none" strike="noStrike" cap="none" normalizeH="0" baseline="0" dirty="0">
+              <a:rPr kumimoji="0" lang="en-US" altLang="en-US" sz="1600" b="0" i="0" u="none" strike="noStrike" cap="none" normalizeH="0" baseline="0" dirty="0">
                 <a:ln>
                   <a:noFill/>
                 </a:ln>
@@ -11626,7 +11613,7 @@
               </a:rPr>
             </a:br>
             <a:r>
-              <a:rPr kumimoji="0" lang="en-US" altLang="en-US" sz="1400" b="0" i="0" u="none" strike="noStrike" cap="none" normalizeH="0" baseline="0" dirty="0">
+              <a:rPr kumimoji="0" lang="en-US" altLang="en-US" sz="1600" b="0" i="0" u="none" strike="noStrike" cap="none" normalizeH="0" baseline="0" dirty="0">
                 <a:ln>
                   <a:noFill/>
                 </a:ln>
@@ -11639,7 +11626,7 @@
               <a:t>    </a:t>
             </a:r>
             <a:r>
-              <a:rPr kumimoji="0" lang="en-US" altLang="en-US" sz="1400" b="1" i="0" u="none" strike="noStrike" cap="none" normalizeH="0" baseline="0" dirty="0">
+              <a:rPr kumimoji="0" lang="en-US" altLang="en-US" sz="1600" b="1" i="0" u="none" strike="noStrike" cap="none" normalizeH="0" baseline="0" dirty="0">
                 <a:ln>
                   <a:noFill/>
                 </a:ln>
@@ -11652,7 +11639,7 @@
               <a:t>public int </a:t>
             </a:r>
             <a:r>
-              <a:rPr kumimoji="0" lang="en-US" altLang="en-US" sz="1400" b="0" i="0" u="none" strike="noStrike" cap="none" normalizeH="0" baseline="0" dirty="0" err="1">
+              <a:rPr kumimoji="0" lang="en-US" altLang="en-US" sz="1600" b="0" i="0" u="none" strike="noStrike" cap="none" normalizeH="0" baseline="0" dirty="0" err="1">
                 <a:ln>
                   <a:noFill/>
                 </a:ln>
@@ -11665,7 +11652,7 @@
               <a:t>getLength</a:t>
             </a:r>
             <a:r>
-              <a:rPr kumimoji="0" lang="en-US" altLang="en-US" sz="1400" b="0" i="0" u="none" strike="noStrike" cap="none" normalizeH="0" baseline="0" dirty="0">
+              <a:rPr kumimoji="0" lang="en-US" altLang="en-US" sz="1600" b="0" i="0" u="none" strike="noStrike" cap="none" normalizeH="0" baseline="0" dirty="0">
                 <a:ln>
                   <a:noFill/>
                 </a:ln>
@@ -11678,7 +11665,7 @@
               <a:t>() {</a:t>
             </a:r>
             <a:br>
-              <a:rPr kumimoji="0" lang="en-US" altLang="en-US" sz="1400" b="0" i="0" u="none" strike="noStrike" cap="none" normalizeH="0" baseline="0" dirty="0">
+              <a:rPr kumimoji="0" lang="en-US" altLang="en-US" sz="1600" b="0" i="0" u="none" strike="noStrike" cap="none" normalizeH="0" baseline="0" dirty="0">
                 <a:ln>
                   <a:noFill/>
                 </a:ln>
@@ -11690,7 +11677,7 @@
               </a:rPr>
             </a:br>
             <a:r>
-              <a:rPr kumimoji="0" lang="en-US" altLang="en-US" sz="1400" b="0" i="0" u="none" strike="noStrike" cap="none" normalizeH="0" baseline="0" dirty="0">
+              <a:rPr kumimoji="0" lang="en-US" altLang="en-US" sz="1600" b="0" i="0" u="none" strike="noStrike" cap="none" normalizeH="0" baseline="0" dirty="0">
                 <a:ln>
                   <a:noFill/>
                 </a:ln>
@@ -11703,7 +11690,7 @@
               <a:t>        </a:t>
             </a:r>
             <a:r>
-              <a:rPr kumimoji="0" lang="en-US" altLang="en-US" sz="1400" b="1" i="0" u="none" strike="noStrike" cap="none" normalizeH="0" baseline="0" dirty="0">
+              <a:rPr kumimoji="0" lang="en-US" altLang="en-US" sz="1600" b="1" i="0" u="none" strike="noStrike" cap="none" normalizeH="0" baseline="0" dirty="0">
                 <a:ln>
                   <a:noFill/>
                 </a:ln>
@@ -11716,7 +11703,7 @@
               <a:t>return </a:t>
             </a:r>
             <a:r>
-              <a:rPr kumimoji="0" lang="en-US" altLang="en-US" sz="1400" b="1" i="0" u="none" strike="noStrike" cap="none" normalizeH="0" baseline="0" dirty="0">
+              <a:rPr kumimoji="0" lang="en-US" altLang="en-US" sz="1600" b="1" i="0" u="none" strike="noStrike" cap="none" normalizeH="0" baseline="0" dirty="0">
                 <a:ln>
                   <a:noFill/>
                 </a:ln>
@@ -11729,7 +11716,7 @@
               <a:t>length</a:t>
             </a:r>
             <a:r>
-              <a:rPr kumimoji="0" lang="en-US" altLang="en-US" sz="1400" b="0" i="0" u="none" strike="noStrike" cap="none" normalizeH="0" baseline="0" dirty="0">
+              <a:rPr kumimoji="0" lang="en-US" altLang="en-US" sz="1600" b="0" i="0" u="none" strike="noStrike" cap="none" normalizeH="0" baseline="0" dirty="0">
                 <a:ln>
                   <a:noFill/>
                 </a:ln>
@@ -11742,7 +11729,7 @@
               <a:t>;</a:t>
             </a:r>
             <a:br>
-              <a:rPr kumimoji="0" lang="en-US" altLang="en-US" sz="1400" b="0" i="0" u="none" strike="noStrike" cap="none" normalizeH="0" baseline="0" dirty="0">
+              <a:rPr kumimoji="0" lang="en-US" altLang="en-US" sz="1600" b="0" i="0" u="none" strike="noStrike" cap="none" normalizeH="0" baseline="0" dirty="0">
                 <a:ln>
                   <a:noFill/>
                 </a:ln>
@@ -11754,7 +11741,7 @@
               </a:rPr>
             </a:br>
             <a:r>
-              <a:rPr kumimoji="0" lang="en-US" altLang="en-US" sz="1400" b="0" i="0" u="none" strike="noStrike" cap="none" normalizeH="0" baseline="0" dirty="0">
+              <a:rPr kumimoji="0" lang="en-US" altLang="en-US" sz="1600" b="0" i="0" u="none" strike="noStrike" cap="none" normalizeH="0" baseline="0" dirty="0">
                 <a:ln>
                   <a:noFill/>
                 </a:ln>
@@ -11767,7 +11754,7 @@
               <a:t>    }</a:t>
             </a:r>
             <a:br>
-              <a:rPr kumimoji="0" lang="en-US" altLang="en-US" sz="1400" b="0" i="0" u="none" strike="noStrike" cap="none" normalizeH="0" baseline="0" dirty="0">
+              <a:rPr kumimoji="0" lang="en-US" altLang="en-US" sz="1600" b="0" i="0" u="none" strike="noStrike" cap="none" normalizeH="0" baseline="0" dirty="0">
                 <a:ln>
                   <a:noFill/>
                 </a:ln>
@@ -11779,7 +11766,7 @@
               </a:rPr>
             </a:br>
             <a:br>
-              <a:rPr kumimoji="0" lang="en-US" altLang="en-US" sz="1400" b="0" i="0" u="none" strike="noStrike" cap="none" normalizeH="0" baseline="0" dirty="0">
+              <a:rPr kumimoji="0" lang="en-US" altLang="en-US" sz="1600" b="0" i="0" u="none" strike="noStrike" cap="none" normalizeH="0" baseline="0" dirty="0">
                 <a:ln>
                   <a:noFill/>
                 </a:ln>
@@ -11791,7 +11778,7 @@
               </a:rPr>
             </a:br>
             <a:r>
-              <a:rPr kumimoji="0" lang="en-US" altLang="en-US" sz="1400" b="0" i="0" u="none" strike="noStrike" cap="none" normalizeH="0" baseline="0" dirty="0">
+              <a:rPr kumimoji="0" lang="en-US" altLang="en-US" sz="1600" b="0" i="0" u="none" strike="noStrike" cap="none" normalizeH="0" baseline="0" dirty="0">
                 <a:ln>
                   <a:noFill/>
                 </a:ln>
@@ -11804,7 +11791,7 @@
               <a:t>    </a:t>
             </a:r>
             <a:r>
-              <a:rPr kumimoji="0" lang="en-US" altLang="en-US" sz="1400" b="1" i="0" u="none" strike="noStrike" cap="none" normalizeH="0" baseline="0" dirty="0">
+              <a:rPr kumimoji="0" lang="en-US" altLang="en-US" sz="1600" b="1" i="0" u="none" strike="noStrike" cap="none" normalizeH="0" baseline="0" dirty="0">
                 <a:ln>
                   <a:noFill/>
                 </a:ln>
@@ -11817,7 +11804,7 @@
               <a:t>public int </a:t>
             </a:r>
             <a:r>
-              <a:rPr kumimoji="0" lang="en-US" altLang="en-US" sz="1400" b="0" i="0" u="none" strike="noStrike" cap="none" normalizeH="0" baseline="0" dirty="0" err="1">
+              <a:rPr kumimoji="0" lang="en-US" altLang="en-US" sz="1600" b="0" i="0" u="none" strike="noStrike" cap="none" normalizeH="0" baseline="0" dirty="0" err="1">
                 <a:ln>
                   <a:noFill/>
                 </a:ln>
@@ -11830,7 +11817,7 @@
               <a:t>getWidth</a:t>
             </a:r>
             <a:r>
-              <a:rPr kumimoji="0" lang="en-US" altLang="en-US" sz="1400" b="0" i="0" u="none" strike="noStrike" cap="none" normalizeH="0" baseline="0" dirty="0">
+              <a:rPr kumimoji="0" lang="en-US" altLang="en-US" sz="1600" b="0" i="0" u="none" strike="noStrike" cap="none" normalizeH="0" baseline="0" dirty="0">
                 <a:ln>
                   <a:noFill/>
                 </a:ln>
@@ -11843,7 +11830,7 @@
               <a:t>() {</a:t>
             </a:r>
             <a:br>
-              <a:rPr kumimoji="0" lang="en-US" altLang="en-US" sz="1400" b="0" i="0" u="none" strike="noStrike" cap="none" normalizeH="0" baseline="0" dirty="0">
+              <a:rPr kumimoji="0" lang="en-US" altLang="en-US" sz="1600" b="0" i="0" u="none" strike="noStrike" cap="none" normalizeH="0" baseline="0" dirty="0">
                 <a:ln>
                   <a:noFill/>
                 </a:ln>
@@ -11855,7 +11842,7 @@
               </a:rPr>
             </a:br>
             <a:r>
-              <a:rPr kumimoji="0" lang="en-US" altLang="en-US" sz="1400" b="0" i="0" u="none" strike="noStrike" cap="none" normalizeH="0" baseline="0" dirty="0">
+              <a:rPr kumimoji="0" lang="en-US" altLang="en-US" sz="1600" b="0" i="0" u="none" strike="noStrike" cap="none" normalizeH="0" baseline="0" dirty="0">
                 <a:ln>
                   <a:noFill/>
                 </a:ln>
@@ -11868,7 +11855,7 @@
               <a:t>        </a:t>
             </a:r>
             <a:r>
-              <a:rPr kumimoji="0" lang="en-US" altLang="en-US" sz="1400" b="1" i="0" u="none" strike="noStrike" cap="none" normalizeH="0" baseline="0" dirty="0">
+              <a:rPr kumimoji="0" lang="en-US" altLang="en-US" sz="1600" b="1" i="0" u="none" strike="noStrike" cap="none" normalizeH="0" baseline="0" dirty="0">
                 <a:ln>
                   <a:noFill/>
                 </a:ln>
@@ -11881,7 +11868,7 @@
               <a:t>return </a:t>
             </a:r>
             <a:r>
-              <a:rPr kumimoji="0" lang="en-US" altLang="en-US" sz="1400" b="1" i="0" u="none" strike="noStrike" cap="none" normalizeH="0" baseline="0" dirty="0">
+              <a:rPr kumimoji="0" lang="en-US" altLang="en-US" sz="1600" b="1" i="0" u="none" strike="noStrike" cap="none" normalizeH="0" baseline="0" dirty="0">
                 <a:ln>
                   <a:noFill/>
                 </a:ln>
@@ -11894,7 +11881,7 @@
               <a:t>width</a:t>
             </a:r>
             <a:r>
-              <a:rPr kumimoji="0" lang="en-US" altLang="en-US" sz="1400" b="0" i="0" u="none" strike="noStrike" cap="none" normalizeH="0" baseline="0" dirty="0">
+              <a:rPr kumimoji="0" lang="en-US" altLang="en-US" sz="1600" b="0" i="0" u="none" strike="noStrike" cap="none" normalizeH="0" baseline="0" dirty="0">
                 <a:ln>
                   <a:noFill/>
                 </a:ln>
@@ -11907,7 +11894,7 @@
               <a:t>;</a:t>
             </a:r>
             <a:br>
-              <a:rPr kumimoji="0" lang="en-US" altLang="en-US" sz="1400" b="0" i="0" u="none" strike="noStrike" cap="none" normalizeH="0" baseline="0" dirty="0">
+              <a:rPr kumimoji="0" lang="en-US" altLang="en-US" sz="1600" b="0" i="0" u="none" strike="noStrike" cap="none" normalizeH="0" baseline="0" dirty="0">
                 <a:ln>
                   <a:noFill/>
                 </a:ln>
@@ -11919,7 +11906,7 @@
               </a:rPr>
             </a:br>
             <a:r>
-              <a:rPr kumimoji="0" lang="en-US" altLang="en-US" sz="1400" b="0" i="0" u="none" strike="noStrike" cap="none" normalizeH="0" baseline="0" dirty="0">
+              <a:rPr kumimoji="0" lang="en-US" altLang="en-US" sz="1600" b="0" i="0" u="none" strike="noStrike" cap="none" normalizeH="0" baseline="0" dirty="0">
                 <a:ln>
                   <a:noFill/>
                 </a:ln>
@@ -11932,7 +11919,7 @@
               <a:t>    }</a:t>
             </a:r>
             <a:br>
-              <a:rPr kumimoji="0" lang="en-US" altLang="en-US" sz="1400" b="0" i="0" u="none" strike="noStrike" cap="none" normalizeH="0" baseline="0" dirty="0">
+              <a:rPr kumimoji="0" lang="en-US" altLang="en-US" sz="1600" b="0" i="0" u="none" strike="noStrike" cap="none" normalizeH="0" baseline="0" dirty="0">
                 <a:ln>
                   <a:noFill/>
                 </a:ln>
@@ -11944,7 +11931,7 @@
               </a:rPr>
             </a:br>
             <a:r>
-              <a:rPr kumimoji="0" lang="en-US" altLang="en-US" sz="1400" b="0" i="0" u="none" strike="noStrike" cap="none" normalizeH="0" baseline="0" dirty="0">
+              <a:rPr kumimoji="0" lang="en-US" altLang="en-US" sz="1600" b="0" i="0" u="none" strike="noStrike" cap="none" normalizeH="0" baseline="0" dirty="0">
                 <a:ln>
                   <a:noFill/>
                 </a:ln>
@@ -11957,7 +11944,7 @@
               <a:t>    </a:t>
             </a:r>
             <a:br>
-              <a:rPr kumimoji="0" lang="en-US" altLang="en-US" sz="1400" b="0" i="0" u="none" strike="noStrike" cap="none" normalizeH="0" baseline="0" dirty="0">
+              <a:rPr kumimoji="0" lang="en-US" altLang="en-US" sz="1600" b="0" i="0" u="none" strike="noStrike" cap="none" normalizeH="0" baseline="0" dirty="0">
                 <a:ln>
                   <a:noFill/>
                 </a:ln>
@@ -11969,7 +11956,7 @@
               </a:rPr>
             </a:br>
             <a:r>
-              <a:rPr kumimoji="0" lang="en-US" altLang="en-US" sz="1400" b="0" i="0" u="none" strike="noStrike" cap="none" normalizeH="0" baseline="0" dirty="0">
+              <a:rPr kumimoji="0" lang="en-US" altLang="en-US" sz="1600" b="0" i="0" u="none" strike="noStrike" cap="none" normalizeH="0" baseline="0" dirty="0">
                 <a:ln>
                   <a:noFill/>
                 </a:ln>
@@ -11982,7 +11969,7 @@
               <a:t>    </a:t>
             </a:r>
             <a:r>
-              <a:rPr kumimoji="0" lang="en-US" altLang="en-US" sz="1400" b="1" i="0" u="none" strike="noStrike" cap="none" normalizeH="0" baseline="0" dirty="0">
+              <a:rPr kumimoji="0" lang="en-US" altLang="en-US" sz="1600" b="1" i="0" u="none" strike="noStrike" cap="none" normalizeH="0" baseline="0" dirty="0">
                 <a:ln>
                   <a:noFill/>
                 </a:ln>
@@ -11995,7 +11982,7 @@
               <a:t>public int </a:t>
             </a:r>
             <a:r>
-              <a:rPr kumimoji="0" lang="en-US" altLang="en-US" sz="1400" b="0" i="0" u="none" strike="noStrike" cap="none" normalizeH="0" baseline="0" dirty="0" err="1">
+              <a:rPr kumimoji="0" lang="en-US" altLang="en-US" sz="1600" b="0" i="0" u="none" strike="noStrike" cap="none" normalizeH="0" baseline="0" dirty="0" err="1">
                 <a:ln>
                   <a:noFill/>
                 </a:ln>
@@ -12008,7 +11995,7 @@
               <a:t>getArea</a:t>
             </a:r>
             <a:r>
-              <a:rPr kumimoji="0" lang="en-US" altLang="en-US" sz="1400" b="0" i="0" u="none" strike="noStrike" cap="none" normalizeH="0" baseline="0" dirty="0">
+              <a:rPr kumimoji="0" lang="en-US" altLang="en-US" sz="1600" b="0" i="0" u="none" strike="noStrike" cap="none" normalizeH="0" baseline="0" dirty="0">
                 <a:ln>
                   <a:noFill/>
                 </a:ln>
@@ -12021,7 +12008,7 @@
               <a:t>() {</a:t>
             </a:r>
             <a:br>
-              <a:rPr kumimoji="0" lang="en-US" altLang="en-US" sz="1400" b="0" i="0" u="none" strike="noStrike" cap="none" normalizeH="0" baseline="0" dirty="0">
+              <a:rPr kumimoji="0" lang="en-US" altLang="en-US" sz="1600" b="0" i="0" u="none" strike="noStrike" cap="none" normalizeH="0" baseline="0" dirty="0">
                 <a:ln>
                   <a:noFill/>
                 </a:ln>
@@ -12033,7 +12020,7 @@
               </a:rPr>
             </a:br>
             <a:r>
-              <a:rPr kumimoji="0" lang="en-US" altLang="en-US" sz="1400" b="0" i="0" u="none" strike="noStrike" cap="none" normalizeH="0" baseline="0" dirty="0">
+              <a:rPr kumimoji="0" lang="en-US" altLang="en-US" sz="1600" b="0" i="0" u="none" strike="noStrike" cap="none" normalizeH="0" baseline="0" dirty="0">
                 <a:ln>
                   <a:noFill/>
                 </a:ln>
@@ -12046,7 +12033,7 @@
               <a:t>        </a:t>
             </a:r>
             <a:r>
-              <a:rPr kumimoji="0" lang="en-US" altLang="en-US" sz="1400" b="1" i="0" u="none" strike="noStrike" cap="none" normalizeH="0" baseline="0" dirty="0">
+              <a:rPr kumimoji="0" lang="en-US" altLang="en-US" sz="1600" b="1" i="0" u="none" strike="noStrike" cap="none" normalizeH="0" baseline="0" dirty="0">
                 <a:ln>
                   <a:noFill/>
                 </a:ln>
@@ -12059,7 +12046,7 @@
               <a:t>return </a:t>
             </a:r>
             <a:r>
-              <a:rPr kumimoji="0" lang="en-US" altLang="en-US" sz="1400" b="1" i="0" u="none" strike="noStrike" cap="none" normalizeH="0" baseline="0" dirty="0">
+              <a:rPr kumimoji="0" lang="en-US" altLang="en-US" sz="1600" b="1" i="0" u="none" strike="noStrike" cap="none" normalizeH="0" baseline="0" dirty="0">
                 <a:ln>
                   <a:noFill/>
                 </a:ln>
@@ -12072,7 +12059,7 @@
               <a:t>length</a:t>
             </a:r>
             <a:r>
-              <a:rPr kumimoji="0" lang="en-US" altLang="en-US" sz="1400" b="0" i="0" u="none" strike="noStrike" cap="none" normalizeH="0" baseline="0" dirty="0">
+              <a:rPr kumimoji="0" lang="en-US" altLang="en-US" sz="1600" b="0" i="0" u="none" strike="noStrike" cap="none" normalizeH="0" baseline="0" dirty="0">
                 <a:ln>
                   <a:noFill/>
                 </a:ln>
@@ -12085,7 +12072,7 @@
               <a:t>*</a:t>
             </a:r>
             <a:r>
-              <a:rPr kumimoji="0" lang="en-US" altLang="en-US" sz="1400" b="1" i="0" u="none" strike="noStrike" cap="none" normalizeH="0" baseline="0" dirty="0">
+              <a:rPr kumimoji="0" lang="en-US" altLang="en-US" sz="1600" b="1" i="0" u="none" strike="noStrike" cap="none" normalizeH="0" baseline="0" dirty="0">
                 <a:ln>
                   <a:noFill/>
                 </a:ln>
@@ -12098,7 +12085,7 @@
               <a:t>width</a:t>
             </a:r>
             <a:r>
-              <a:rPr kumimoji="0" lang="en-US" altLang="en-US" sz="1400" b="0" i="0" u="none" strike="noStrike" cap="none" normalizeH="0" baseline="0" dirty="0">
+              <a:rPr kumimoji="0" lang="en-US" altLang="en-US" sz="1600" b="0" i="0" u="none" strike="noStrike" cap="none" normalizeH="0" baseline="0" dirty="0">
                 <a:ln>
                   <a:noFill/>
                 </a:ln>
@@ -12111,7 +12098,7 @@
               <a:t>;</a:t>
             </a:r>
             <a:br>
-              <a:rPr kumimoji="0" lang="en-US" altLang="en-US" sz="1400" b="0" i="0" u="none" strike="noStrike" cap="none" normalizeH="0" baseline="0" dirty="0">
+              <a:rPr kumimoji="0" lang="en-US" altLang="en-US" sz="1600" b="0" i="0" u="none" strike="noStrike" cap="none" normalizeH="0" baseline="0" dirty="0">
                 <a:ln>
                   <a:noFill/>
                 </a:ln>
@@ -12123,7 +12110,7 @@
               </a:rPr>
             </a:br>
             <a:r>
-              <a:rPr kumimoji="0" lang="en-US" altLang="en-US" sz="1400" b="0" i="0" u="none" strike="noStrike" cap="none" normalizeH="0" baseline="0" dirty="0">
+              <a:rPr kumimoji="0" lang="en-US" altLang="en-US" sz="1600" b="0" i="0" u="none" strike="noStrike" cap="none" normalizeH="0" baseline="0" dirty="0">
                 <a:ln>
                   <a:noFill/>
                 </a:ln>
@@ -12136,7 +12123,7 @@
               <a:t>    }</a:t>
             </a:r>
             <a:br>
-              <a:rPr kumimoji="0" lang="en-US" altLang="en-US" sz="1400" b="0" i="0" u="none" strike="noStrike" cap="none" normalizeH="0" baseline="0" dirty="0">
+              <a:rPr kumimoji="0" lang="en-US" altLang="en-US" sz="1600" b="0" i="0" u="none" strike="noStrike" cap="none" normalizeH="0" baseline="0" dirty="0">
                 <a:ln>
                   <a:noFill/>
                 </a:ln>
@@ -12148,7 +12135,7 @@
               </a:rPr>
             </a:br>
             <a:r>
-              <a:rPr kumimoji="0" lang="en-US" altLang="en-US" sz="1400" b="0" i="0" u="none" strike="noStrike" cap="none" normalizeH="0" baseline="0" dirty="0">
+              <a:rPr kumimoji="0" lang="en-US" altLang="en-US" sz="1600" b="0" i="0" u="none" strike="noStrike" cap="none" normalizeH="0" baseline="0" dirty="0">
                 <a:ln>
                   <a:noFill/>
                 </a:ln>
@@ -12160,7 +12147,7 @@
               </a:rPr>
               <a:t>}</a:t>
             </a:r>
-            <a:endParaRPr kumimoji="0" lang="en-US" altLang="en-US" sz="1400" b="0" i="0" u="none" strike="noStrike" cap="none" normalizeH="0" baseline="0" dirty="0">
+            <a:endParaRPr kumimoji="0" lang="en-US" altLang="en-US" sz="1600" b="0" i="0" u="none" strike="noStrike" cap="none" normalizeH="0" baseline="0" dirty="0">
               <a:ln>
                 <a:noFill/>
               </a:ln>
@@ -12189,8 +12176,8 @@
         </p:nvSpPr>
         <p:spPr bwMode="auto">
           <a:xfrm>
-            <a:off x="4234216" y="1463722"/>
-            <a:ext cx="5602512" cy="5262979"/>
+            <a:off x="3494314" y="1094390"/>
+            <a:ext cx="6342414" cy="6001643"/>
           </a:xfrm>
           <a:prstGeom prst="rect">
             <a:avLst/>
@@ -12229,7 +12216,7 @@
               <a:tabLst/>
             </a:pPr>
             <a:r>
-              <a:rPr kumimoji="0" lang="en-US" altLang="en-US" sz="1400" b="1" i="0" u="none" strike="noStrike" cap="none" normalizeH="0" baseline="0" dirty="0">
+              <a:rPr kumimoji="0" lang="en-US" altLang="en-US" sz="1600" b="1" i="0" u="none" strike="noStrike" cap="none" normalizeH="0" baseline="0" dirty="0">
                 <a:ln>
                   <a:noFill/>
                 </a:ln>
@@ -12242,7 +12229,7 @@
               <a:t>public class </a:t>
             </a:r>
             <a:r>
-              <a:rPr kumimoji="0" lang="en-US" altLang="en-US" sz="1400" b="0" i="0" u="none" strike="noStrike" cap="none" normalizeH="0" baseline="0" dirty="0" err="1">
+              <a:rPr kumimoji="0" lang="en-US" altLang="en-US" sz="1600" b="0" i="0" u="none" strike="noStrike" cap="none" normalizeH="0" baseline="0" dirty="0" err="1">
                 <a:ln>
                   <a:noFill/>
                 </a:ln>
@@ -12255,7 +12242,7 @@
               <a:t>YourProgram</a:t>
             </a:r>
             <a:r>
-              <a:rPr kumimoji="0" lang="en-US" altLang="en-US" sz="1400" b="0" i="0" u="none" strike="noStrike" cap="none" normalizeH="0" baseline="0" dirty="0">
+              <a:rPr kumimoji="0" lang="en-US" altLang="en-US" sz="1600" b="0" i="0" u="none" strike="noStrike" cap="none" normalizeH="0" baseline="0" dirty="0">
                 <a:ln>
                   <a:noFill/>
                 </a:ln>
@@ -12268,7 +12255,7 @@
               <a:t> {</a:t>
             </a:r>
             <a:br>
-              <a:rPr kumimoji="0" lang="en-US" altLang="en-US" sz="1400" b="0" i="0" u="none" strike="noStrike" cap="none" normalizeH="0" baseline="0" dirty="0">
+              <a:rPr kumimoji="0" lang="en-US" altLang="en-US" sz="1600" b="0" i="0" u="none" strike="noStrike" cap="none" normalizeH="0" baseline="0" dirty="0">
                 <a:ln>
                   <a:noFill/>
                 </a:ln>
@@ -12280,7 +12267,7 @@
               </a:rPr>
             </a:br>
             <a:r>
-              <a:rPr kumimoji="0" lang="en-US" altLang="en-US" sz="1400" b="0" i="0" u="none" strike="noStrike" cap="none" normalizeH="0" baseline="0" dirty="0">
+              <a:rPr kumimoji="0" lang="en-US" altLang="en-US" sz="1600" b="0" i="0" u="none" strike="noStrike" cap="none" normalizeH="0" baseline="0" dirty="0">
                 <a:ln>
                   <a:noFill/>
                 </a:ln>
@@ -12293,7 +12280,7 @@
               <a:t>    </a:t>
             </a:r>
             <a:r>
-              <a:rPr kumimoji="0" lang="en-US" altLang="en-US" sz="1400" b="1" i="0" u="none" strike="noStrike" cap="none" normalizeH="0" baseline="0" dirty="0">
+              <a:rPr kumimoji="0" lang="en-US" altLang="en-US" sz="1600" b="1" i="0" u="none" strike="noStrike" cap="none" normalizeH="0" baseline="0" dirty="0">
                 <a:ln>
                   <a:noFill/>
                 </a:ln>
@@ -12306,7 +12293,7 @@
               <a:t>public static void </a:t>
             </a:r>
             <a:r>
-              <a:rPr kumimoji="0" lang="en-US" altLang="en-US" sz="1400" b="0" i="0" u="none" strike="noStrike" cap="none" normalizeH="0" baseline="0" dirty="0" err="1">
+              <a:rPr kumimoji="0" lang="en-US" altLang="en-US" sz="1600" b="0" i="0" u="none" strike="noStrike" cap="none" normalizeH="0" baseline="0" dirty="0" err="1">
                 <a:ln>
                   <a:noFill/>
                 </a:ln>
@@ -12319,7 +12306,7 @@
               <a:t>modifyValues</a:t>
             </a:r>
             <a:r>
-              <a:rPr kumimoji="0" lang="en-US" altLang="en-US" sz="1400" b="0" i="0" u="none" strike="noStrike" cap="none" normalizeH="0" baseline="0" dirty="0">
+              <a:rPr kumimoji="0" lang="en-US" altLang="en-US" sz="1600" b="0" i="0" u="none" strike="noStrike" cap="none" normalizeH="0" baseline="0" dirty="0">
                 <a:ln>
                   <a:noFill/>
                 </a:ln>
@@ -12332,7 +12319,7 @@
               <a:t>(Rectangle </a:t>
             </a:r>
             <a:r>
-              <a:rPr kumimoji="0" lang="en-US" altLang="en-US" sz="1400" b="0" i="0" u="none" strike="noStrike" cap="none" normalizeH="0" baseline="0" dirty="0" err="1">
+              <a:rPr kumimoji="0" lang="en-US" altLang="en-US" sz="1600" b="0" i="0" u="none" strike="noStrike" cap="none" normalizeH="0" baseline="0" dirty="0" err="1">
                 <a:ln>
                   <a:noFill/>
                 </a:ln>
@@ -12345,7 +12332,7 @@
               <a:t>rectangle</a:t>
             </a:r>
             <a:r>
-              <a:rPr kumimoji="0" lang="en-US" altLang="en-US" sz="1400" b="0" i="0" u="none" strike="noStrike" cap="none" normalizeH="0" baseline="0" dirty="0">
+              <a:rPr kumimoji="0" lang="en-US" altLang="en-US" sz="1600" b="0" i="0" u="none" strike="noStrike" cap="none" normalizeH="0" baseline="0" dirty="0">
                 <a:ln>
                   <a:noFill/>
                 </a:ln>
@@ -12358,7 +12345,7 @@
               <a:t>, </a:t>
             </a:r>
             <a:r>
-              <a:rPr kumimoji="0" lang="en-US" altLang="en-US" sz="1400" b="1" i="0" u="none" strike="noStrike" cap="none" normalizeH="0" baseline="0" dirty="0">
+              <a:rPr kumimoji="0" lang="en-US" altLang="en-US" sz="1600" b="1" i="0" u="none" strike="noStrike" cap="none" normalizeH="0" baseline="0" dirty="0">
                 <a:ln>
                   <a:noFill/>
                 </a:ln>
@@ -12371,7 +12358,7 @@
               <a:t>int </a:t>
             </a:r>
             <a:r>
-              <a:rPr kumimoji="0" lang="en-US" altLang="en-US" sz="1400" b="0" i="0" u="none" strike="noStrike" cap="none" normalizeH="0" baseline="0" dirty="0">
+              <a:rPr kumimoji="0" lang="en-US" altLang="en-US" sz="1600" b="0" i="0" u="none" strike="noStrike" cap="none" normalizeH="0" baseline="0" dirty="0">
                 <a:ln>
                   <a:noFill/>
                 </a:ln>
@@ -12384,7 +12371,7 @@
               <a:t>w, </a:t>
             </a:r>
             <a:r>
-              <a:rPr kumimoji="0" lang="en-US" altLang="en-US" sz="1400" b="1" i="0" u="none" strike="noStrike" cap="none" normalizeH="0" baseline="0" dirty="0">
+              <a:rPr kumimoji="0" lang="en-US" altLang="en-US" sz="1600" b="1" i="0" u="none" strike="noStrike" cap="none" normalizeH="0" baseline="0" dirty="0">
                 <a:ln>
                   <a:noFill/>
                 </a:ln>
@@ -12397,7 +12384,7 @@
               <a:t>int </a:t>
             </a:r>
             <a:r>
-              <a:rPr kumimoji="0" lang="en-US" altLang="en-US" sz="1400" b="0" i="0" u="none" strike="noStrike" cap="none" normalizeH="0" baseline="0" dirty="0">
+              <a:rPr kumimoji="0" lang="en-US" altLang="en-US" sz="1600" b="0" i="0" u="none" strike="noStrike" cap="none" normalizeH="0" baseline="0" dirty="0">
                 <a:ln>
                   <a:noFill/>
                 </a:ln>
@@ -12410,7 +12397,7 @@
               <a:t>l) {</a:t>
             </a:r>
             <a:br>
-              <a:rPr kumimoji="0" lang="en-US" altLang="en-US" sz="1400" b="0" i="0" u="none" strike="noStrike" cap="none" normalizeH="0" baseline="0" dirty="0">
+              <a:rPr kumimoji="0" lang="en-US" altLang="en-US" sz="1600" b="0" i="0" u="none" strike="noStrike" cap="none" normalizeH="0" baseline="0" dirty="0">
                 <a:ln>
                   <a:noFill/>
                 </a:ln>
@@ -12422,7 +12409,7 @@
               </a:rPr>
             </a:br>
             <a:r>
-              <a:rPr kumimoji="0" lang="en-US" altLang="en-US" sz="1400" b="0" i="0" u="none" strike="noStrike" cap="none" normalizeH="0" baseline="0" dirty="0">
+              <a:rPr kumimoji="0" lang="en-US" altLang="en-US" sz="1600" b="0" i="0" u="none" strike="noStrike" cap="none" normalizeH="0" baseline="0" dirty="0">
                 <a:ln>
                   <a:noFill/>
                 </a:ln>
@@ -12435,7 +12422,7 @@
               <a:t>        </a:t>
             </a:r>
             <a:r>
-              <a:rPr kumimoji="0" lang="en-US" altLang="en-US" sz="1400" b="0" i="0" u="none" strike="noStrike" cap="none" normalizeH="0" baseline="0" dirty="0" err="1">
+              <a:rPr kumimoji="0" lang="en-US" altLang="en-US" sz="1600" b="0" i="0" u="none" strike="noStrike" cap="none" normalizeH="0" baseline="0" dirty="0" err="1">
                 <a:ln>
                   <a:noFill/>
                 </a:ln>
@@ -12448,7 +12435,7 @@
               <a:t>rectangle.setLength</a:t>
             </a:r>
             <a:r>
-              <a:rPr kumimoji="0" lang="en-US" altLang="en-US" sz="1400" b="0" i="0" u="none" strike="noStrike" cap="none" normalizeH="0" baseline="0" dirty="0">
+              <a:rPr kumimoji="0" lang="en-US" altLang="en-US" sz="1600" b="0" i="0" u="none" strike="noStrike" cap="none" normalizeH="0" baseline="0" dirty="0">
                 <a:ln>
                   <a:noFill/>
                 </a:ln>
@@ -12461,7 +12448,7 @@
               <a:t>(</a:t>
             </a:r>
             <a:r>
-              <a:rPr kumimoji="0" lang="en-US" altLang="en-US" sz="1400" b="0" i="0" u="none" strike="noStrike" cap="none" normalizeH="0" baseline="0" dirty="0" err="1">
+              <a:rPr kumimoji="0" lang="en-US" altLang="en-US" sz="1600" b="0" i="0" u="none" strike="noStrike" cap="none" normalizeH="0" baseline="0" dirty="0" err="1">
                 <a:ln>
                   <a:noFill/>
                 </a:ln>
@@ -12474,7 +12461,7 @@
               <a:t>rectangle.getLength</a:t>
             </a:r>
             <a:r>
-              <a:rPr kumimoji="0" lang="en-US" altLang="en-US" sz="1400" b="0" i="0" u="none" strike="noStrike" cap="none" normalizeH="0" baseline="0" dirty="0">
+              <a:rPr kumimoji="0" lang="en-US" altLang="en-US" sz="1600" b="0" i="0" u="none" strike="noStrike" cap="none" normalizeH="0" baseline="0" dirty="0">
                 <a:ln>
                   <a:noFill/>
                 </a:ln>
@@ -12487,7 +12474,7 @@
               <a:t>() / </a:t>
             </a:r>
             <a:r>
-              <a:rPr kumimoji="0" lang="en-US" altLang="en-US" sz="1400" b="0" i="0" u="none" strike="noStrike" cap="none" normalizeH="0" baseline="0" dirty="0">
+              <a:rPr kumimoji="0" lang="en-US" altLang="en-US" sz="1600" b="0" i="0" u="none" strike="noStrike" cap="none" normalizeH="0" baseline="0" dirty="0">
                 <a:ln>
                   <a:noFill/>
                 </a:ln>
@@ -12500,7 +12487,7 @@
               <a:t>2</a:t>
             </a:r>
             <a:r>
-              <a:rPr kumimoji="0" lang="en-US" altLang="en-US" sz="1400" b="0" i="0" u="none" strike="noStrike" cap="none" normalizeH="0" baseline="0" dirty="0">
+              <a:rPr kumimoji="0" lang="en-US" altLang="en-US" sz="1600" b="0" i="0" u="none" strike="noStrike" cap="none" normalizeH="0" baseline="0" dirty="0">
                 <a:ln>
                   <a:noFill/>
                 </a:ln>
@@ -12513,7 +12500,7 @@
               <a:t>);</a:t>
             </a:r>
             <a:br>
-              <a:rPr kumimoji="0" lang="en-US" altLang="en-US" sz="1400" b="0" i="0" u="none" strike="noStrike" cap="none" normalizeH="0" baseline="0" dirty="0">
+              <a:rPr kumimoji="0" lang="en-US" altLang="en-US" sz="1600" b="0" i="0" u="none" strike="noStrike" cap="none" normalizeH="0" baseline="0" dirty="0">
                 <a:ln>
                   <a:noFill/>
                 </a:ln>
@@ -12525,7 +12512,7 @@
               </a:rPr>
             </a:br>
             <a:r>
-              <a:rPr kumimoji="0" lang="en-US" altLang="en-US" sz="1400" b="0" i="0" u="none" strike="noStrike" cap="none" normalizeH="0" baseline="0" dirty="0">
+              <a:rPr kumimoji="0" lang="en-US" altLang="en-US" sz="1600" b="0" i="0" u="none" strike="noStrike" cap="none" normalizeH="0" baseline="0" dirty="0">
                 <a:ln>
                   <a:noFill/>
                 </a:ln>
@@ -12538,7 +12525,7 @@
               <a:t>        </a:t>
             </a:r>
             <a:r>
-              <a:rPr kumimoji="0" lang="en-US" altLang="en-US" sz="1400" b="0" i="0" u="none" strike="noStrike" cap="none" normalizeH="0" baseline="0" dirty="0" err="1">
+              <a:rPr kumimoji="0" lang="en-US" altLang="en-US" sz="1600" b="0" i="0" u="none" strike="noStrike" cap="none" normalizeH="0" baseline="0" dirty="0" err="1">
                 <a:ln>
                   <a:noFill/>
                 </a:ln>
@@ -12551,7 +12538,7 @@
               <a:t>rectangle.setWidth</a:t>
             </a:r>
             <a:r>
-              <a:rPr kumimoji="0" lang="en-US" altLang="en-US" sz="1400" b="0" i="0" u="none" strike="noStrike" cap="none" normalizeH="0" baseline="0" dirty="0">
+              <a:rPr kumimoji="0" lang="en-US" altLang="en-US" sz="1600" b="0" i="0" u="none" strike="noStrike" cap="none" normalizeH="0" baseline="0" dirty="0">
                 <a:ln>
                   <a:noFill/>
                 </a:ln>
@@ -12564,7 +12551,7 @@
               <a:t>(</a:t>
             </a:r>
             <a:r>
-              <a:rPr kumimoji="0" lang="en-US" altLang="en-US" sz="1400" b="0" i="0" u="none" strike="noStrike" cap="none" normalizeH="0" baseline="0" dirty="0" err="1">
+              <a:rPr kumimoji="0" lang="en-US" altLang="en-US" sz="1600" b="0" i="0" u="none" strike="noStrike" cap="none" normalizeH="0" baseline="0" dirty="0" err="1">
                 <a:ln>
                   <a:noFill/>
                 </a:ln>
@@ -12577,7 +12564,7 @@
               <a:t>rectangle.getWidth</a:t>
             </a:r>
             <a:r>
-              <a:rPr kumimoji="0" lang="en-US" altLang="en-US" sz="1400" b="0" i="0" u="none" strike="noStrike" cap="none" normalizeH="0" baseline="0" dirty="0">
+              <a:rPr kumimoji="0" lang="en-US" altLang="en-US" sz="1600" b="0" i="0" u="none" strike="noStrike" cap="none" normalizeH="0" baseline="0" dirty="0">
                 <a:ln>
                   <a:noFill/>
                 </a:ln>
@@ -12590,7 +12577,7 @@
               <a:t>() * </a:t>
             </a:r>
             <a:r>
-              <a:rPr kumimoji="0" lang="en-US" altLang="en-US" sz="1400" b="0" i="0" u="none" strike="noStrike" cap="none" normalizeH="0" baseline="0" dirty="0">
+              <a:rPr kumimoji="0" lang="en-US" altLang="en-US" sz="1600" b="0" i="0" u="none" strike="noStrike" cap="none" normalizeH="0" baseline="0" dirty="0">
                 <a:ln>
                   <a:noFill/>
                 </a:ln>
@@ -12603,7 +12590,7 @@
               <a:t>3 </a:t>
             </a:r>
             <a:r>
-              <a:rPr kumimoji="0" lang="en-US" altLang="en-US" sz="1400" b="0" i="0" u="none" strike="noStrike" cap="none" normalizeH="0" baseline="0" dirty="0">
+              <a:rPr kumimoji="0" lang="en-US" altLang="en-US" sz="1600" b="0" i="0" u="none" strike="noStrike" cap="none" normalizeH="0" baseline="0" dirty="0">
                 <a:ln>
                   <a:noFill/>
                 </a:ln>
@@ -12616,7 +12603,7 @@
               <a:t>+ </a:t>
             </a:r>
             <a:r>
-              <a:rPr kumimoji="0" lang="en-US" altLang="en-US" sz="1400" b="0" i="0" u="none" strike="noStrike" cap="none" normalizeH="0" baseline="0" dirty="0">
+              <a:rPr kumimoji="0" lang="en-US" altLang="en-US" sz="1600" b="0" i="0" u="none" strike="noStrike" cap="none" normalizeH="0" baseline="0" dirty="0">
                 <a:ln>
                   <a:noFill/>
                 </a:ln>
@@ -12629,7 +12616,7 @@
               <a:t>1 </a:t>
             </a:r>
             <a:r>
-              <a:rPr kumimoji="0" lang="en-US" altLang="en-US" sz="1400" b="0" i="0" u="none" strike="noStrike" cap="none" normalizeH="0" baseline="0" dirty="0">
+              <a:rPr kumimoji="0" lang="en-US" altLang="en-US" sz="1600" b="0" i="0" u="none" strike="noStrike" cap="none" normalizeH="0" baseline="0" dirty="0">
                 <a:ln>
                   <a:noFill/>
                 </a:ln>
@@ -12642,7 +12629,7 @@
               <a:t>);</a:t>
             </a:r>
             <a:br>
-              <a:rPr kumimoji="0" lang="en-US" altLang="en-US" sz="1400" b="0" i="0" u="none" strike="noStrike" cap="none" normalizeH="0" baseline="0" dirty="0">
+              <a:rPr kumimoji="0" lang="en-US" altLang="en-US" sz="1600" b="0" i="0" u="none" strike="noStrike" cap="none" normalizeH="0" baseline="0" dirty="0">
                 <a:ln>
                   <a:noFill/>
                 </a:ln>
@@ -12654,7 +12641,7 @@
               </a:rPr>
             </a:br>
             <a:r>
-              <a:rPr kumimoji="0" lang="en-US" altLang="en-US" sz="1400" b="0" i="0" u="none" strike="noStrike" cap="none" normalizeH="0" baseline="0" dirty="0">
+              <a:rPr kumimoji="0" lang="en-US" altLang="en-US" sz="1600" b="0" i="0" u="none" strike="noStrike" cap="none" normalizeH="0" baseline="0" dirty="0">
                 <a:ln>
                   <a:noFill/>
                 </a:ln>
@@ -12667,7 +12654,7 @@
               <a:t>        w = w * </a:t>
             </a:r>
             <a:r>
-              <a:rPr kumimoji="0" lang="en-US" altLang="en-US" sz="1400" b="0" i="0" u="none" strike="noStrike" cap="none" normalizeH="0" baseline="0" dirty="0">
+              <a:rPr kumimoji="0" lang="en-US" altLang="en-US" sz="1600" b="0" i="0" u="none" strike="noStrike" cap="none" normalizeH="0" baseline="0" dirty="0">
                 <a:ln>
                   <a:noFill/>
                 </a:ln>
@@ -12680,7 +12667,7 @@
               <a:t>3 </a:t>
             </a:r>
             <a:r>
-              <a:rPr kumimoji="0" lang="en-US" altLang="en-US" sz="1400" b="0" i="0" u="none" strike="noStrike" cap="none" normalizeH="0" baseline="0" dirty="0">
+              <a:rPr kumimoji="0" lang="en-US" altLang="en-US" sz="1600" b="0" i="0" u="none" strike="noStrike" cap="none" normalizeH="0" baseline="0" dirty="0">
                 <a:ln>
                   <a:noFill/>
                 </a:ln>
@@ -12693,7 +12680,7 @@
               <a:t>+ </a:t>
             </a:r>
             <a:r>
-              <a:rPr kumimoji="0" lang="en-US" altLang="en-US" sz="1400" b="0" i="0" u="none" strike="noStrike" cap="none" normalizeH="0" baseline="0" dirty="0">
+              <a:rPr kumimoji="0" lang="en-US" altLang="en-US" sz="1600" b="0" i="0" u="none" strike="noStrike" cap="none" normalizeH="0" baseline="0" dirty="0">
                 <a:ln>
                   <a:noFill/>
                 </a:ln>
@@ -12706,7 +12693,7 @@
               <a:t>1</a:t>
             </a:r>
             <a:r>
-              <a:rPr kumimoji="0" lang="en-US" altLang="en-US" sz="1400" b="0" i="0" u="none" strike="noStrike" cap="none" normalizeH="0" baseline="0" dirty="0">
+              <a:rPr kumimoji="0" lang="en-US" altLang="en-US" sz="1600" b="0" i="0" u="none" strike="noStrike" cap="none" normalizeH="0" baseline="0" dirty="0">
                 <a:ln>
                   <a:noFill/>
                 </a:ln>
@@ -12719,7 +12706,7 @@
               <a:t>;</a:t>
             </a:r>
             <a:br>
-              <a:rPr kumimoji="0" lang="en-US" altLang="en-US" sz="1400" b="0" i="0" u="none" strike="noStrike" cap="none" normalizeH="0" baseline="0" dirty="0">
+              <a:rPr kumimoji="0" lang="en-US" altLang="en-US" sz="1600" b="0" i="0" u="none" strike="noStrike" cap="none" normalizeH="0" baseline="0" dirty="0">
                 <a:ln>
                   <a:noFill/>
                 </a:ln>
@@ -12731,7 +12718,7 @@
               </a:rPr>
             </a:br>
             <a:r>
-              <a:rPr kumimoji="0" lang="en-US" altLang="en-US" sz="1400" b="0" i="0" u="none" strike="noStrike" cap="none" normalizeH="0" baseline="0" dirty="0">
+              <a:rPr kumimoji="0" lang="en-US" altLang="en-US" sz="1600" b="0" i="0" u="none" strike="noStrike" cap="none" normalizeH="0" baseline="0" dirty="0">
                 <a:ln>
                   <a:noFill/>
                 </a:ln>
@@ -12744,7 +12731,7 @@
               <a:t>        l = l  / </a:t>
             </a:r>
             <a:r>
-              <a:rPr kumimoji="0" lang="en-US" altLang="en-US" sz="1400" b="0" i="0" u="none" strike="noStrike" cap="none" normalizeH="0" baseline="0" dirty="0">
+              <a:rPr kumimoji="0" lang="en-US" altLang="en-US" sz="1600" b="0" i="0" u="none" strike="noStrike" cap="none" normalizeH="0" baseline="0" dirty="0">
                 <a:ln>
                   <a:noFill/>
                 </a:ln>
@@ -12757,7 +12744,7 @@
               <a:t>2</a:t>
             </a:r>
             <a:r>
-              <a:rPr kumimoji="0" lang="en-US" altLang="en-US" sz="1400" b="0" i="0" u="none" strike="noStrike" cap="none" normalizeH="0" baseline="0" dirty="0">
+              <a:rPr kumimoji="0" lang="en-US" altLang="en-US" sz="1600" b="0" i="0" u="none" strike="noStrike" cap="none" normalizeH="0" baseline="0" dirty="0">
                 <a:ln>
                   <a:noFill/>
                 </a:ln>
@@ -12770,7 +12757,7 @@
               <a:t>;</a:t>
             </a:r>
             <a:br>
-              <a:rPr kumimoji="0" lang="en-US" altLang="en-US" sz="1400" b="0" i="0" u="none" strike="noStrike" cap="none" normalizeH="0" baseline="0" dirty="0">
+              <a:rPr kumimoji="0" lang="en-US" altLang="en-US" sz="1600" b="0" i="0" u="none" strike="noStrike" cap="none" normalizeH="0" baseline="0" dirty="0">
                 <a:ln>
                   <a:noFill/>
                 </a:ln>
@@ -12782,7 +12769,7 @@
               </a:rPr>
             </a:br>
             <a:r>
-              <a:rPr kumimoji="0" lang="en-US" altLang="en-US" sz="1400" b="0" i="0" u="none" strike="noStrike" cap="none" normalizeH="0" baseline="0" dirty="0">
+              <a:rPr kumimoji="0" lang="en-US" altLang="en-US" sz="1600" b="0" i="0" u="none" strike="noStrike" cap="none" normalizeH="0" baseline="0" dirty="0">
                 <a:ln>
                   <a:noFill/>
                 </a:ln>
@@ -12795,7 +12782,7 @@
               <a:t>    }</a:t>
             </a:r>
             <a:br>
-              <a:rPr kumimoji="0" lang="en-US" altLang="en-US" sz="1400" b="0" i="0" u="none" strike="noStrike" cap="none" normalizeH="0" baseline="0" dirty="0">
+              <a:rPr kumimoji="0" lang="en-US" altLang="en-US" sz="1600" b="0" i="0" u="none" strike="noStrike" cap="none" normalizeH="0" baseline="0" dirty="0">
                 <a:ln>
                   <a:noFill/>
                 </a:ln>
@@ -12807,7 +12794,7 @@
               </a:rPr>
             </a:br>
             <a:r>
-              <a:rPr kumimoji="0" lang="en-US" altLang="en-US" sz="1400" b="0" i="0" u="none" strike="noStrike" cap="none" normalizeH="0" baseline="0" dirty="0">
+              <a:rPr kumimoji="0" lang="en-US" altLang="en-US" sz="1600" b="0" i="0" u="none" strike="noStrike" cap="none" normalizeH="0" baseline="0" dirty="0">
                 <a:ln>
                   <a:noFill/>
                 </a:ln>
@@ -12820,7 +12807,7 @@
               <a:t>    </a:t>
             </a:r>
             <a:r>
-              <a:rPr kumimoji="0" lang="en-US" altLang="en-US" sz="1400" b="1" i="0" u="none" strike="noStrike" cap="none" normalizeH="0" baseline="0" dirty="0">
+              <a:rPr kumimoji="0" lang="en-US" altLang="en-US" sz="1600" b="1" i="0" u="none" strike="noStrike" cap="none" normalizeH="0" baseline="0" dirty="0">
                 <a:ln>
                   <a:noFill/>
                 </a:ln>
@@ -12833,7 +12820,7 @@
               <a:t>public static void </a:t>
             </a:r>
             <a:r>
-              <a:rPr kumimoji="0" lang="en-US" altLang="en-US" sz="1400" b="0" i="0" u="none" strike="noStrike" cap="none" normalizeH="0" baseline="0" dirty="0" err="1">
+              <a:rPr kumimoji="0" lang="en-US" altLang="en-US" sz="1600" b="0" i="0" u="none" strike="noStrike" cap="none" normalizeH="0" baseline="0" dirty="0" err="1">
                 <a:ln>
                   <a:noFill/>
                 </a:ln>
@@ -12846,7 +12833,7 @@
               <a:t>printValues</a:t>
             </a:r>
             <a:r>
-              <a:rPr kumimoji="0" lang="en-US" altLang="en-US" sz="1400" b="0" i="0" u="none" strike="noStrike" cap="none" normalizeH="0" baseline="0" dirty="0">
+              <a:rPr kumimoji="0" lang="en-US" altLang="en-US" sz="1600" b="0" i="0" u="none" strike="noStrike" cap="none" normalizeH="0" baseline="0" dirty="0">
                 <a:ln>
                   <a:noFill/>
                 </a:ln>
@@ -12859,7 +12846,7 @@
               <a:t>(Rectangle </a:t>
             </a:r>
             <a:r>
-              <a:rPr kumimoji="0" lang="en-US" altLang="en-US" sz="1400" b="0" i="0" u="none" strike="noStrike" cap="none" normalizeH="0" baseline="0" dirty="0" err="1">
+              <a:rPr kumimoji="0" lang="en-US" altLang="en-US" sz="1600" b="0" i="0" u="none" strike="noStrike" cap="none" normalizeH="0" baseline="0" dirty="0" err="1">
                 <a:ln>
                   <a:noFill/>
                 </a:ln>
@@ -12872,7 +12859,7 @@
               <a:t>rectangle</a:t>
             </a:r>
             <a:r>
-              <a:rPr kumimoji="0" lang="en-US" altLang="en-US" sz="1400" b="0" i="0" u="none" strike="noStrike" cap="none" normalizeH="0" baseline="0" dirty="0">
+              <a:rPr kumimoji="0" lang="en-US" altLang="en-US" sz="1600" b="0" i="0" u="none" strike="noStrike" cap="none" normalizeH="0" baseline="0" dirty="0">
                 <a:ln>
                   <a:noFill/>
                 </a:ln>
@@ -12885,7 +12872,7 @@
               <a:t>, </a:t>
             </a:r>
             <a:r>
-              <a:rPr kumimoji="0" lang="en-US" altLang="en-US" sz="1400" b="1" i="0" u="none" strike="noStrike" cap="none" normalizeH="0" baseline="0" dirty="0">
+              <a:rPr kumimoji="0" lang="en-US" altLang="en-US" sz="1600" b="1" i="0" u="none" strike="noStrike" cap="none" normalizeH="0" baseline="0" dirty="0">
                 <a:ln>
                   <a:noFill/>
                 </a:ln>
@@ -12898,7 +12885,7 @@
               <a:t>int </a:t>
             </a:r>
             <a:r>
-              <a:rPr kumimoji="0" lang="en-US" altLang="en-US" sz="1400" b="0" i="0" u="none" strike="noStrike" cap="none" normalizeH="0" baseline="0" dirty="0">
+              <a:rPr kumimoji="0" lang="en-US" altLang="en-US" sz="1600" b="0" i="0" u="none" strike="noStrike" cap="none" normalizeH="0" baseline="0" dirty="0">
                 <a:ln>
                   <a:noFill/>
                 </a:ln>
@@ -12911,7 +12898,7 @@
               <a:t>w, </a:t>
             </a:r>
             <a:r>
-              <a:rPr kumimoji="0" lang="en-US" altLang="en-US" sz="1400" b="1" i="0" u="none" strike="noStrike" cap="none" normalizeH="0" baseline="0" dirty="0">
+              <a:rPr kumimoji="0" lang="en-US" altLang="en-US" sz="1600" b="1" i="0" u="none" strike="noStrike" cap="none" normalizeH="0" baseline="0" dirty="0">
                 <a:ln>
                   <a:noFill/>
                 </a:ln>
@@ -12924,7 +12911,7 @@
               <a:t>int </a:t>
             </a:r>
             <a:r>
-              <a:rPr kumimoji="0" lang="en-US" altLang="en-US" sz="1400" b="0" i="0" u="none" strike="noStrike" cap="none" normalizeH="0" baseline="0" dirty="0">
+              <a:rPr kumimoji="0" lang="en-US" altLang="en-US" sz="1600" b="0" i="0" u="none" strike="noStrike" cap="none" normalizeH="0" baseline="0" dirty="0">
                 <a:ln>
                   <a:noFill/>
                 </a:ln>
@@ -12937,7 +12924,7 @@
               <a:t>l) {</a:t>
             </a:r>
             <a:br>
-              <a:rPr kumimoji="0" lang="en-US" altLang="en-US" sz="1400" b="0" i="0" u="none" strike="noStrike" cap="none" normalizeH="0" baseline="0" dirty="0">
+              <a:rPr kumimoji="0" lang="en-US" altLang="en-US" sz="1600" b="0" i="0" u="none" strike="noStrike" cap="none" normalizeH="0" baseline="0" dirty="0">
                 <a:ln>
                   <a:noFill/>
                 </a:ln>
@@ -12949,7 +12936,7 @@
               </a:rPr>
             </a:br>
             <a:r>
-              <a:rPr kumimoji="0" lang="en-US" altLang="en-US" sz="1400" b="0" i="0" u="none" strike="noStrike" cap="none" normalizeH="0" baseline="0" dirty="0">
+              <a:rPr kumimoji="0" lang="en-US" altLang="en-US" sz="1600" b="0" i="0" u="none" strike="noStrike" cap="none" normalizeH="0" baseline="0" dirty="0">
                 <a:ln>
                   <a:noFill/>
                 </a:ln>
@@ -12962,7 +12949,7 @@
               <a:t>        </a:t>
             </a:r>
             <a:r>
-              <a:rPr kumimoji="0" lang="en-US" altLang="en-US" sz="1400" b="0" i="0" u="none" strike="noStrike" cap="none" normalizeH="0" baseline="0" dirty="0" err="1">
+              <a:rPr kumimoji="0" lang="en-US" altLang="en-US" sz="1600" b="0" i="0" u="none" strike="noStrike" cap="none" normalizeH="0" baseline="0" dirty="0" err="1">
                 <a:ln>
                   <a:noFill/>
                 </a:ln>
@@ -12975,7 +12962,7 @@
               <a:t>System.</a:t>
             </a:r>
             <a:r>
-              <a:rPr kumimoji="0" lang="en-US" altLang="en-US" sz="1400" b="1" i="1" u="none" strike="noStrike" cap="none" normalizeH="0" baseline="0" dirty="0" err="1">
+              <a:rPr kumimoji="0" lang="en-US" altLang="en-US" sz="1600" b="1" i="1" u="none" strike="noStrike" cap="none" normalizeH="0" baseline="0" dirty="0" err="1">
                 <a:ln>
                   <a:noFill/>
                 </a:ln>
@@ -12988,7 +12975,7 @@
               <a:t>out</a:t>
             </a:r>
             <a:r>
-              <a:rPr kumimoji="0" lang="en-US" altLang="en-US" sz="1400" b="0" i="0" u="none" strike="noStrike" cap="none" normalizeH="0" baseline="0" dirty="0" err="1">
+              <a:rPr kumimoji="0" lang="en-US" altLang="en-US" sz="1600" b="0" i="0" u="none" strike="noStrike" cap="none" normalizeH="0" baseline="0" dirty="0" err="1">
                 <a:ln>
                   <a:noFill/>
                 </a:ln>
@@ -13001,7 +12988,7 @@
               <a:t>.printf</a:t>
             </a:r>
             <a:r>
-              <a:rPr kumimoji="0" lang="en-US" altLang="en-US" sz="1400" b="0" i="0" u="none" strike="noStrike" cap="none" normalizeH="0" baseline="0" dirty="0">
+              <a:rPr kumimoji="0" lang="en-US" altLang="en-US" sz="1600" b="0" i="0" u="none" strike="noStrike" cap="none" normalizeH="0" baseline="0" dirty="0">
                 <a:ln>
                   <a:noFill/>
                 </a:ln>
@@ -13014,7 +13001,7 @@
               <a:t>(</a:t>
             </a:r>
             <a:r>
-              <a:rPr kumimoji="0" lang="en-US" altLang="en-US" sz="1400" b="1" i="0" u="none" strike="noStrike" cap="none" normalizeH="0" baseline="0" dirty="0">
+              <a:rPr kumimoji="0" lang="en-US" altLang="en-US" sz="1600" b="1" i="0" u="none" strike="noStrike" cap="none" normalizeH="0" baseline="0" dirty="0">
                 <a:ln>
                   <a:noFill/>
                 </a:ln>
@@ -13027,7 +13014,7 @@
               <a:t>"Rectangle: Width %d, Length: %d, Area: %</a:t>
             </a:r>
             <a:r>
-              <a:rPr kumimoji="0" lang="en-US" altLang="en-US" sz="1400" b="1" i="0" u="none" strike="noStrike" cap="none" normalizeH="0" baseline="0" dirty="0" err="1">
+              <a:rPr kumimoji="0" lang="en-US" altLang="en-US" sz="1600" b="1" i="0" u="none" strike="noStrike" cap="none" normalizeH="0" baseline="0" dirty="0" err="1">
                 <a:ln>
                   <a:noFill/>
                 </a:ln>
@@ -13040,7 +13027,7 @@
               <a:t>d%n</a:t>
             </a:r>
             <a:r>
-              <a:rPr kumimoji="0" lang="en-US" altLang="en-US" sz="1400" b="1" i="0" u="none" strike="noStrike" cap="none" normalizeH="0" baseline="0" dirty="0">
+              <a:rPr kumimoji="0" lang="en-US" altLang="en-US" sz="1600" b="1" i="0" u="none" strike="noStrike" cap="none" normalizeH="0" baseline="0" dirty="0">
                 <a:ln>
                   <a:noFill/>
                 </a:ln>
@@ -13053,7 +13040,7 @@
               <a:t>"</a:t>
             </a:r>
             <a:r>
-              <a:rPr kumimoji="0" lang="en-US" altLang="en-US" sz="1400" b="0" i="0" u="none" strike="noStrike" cap="none" normalizeH="0" baseline="0" dirty="0">
+              <a:rPr kumimoji="0" lang="en-US" altLang="en-US" sz="1600" b="0" i="0" u="none" strike="noStrike" cap="none" normalizeH="0" baseline="0" dirty="0">
                 <a:ln>
                   <a:noFill/>
                 </a:ln>
@@ -13066,7 +13053,7 @@
               <a:t>,</a:t>
             </a:r>
             <a:br>
-              <a:rPr kumimoji="0" lang="en-US" altLang="en-US" sz="1400" b="0" i="0" u="none" strike="noStrike" cap="none" normalizeH="0" baseline="0" dirty="0">
+              <a:rPr kumimoji="0" lang="en-US" altLang="en-US" sz="1600" b="0" i="0" u="none" strike="noStrike" cap="none" normalizeH="0" baseline="0" dirty="0">
                 <a:ln>
                   <a:noFill/>
                 </a:ln>
@@ -13078,7 +13065,7 @@
               </a:rPr>
             </a:br>
             <a:r>
-              <a:rPr kumimoji="0" lang="en-US" altLang="en-US" sz="1400" b="0" i="0" u="none" strike="noStrike" cap="none" normalizeH="0" baseline="0" dirty="0">
+              <a:rPr kumimoji="0" lang="en-US" altLang="en-US" sz="1600" b="0" i="0" u="none" strike="noStrike" cap="none" normalizeH="0" baseline="0" dirty="0">
                 <a:ln>
                   <a:noFill/>
                 </a:ln>
@@ -13091,7 +13078,7 @@
               <a:t>                </a:t>
             </a:r>
             <a:r>
-              <a:rPr kumimoji="0" lang="en-US" altLang="en-US" sz="1400" b="0" i="0" u="none" strike="noStrike" cap="none" normalizeH="0" baseline="0" dirty="0" err="1">
+              <a:rPr kumimoji="0" lang="en-US" altLang="en-US" sz="1600" b="0" i="0" u="none" strike="noStrike" cap="none" normalizeH="0" baseline="0" dirty="0" err="1">
                 <a:ln>
                   <a:noFill/>
                 </a:ln>
@@ -13104,7 +13091,7 @@
               <a:t>rectangle.getWidth</a:t>
             </a:r>
             <a:r>
-              <a:rPr kumimoji="0" lang="en-US" altLang="en-US" sz="1400" b="0" i="0" u="none" strike="noStrike" cap="none" normalizeH="0" baseline="0" dirty="0">
+              <a:rPr kumimoji="0" lang="en-US" altLang="en-US" sz="1600" b="0" i="0" u="none" strike="noStrike" cap="none" normalizeH="0" baseline="0" dirty="0">
                 <a:ln>
                   <a:noFill/>
                 </a:ln>
@@ -13117,7 +13104,7 @@
               <a:t>(), </a:t>
             </a:r>
             <a:r>
-              <a:rPr kumimoji="0" lang="en-US" altLang="en-US" sz="1400" b="0" i="0" u="none" strike="noStrike" cap="none" normalizeH="0" baseline="0" dirty="0" err="1">
+              <a:rPr kumimoji="0" lang="en-US" altLang="en-US" sz="1600" b="0" i="0" u="none" strike="noStrike" cap="none" normalizeH="0" baseline="0" dirty="0" err="1">
                 <a:ln>
                   <a:noFill/>
                 </a:ln>
@@ -13130,7 +13117,7 @@
               <a:t>rectangle.getLength</a:t>
             </a:r>
             <a:r>
-              <a:rPr kumimoji="0" lang="en-US" altLang="en-US" sz="1400" b="0" i="0" u="none" strike="noStrike" cap="none" normalizeH="0" baseline="0" dirty="0">
+              <a:rPr kumimoji="0" lang="en-US" altLang="en-US" sz="1600" b="0" i="0" u="none" strike="noStrike" cap="none" normalizeH="0" baseline="0" dirty="0">
                 <a:ln>
                   <a:noFill/>
                 </a:ln>
@@ -13143,7 +13130,7 @@
               <a:t>(), </a:t>
             </a:r>
             <a:r>
-              <a:rPr kumimoji="0" lang="en-US" altLang="en-US" sz="1400" b="0" i="0" u="none" strike="noStrike" cap="none" normalizeH="0" baseline="0" dirty="0" err="1">
+              <a:rPr kumimoji="0" lang="en-US" altLang="en-US" sz="1600" b="0" i="0" u="none" strike="noStrike" cap="none" normalizeH="0" baseline="0" dirty="0" err="1">
                 <a:ln>
                   <a:noFill/>
                 </a:ln>
@@ -13156,7 +13143,7 @@
               <a:t>rectangle.getArea</a:t>
             </a:r>
             <a:r>
-              <a:rPr kumimoji="0" lang="en-US" altLang="en-US" sz="1400" b="0" i="0" u="none" strike="noStrike" cap="none" normalizeH="0" baseline="0" dirty="0">
+              <a:rPr kumimoji="0" lang="en-US" altLang="en-US" sz="1600" b="0" i="0" u="none" strike="noStrike" cap="none" normalizeH="0" baseline="0" dirty="0">
                 <a:ln>
                   <a:noFill/>
                 </a:ln>
@@ -13169,7 +13156,7 @@
               <a:t>());</a:t>
             </a:r>
             <a:br>
-              <a:rPr kumimoji="0" lang="en-US" altLang="en-US" sz="1400" b="0" i="0" u="none" strike="noStrike" cap="none" normalizeH="0" baseline="0" dirty="0">
+              <a:rPr kumimoji="0" lang="en-US" altLang="en-US" sz="1600" b="0" i="0" u="none" strike="noStrike" cap="none" normalizeH="0" baseline="0" dirty="0">
                 <a:ln>
                   <a:noFill/>
                 </a:ln>
@@ -13181,7 +13168,7 @@
               </a:rPr>
             </a:br>
             <a:r>
-              <a:rPr kumimoji="0" lang="en-US" altLang="en-US" sz="1400" b="0" i="0" u="none" strike="noStrike" cap="none" normalizeH="0" baseline="0" dirty="0">
+              <a:rPr kumimoji="0" lang="en-US" altLang="en-US" sz="1600" b="0" i="0" u="none" strike="noStrike" cap="none" normalizeH="0" baseline="0" dirty="0">
                 <a:ln>
                   <a:noFill/>
                 </a:ln>
@@ -13194,7 +13181,7 @@
               <a:t>        </a:t>
             </a:r>
             <a:r>
-              <a:rPr kumimoji="0" lang="en-US" altLang="en-US" sz="1400" b="0" i="0" u="none" strike="noStrike" cap="none" normalizeH="0" baseline="0" dirty="0" err="1">
+              <a:rPr kumimoji="0" lang="en-US" altLang="en-US" sz="1600" b="0" i="0" u="none" strike="noStrike" cap="none" normalizeH="0" baseline="0" dirty="0" err="1">
                 <a:ln>
                   <a:noFill/>
                 </a:ln>
@@ -13207,7 +13194,7 @@
               <a:t>System.</a:t>
             </a:r>
             <a:r>
-              <a:rPr kumimoji="0" lang="en-US" altLang="en-US" sz="1400" b="1" i="1" u="none" strike="noStrike" cap="none" normalizeH="0" baseline="0" dirty="0" err="1">
+              <a:rPr kumimoji="0" lang="en-US" altLang="en-US" sz="1600" b="1" i="1" u="none" strike="noStrike" cap="none" normalizeH="0" baseline="0" dirty="0" err="1">
                 <a:ln>
                   <a:noFill/>
                 </a:ln>
@@ -13220,7 +13207,7 @@
               <a:t>out</a:t>
             </a:r>
             <a:r>
-              <a:rPr kumimoji="0" lang="en-US" altLang="en-US" sz="1400" b="0" i="0" u="none" strike="noStrike" cap="none" normalizeH="0" baseline="0" dirty="0" err="1">
+              <a:rPr kumimoji="0" lang="en-US" altLang="en-US" sz="1600" b="0" i="0" u="none" strike="noStrike" cap="none" normalizeH="0" baseline="0" dirty="0" err="1">
                 <a:ln>
                   <a:noFill/>
                 </a:ln>
@@ -13233,7 +13220,7 @@
               <a:t>.printf</a:t>
             </a:r>
             <a:r>
-              <a:rPr kumimoji="0" lang="en-US" altLang="en-US" sz="1400" b="0" i="0" u="none" strike="noStrike" cap="none" normalizeH="0" baseline="0" dirty="0">
+              <a:rPr kumimoji="0" lang="en-US" altLang="en-US" sz="1600" b="0" i="0" u="none" strike="noStrike" cap="none" normalizeH="0" baseline="0" dirty="0">
                 <a:ln>
                   <a:noFill/>
                 </a:ln>
@@ -13246,7 +13233,7 @@
               <a:t>(</a:t>
             </a:r>
             <a:r>
-              <a:rPr kumimoji="0" lang="en-US" altLang="en-US" sz="1400" b="1" i="0" u="none" strike="noStrike" cap="none" normalizeH="0" baseline="0" dirty="0">
+              <a:rPr kumimoji="0" lang="en-US" altLang="en-US" sz="1600" b="1" i="0" u="none" strike="noStrike" cap="none" normalizeH="0" baseline="0" dirty="0">
                 <a:ln>
                   <a:noFill/>
                 </a:ln>
@@ -13259,7 +13246,7 @@
               <a:t>"Values of w: %d, of l: %</a:t>
             </a:r>
             <a:r>
-              <a:rPr kumimoji="0" lang="en-US" altLang="en-US" sz="1400" b="1" i="0" u="none" strike="noStrike" cap="none" normalizeH="0" baseline="0" dirty="0" err="1">
+              <a:rPr kumimoji="0" lang="en-US" altLang="en-US" sz="1600" b="1" i="0" u="none" strike="noStrike" cap="none" normalizeH="0" baseline="0" dirty="0" err="1">
                 <a:ln>
                   <a:noFill/>
                 </a:ln>
@@ -13272,7 +13259,7 @@
               <a:t>d%n</a:t>
             </a:r>
             <a:r>
-              <a:rPr kumimoji="0" lang="en-US" altLang="en-US" sz="1400" b="1" i="0" u="none" strike="noStrike" cap="none" normalizeH="0" baseline="0" dirty="0">
+              <a:rPr kumimoji="0" lang="en-US" altLang="en-US" sz="1600" b="1" i="0" u="none" strike="noStrike" cap="none" normalizeH="0" baseline="0" dirty="0">
                 <a:ln>
                   <a:noFill/>
                 </a:ln>
@@ -13285,7 +13272,7 @@
               <a:t>"</a:t>
             </a:r>
             <a:r>
-              <a:rPr kumimoji="0" lang="en-US" altLang="en-US" sz="1400" b="0" i="0" u="none" strike="noStrike" cap="none" normalizeH="0" baseline="0" dirty="0">
+              <a:rPr kumimoji="0" lang="en-US" altLang="en-US" sz="1600" b="0" i="0" u="none" strike="noStrike" cap="none" normalizeH="0" baseline="0" dirty="0">
                 <a:ln>
                   <a:noFill/>
                 </a:ln>
@@ -13298,7 +13285,7 @@
               <a:t>, w, l);</a:t>
             </a:r>
             <a:br>
-              <a:rPr kumimoji="0" lang="en-US" altLang="en-US" sz="1400" b="0" i="0" u="none" strike="noStrike" cap="none" normalizeH="0" baseline="0" dirty="0">
+              <a:rPr kumimoji="0" lang="en-US" altLang="en-US" sz="1600" b="0" i="0" u="none" strike="noStrike" cap="none" normalizeH="0" baseline="0" dirty="0">
                 <a:ln>
                   <a:noFill/>
                 </a:ln>
@@ -13310,7 +13297,7 @@
               </a:rPr>
             </a:br>
             <a:r>
-              <a:rPr kumimoji="0" lang="en-US" altLang="en-US" sz="1400" b="0" i="0" u="none" strike="noStrike" cap="none" normalizeH="0" baseline="0" dirty="0">
+              <a:rPr kumimoji="0" lang="en-US" altLang="en-US" sz="1600" b="0" i="0" u="none" strike="noStrike" cap="none" normalizeH="0" baseline="0" dirty="0">
                 <a:ln>
                   <a:noFill/>
                 </a:ln>
@@ -13323,7 +13310,7 @@
               <a:t>        </a:t>
             </a:r>
             <a:r>
-              <a:rPr kumimoji="0" lang="en-US" altLang="en-US" sz="1400" b="0" i="0" u="none" strike="noStrike" cap="none" normalizeH="0" baseline="0" dirty="0" err="1">
+              <a:rPr kumimoji="0" lang="en-US" altLang="en-US" sz="1600" b="0" i="0" u="none" strike="noStrike" cap="none" normalizeH="0" baseline="0" dirty="0" err="1">
                 <a:ln>
                   <a:noFill/>
                 </a:ln>
@@ -13336,7 +13323,7 @@
               <a:t>System.</a:t>
             </a:r>
             <a:r>
-              <a:rPr kumimoji="0" lang="en-US" altLang="en-US" sz="1400" b="1" i="1" u="none" strike="noStrike" cap="none" normalizeH="0" baseline="0" dirty="0" err="1">
+              <a:rPr kumimoji="0" lang="en-US" altLang="en-US" sz="1600" b="1" i="1" u="none" strike="noStrike" cap="none" normalizeH="0" baseline="0" dirty="0" err="1">
                 <a:ln>
                   <a:noFill/>
                 </a:ln>
@@ -13349,7 +13336,7 @@
               <a:t>out</a:t>
             </a:r>
             <a:r>
-              <a:rPr kumimoji="0" lang="en-US" altLang="en-US" sz="1400" b="0" i="0" u="none" strike="noStrike" cap="none" normalizeH="0" baseline="0" dirty="0" err="1">
+              <a:rPr kumimoji="0" lang="en-US" altLang="en-US" sz="1600" b="0" i="0" u="none" strike="noStrike" cap="none" normalizeH="0" baseline="0" dirty="0" err="1">
                 <a:ln>
                   <a:noFill/>
                 </a:ln>
@@ -13362,7 +13349,7 @@
               <a:t>.printf</a:t>
             </a:r>
             <a:r>
-              <a:rPr kumimoji="0" lang="en-US" altLang="en-US" sz="1400" b="0" i="0" u="none" strike="noStrike" cap="none" normalizeH="0" baseline="0" dirty="0">
+              <a:rPr kumimoji="0" lang="en-US" altLang="en-US" sz="1600" b="0" i="0" u="none" strike="noStrike" cap="none" normalizeH="0" baseline="0" dirty="0">
                 <a:ln>
                   <a:noFill/>
                 </a:ln>
@@ -13375,7 +13362,7 @@
               <a:t>(</a:t>
             </a:r>
             <a:r>
-              <a:rPr kumimoji="0" lang="en-US" altLang="en-US" sz="1400" b="1" i="0" u="none" strike="noStrike" cap="none" normalizeH="0" baseline="0" dirty="0">
+              <a:rPr kumimoji="0" lang="en-US" altLang="en-US" sz="1600" b="1" i="0" u="none" strike="noStrike" cap="none" normalizeH="0" baseline="0" dirty="0">
                 <a:ln>
                   <a:noFill/>
                 </a:ln>
@@ -13388,7 +13375,7 @@
               <a:t>"Width == w? %b,  Length == l? %</a:t>
             </a:r>
             <a:r>
-              <a:rPr kumimoji="0" lang="en-US" altLang="en-US" sz="1400" b="1" i="0" u="none" strike="noStrike" cap="none" normalizeH="0" baseline="0" dirty="0" err="1">
+              <a:rPr kumimoji="0" lang="en-US" altLang="en-US" sz="1600" b="1" i="0" u="none" strike="noStrike" cap="none" normalizeH="0" baseline="0" dirty="0" err="1">
                 <a:ln>
                   <a:noFill/>
                 </a:ln>
@@ -13401,7 +13388,7 @@
               <a:t>b%n%n</a:t>
             </a:r>
             <a:r>
-              <a:rPr kumimoji="0" lang="en-US" altLang="en-US" sz="1400" b="1" i="0" u="none" strike="noStrike" cap="none" normalizeH="0" baseline="0" dirty="0">
+              <a:rPr kumimoji="0" lang="en-US" altLang="en-US" sz="1600" b="1" i="0" u="none" strike="noStrike" cap="none" normalizeH="0" baseline="0" dirty="0">
                 <a:ln>
                   <a:noFill/>
                 </a:ln>
@@ -13414,7 +13401,7 @@
               <a:t>"</a:t>
             </a:r>
             <a:r>
-              <a:rPr kumimoji="0" lang="en-US" altLang="en-US" sz="1400" b="0" i="0" u="none" strike="noStrike" cap="none" normalizeH="0" baseline="0" dirty="0">
+              <a:rPr kumimoji="0" lang="en-US" altLang="en-US" sz="1600" b="0" i="0" u="none" strike="noStrike" cap="none" normalizeH="0" baseline="0" dirty="0">
                 <a:ln>
                   <a:noFill/>
                 </a:ln>
@@ -13427,7 +13414,7 @@
               <a:t>,</a:t>
             </a:r>
             <a:br>
-              <a:rPr kumimoji="0" lang="en-US" altLang="en-US" sz="1400" b="0" i="0" u="none" strike="noStrike" cap="none" normalizeH="0" baseline="0" dirty="0">
+              <a:rPr kumimoji="0" lang="en-US" altLang="en-US" sz="1600" b="0" i="0" u="none" strike="noStrike" cap="none" normalizeH="0" baseline="0" dirty="0">
                 <a:ln>
                   <a:noFill/>
                 </a:ln>
@@ -13439,7 +13426,7 @@
               </a:rPr>
             </a:br>
             <a:r>
-              <a:rPr kumimoji="0" lang="en-US" altLang="en-US" sz="1400" b="0" i="0" u="none" strike="noStrike" cap="none" normalizeH="0" baseline="0" dirty="0">
+              <a:rPr kumimoji="0" lang="en-US" altLang="en-US" sz="1600" b="0" i="0" u="none" strike="noStrike" cap="none" normalizeH="0" baseline="0" dirty="0">
                 <a:ln>
                   <a:noFill/>
                 </a:ln>
@@ -13452,7 +13439,7 @@
               <a:t>                </a:t>
             </a:r>
             <a:r>
-              <a:rPr kumimoji="0" lang="en-US" altLang="en-US" sz="1400" b="0" i="0" u="none" strike="noStrike" cap="none" normalizeH="0" baseline="0" dirty="0" err="1">
+              <a:rPr kumimoji="0" lang="en-US" altLang="en-US" sz="1600" b="0" i="0" u="none" strike="noStrike" cap="none" normalizeH="0" baseline="0" dirty="0" err="1">
                 <a:ln>
                   <a:noFill/>
                 </a:ln>
@@ -13465,7 +13452,7 @@
               <a:t>rectangle.getWidth</a:t>
             </a:r>
             <a:r>
-              <a:rPr kumimoji="0" lang="en-US" altLang="en-US" sz="1400" b="0" i="0" u="none" strike="noStrike" cap="none" normalizeH="0" baseline="0" dirty="0">
+              <a:rPr kumimoji="0" lang="en-US" altLang="en-US" sz="1600" b="0" i="0" u="none" strike="noStrike" cap="none" normalizeH="0" baseline="0" dirty="0">
                 <a:ln>
                   <a:noFill/>
                 </a:ln>
@@ -13478,7 +13465,7 @@
               <a:t>() == w, </a:t>
             </a:r>
             <a:r>
-              <a:rPr kumimoji="0" lang="en-US" altLang="en-US" sz="1400" b="0" i="0" u="none" strike="noStrike" cap="none" normalizeH="0" baseline="0" dirty="0" err="1">
+              <a:rPr kumimoji="0" lang="en-US" altLang="en-US" sz="1600" b="0" i="0" u="none" strike="noStrike" cap="none" normalizeH="0" baseline="0" dirty="0" err="1">
                 <a:ln>
                   <a:noFill/>
                 </a:ln>
@@ -13491,7 +13478,7 @@
               <a:t>rectangle.getLength</a:t>
             </a:r>
             <a:r>
-              <a:rPr kumimoji="0" lang="en-US" altLang="en-US" sz="1400" b="0" i="0" u="none" strike="noStrike" cap="none" normalizeH="0" baseline="0" dirty="0">
+              <a:rPr kumimoji="0" lang="en-US" altLang="en-US" sz="1600" b="0" i="0" u="none" strike="noStrike" cap="none" normalizeH="0" baseline="0" dirty="0">
                 <a:ln>
                   <a:noFill/>
                 </a:ln>
@@ -13504,7 +13491,7 @@
               <a:t>()==l);</a:t>
             </a:r>
             <a:br>
-              <a:rPr kumimoji="0" lang="en-US" altLang="en-US" sz="1400" b="0" i="0" u="none" strike="noStrike" cap="none" normalizeH="0" baseline="0" dirty="0">
+              <a:rPr kumimoji="0" lang="en-US" altLang="en-US" sz="1600" b="0" i="0" u="none" strike="noStrike" cap="none" normalizeH="0" baseline="0" dirty="0">
                 <a:ln>
                   <a:noFill/>
                 </a:ln>
@@ -13516,7 +13503,7 @@
               </a:rPr>
             </a:br>
             <a:r>
-              <a:rPr kumimoji="0" lang="en-US" altLang="en-US" sz="1400" b="0" i="0" u="none" strike="noStrike" cap="none" normalizeH="0" baseline="0" dirty="0">
+              <a:rPr kumimoji="0" lang="en-US" altLang="en-US" sz="1600" b="0" i="0" u="none" strike="noStrike" cap="none" normalizeH="0" baseline="0" dirty="0">
                 <a:ln>
                   <a:noFill/>
                 </a:ln>
@@ -13529,7 +13516,7 @@
               <a:t>    }</a:t>
             </a:r>
             <a:br>
-              <a:rPr kumimoji="0" lang="en-US" altLang="en-US" sz="1400" b="0" i="0" u="none" strike="noStrike" cap="none" normalizeH="0" baseline="0" dirty="0">
+              <a:rPr kumimoji="0" lang="en-US" altLang="en-US" sz="1600" b="0" i="0" u="none" strike="noStrike" cap="none" normalizeH="0" baseline="0" dirty="0">
                 <a:ln>
                   <a:noFill/>
                 </a:ln>
@@ -13541,7 +13528,7 @@
               </a:rPr>
             </a:br>
             <a:r>
-              <a:rPr kumimoji="0" lang="en-US" altLang="en-US" sz="1400" b="0" i="0" u="none" strike="noStrike" cap="none" normalizeH="0" baseline="0" dirty="0">
+              <a:rPr kumimoji="0" lang="en-US" altLang="en-US" sz="1600" b="0" i="0" u="none" strike="noStrike" cap="none" normalizeH="0" baseline="0" dirty="0">
                 <a:ln>
                   <a:noFill/>
                 </a:ln>
@@ -13554,7 +13541,7 @@
               <a:t>    </a:t>
             </a:r>
             <a:r>
-              <a:rPr kumimoji="0" lang="en-US" altLang="en-US" sz="1400" b="1" i="0" u="none" strike="noStrike" cap="none" normalizeH="0" baseline="0" dirty="0">
+              <a:rPr kumimoji="0" lang="en-US" altLang="en-US" sz="1600" b="1" i="0" u="none" strike="noStrike" cap="none" normalizeH="0" baseline="0" dirty="0">
                 <a:ln>
                   <a:noFill/>
                 </a:ln>
@@ -13567,7 +13554,7 @@
               <a:t>public static void </a:t>
             </a:r>
             <a:r>
-              <a:rPr kumimoji="0" lang="en-US" altLang="en-US" sz="1400" b="0" i="0" u="none" strike="noStrike" cap="none" normalizeH="0" baseline="0" dirty="0">
+              <a:rPr kumimoji="0" lang="en-US" altLang="en-US" sz="1600" b="0" i="0" u="none" strike="noStrike" cap="none" normalizeH="0" baseline="0" dirty="0">
                 <a:ln>
                   <a:noFill/>
                 </a:ln>
@@ -13580,7 +13567,7 @@
               <a:t>main(String[] </a:t>
             </a:r>
             <a:r>
-              <a:rPr kumimoji="0" lang="en-US" altLang="en-US" sz="1400" b="0" i="0" u="none" strike="noStrike" cap="none" normalizeH="0" baseline="0" dirty="0" err="1">
+              <a:rPr kumimoji="0" lang="en-US" altLang="en-US" sz="1600" b="0" i="0" u="none" strike="noStrike" cap="none" normalizeH="0" baseline="0" dirty="0" err="1">
                 <a:ln>
                   <a:noFill/>
                 </a:ln>
@@ -13593,7 +13580,7 @@
               <a:t>args</a:t>
             </a:r>
             <a:r>
-              <a:rPr kumimoji="0" lang="en-US" altLang="en-US" sz="1400" b="0" i="0" u="none" strike="noStrike" cap="none" normalizeH="0" baseline="0" dirty="0">
+              <a:rPr kumimoji="0" lang="en-US" altLang="en-US" sz="1600" b="0" i="0" u="none" strike="noStrike" cap="none" normalizeH="0" baseline="0" dirty="0">
                 <a:ln>
                   <a:noFill/>
                 </a:ln>
@@ -13606,7 +13593,7 @@
               <a:t>) {</a:t>
             </a:r>
             <a:br>
-              <a:rPr kumimoji="0" lang="en-US" altLang="en-US" sz="1400" b="0" i="0" u="none" strike="noStrike" cap="none" normalizeH="0" baseline="0" dirty="0">
+              <a:rPr kumimoji="0" lang="en-US" altLang="en-US" sz="1600" b="0" i="0" u="none" strike="noStrike" cap="none" normalizeH="0" baseline="0" dirty="0">
                 <a:ln>
                   <a:noFill/>
                 </a:ln>
@@ -13618,7 +13605,7 @@
               </a:rPr>
             </a:br>
             <a:r>
-              <a:rPr kumimoji="0" lang="en-US" altLang="en-US" sz="1400" b="0" i="0" u="none" strike="noStrike" cap="none" normalizeH="0" baseline="0" dirty="0">
+              <a:rPr kumimoji="0" lang="en-US" altLang="en-US" sz="1600" b="0" i="0" u="none" strike="noStrike" cap="none" normalizeH="0" baseline="0" dirty="0">
                 <a:ln>
                   <a:noFill/>
                 </a:ln>
@@ -13631,7 +13618,7 @@
               <a:t>        </a:t>
             </a:r>
             <a:r>
-              <a:rPr kumimoji="0" lang="en-US" altLang="en-US" sz="1400" b="1" i="0" u="none" strike="noStrike" cap="none" normalizeH="0" baseline="0" dirty="0">
+              <a:rPr kumimoji="0" lang="en-US" altLang="en-US" sz="1600" b="1" i="0" u="none" strike="noStrike" cap="none" normalizeH="0" baseline="0" dirty="0">
                 <a:ln>
                   <a:noFill/>
                 </a:ln>
@@ -13644,7 +13631,7 @@
               <a:t>int </a:t>
             </a:r>
             <a:r>
-              <a:rPr kumimoji="0" lang="en-US" altLang="en-US" sz="1400" b="0" i="0" u="none" strike="noStrike" cap="none" normalizeH="0" baseline="0" dirty="0">
+              <a:rPr kumimoji="0" lang="en-US" altLang="en-US" sz="1600" b="0" i="0" u="none" strike="noStrike" cap="none" normalizeH="0" baseline="0" dirty="0">
                 <a:ln>
                   <a:noFill/>
                 </a:ln>
@@ -13657,7 +13644,7 @@
               <a:t>w = </a:t>
             </a:r>
             <a:r>
-              <a:rPr kumimoji="0" lang="en-US" altLang="en-US" sz="1400" b="0" i="0" u="none" strike="noStrike" cap="none" normalizeH="0" baseline="0" dirty="0">
+              <a:rPr kumimoji="0" lang="en-US" altLang="en-US" sz="1600" b="0" i="0" u="none" strike="noStrike" cap="none" normalizeH="0" baseline="0" dirty="0">
                 <a:ln>
                   <a:noFill/>
                 </a:ln>
@@ -13670,7 +13657,7 @@
               <a:t>5</a:t>
             </a:r>
             <a:r>
-              <a:rPr kumimoji="0" lang="en-US" altLang="en-US" sz="1400" b="0" i="0" u="none" strike="noStrike" cap="none" normalizeH="0" baseline="0" dirty="0">
+              <a:rPr kumimoji="0" lang="en-US" altLang="en-US" sz="1600" b="0" i="0" u="none" strike="noStrike" cap="none" normalizeH="0" baseline="0" dirty="0">
                 <a:ln>
                   <a:noFill/>
                 </a:ln>
@@ -13683,7 +13670,7 @@
               <a:t>;</a:t>
             </a:r>
             <a:br>
-              <a:rPr kumimoji="0" lang="en-US" altLang="en-US" sz="1400" b="0" i="0" u="none" strike="noStrike" cap="none" normalizeH="0" baseline="0" dirty="0">
+              <a:rPr kumimoji="0" lang="en-US" altLang="en-US" sz="1600" b="0" i="0" u="none" strike="noStrike" cap="none" normalizeH="0" baseline="0" dirty="0">
                 <a:ln>
                   <a:noFill/>
                 </a:ln>
@@ -13695,7 +13682,7 @@
               </a:rPr>
             </a:br>
             <a:r>
-              <a:rPr kumimoji="0" lang="en-US" altLang="en-US" sz="1400" b="0" i="0" u="none" strike="noStrike" cap="none" normalizeH="0" baseline="0" dirty="0">
+              <a:rPr kumimoji="0" lang="en-US" altLang="en-US" sz="1600" b="0" i="0" u="none" strike="noStrike" cap="none" normalizeH="0" baseline="0" dirty="0">
                 <a:ln>
                   <a:noFill/>
                 </a:ln>
@@ -13708,7 +13695,7 @@
               <a:t>        </a:t>
             </a:r>
             <a:r>
-              <a:rPr kumimoji="0" lang="en-US" altLang="en-US" sz="1400" b="1" i="0" u="none" strike="noStrike" cap="none" normalizeH="0" baseline="0" dirty="0">
+              <a:rPr kumimoji="0" lang="en-US" altLang="en-US" sz="1600" b="1" i="0" u="none" strike="noStrike" cap="none" normalizeH="0" baseline="0" dirty="0">
                 <a:ln>
                   <a:noFill/>
                 </a:ln>
@@ -13721,7 +13708,7 @@
               <a:t>int </a:t>
             </a:r>
             <a:r>
-              <a:rPr kumimoji="0" lang="en-US" altLang="en-US" sz="1400" b="0" i="0" u="none" strike="noStrike" cap="none" normalizeH="0" baseline="0" dirty="0">
+              <a:rPr kumimoji="0" lang="en-US" altLang="en-US" sz="1600" b="0" i="0" u="none" strike="noStrike" cap="none" normalizeH="0" baseline="0" dirty="0">
                 <a:ln>
                   <a:noFill/>
                 </a:ln>
@@ -13734,7 +13721,7 @@
               <a:t>l = </a:t>
             </a:r>
             <a:r>
-              <a:rPr kumimoji="0" lang="en-US" altLang="en-US" sz="1400" b="0" i="0" u="none" strike="noStrike" cap="none" normalizeH="0" baseline="0" dirty="0">
+              <a:rPr kumimoji="0" lang="en-US" altLang="en-US" sz="1600" b="0" i="0" u="none" strike="noStrike" cap="none" normalizeH="0" baseline="0" dirty="0">
                 <a:ln>
                   <a:noFill/>
                 </a:ln>
@@ -13747,7 +13734,7 @@
               <a:t>10</a:t>
             </a:r>
             <a:r>
-              <a:rPr kumimoji="0" lang="en-US" altLang="en-US" sz="1400" b="0" i="0" u="none" strike="noStrike" cap="none" normalizeH="0" baseline="0" dirty="0">
+              <a:rPr kumimoji="0" lang="en-US" altLang="en-US" sz="1600" b="0" i="0" u="none" strike="noStrike" cap="none" normalizeH="0" baseline="0" dirty="0">
                 <a:ln>
                   <a:noFill/>
                 </a:ln>
@@ -13760,7 +13747,7 @@
               <a:t>;</a:t>
             </a:r>
             <a:br>
-              <a:rPr kumimoji="0" lang="en-US" altLang="en-US" sz="1400" b="0" i="0" u="none" strike="noStrike" cap="none" normalizeH="0" baseline="0" dirty="0">
+              <a:rPr kumimoji="0" lang="en-US" altLang="en-US" sz="1600" b="0" i="0" u="none" strike="noStrike" cap="none" normalizeH="0" baseline="0" dirty="0">
                 <a:ln>
                   <a:noFill/>
                 </a:ln>
@@ -13772,7 +13759,7 @@
               </a:rPr>
             </a:br>
             <a:r>
-              <a:rPr kumimoji="0" lang="en-US" altLang="en-US" sz="1400" b="0" i="0" u="none" strike="noStrike" cap="none" normalizeH="0" baseline="0" dirty="0">
+              <a:rPr kumimoji="0" lang="en-US" altLang="en-US" sz="1600" b="0" i="0" u="none" strike="noStrike" cap="none" normalizeH="0" baseline="0" dirty="0">
                 <a:ln>
                   <a:noFill/>
                 </a:ln>
@@ -13785,7 +13772,7 @@
               <a:t>        Rectangle </a:t>
             </a:r>
             <a:r>
-              <a:rPr kumimoji="0" lang="en-US" altLang="en-US" sz="1400" b="0" i="0" u="none" strike="noStrike" cap="none" normalizeH="0" baseline="0" dirty="0" err="1">
+              <a:rPr kumimoji="0" lang="en-US" altLang="en-US" sz="1600" b="0" i="0" u="none" strike="noStrike" cap="none" normalizeH="0" baseline="0" dirty="0" err="1">
                 <a:ln>
                   <a:noFill/>
                 </a:ln>
@@ -13798,7 +13785,7 @@
               <a:t>rectangle</a:t>
             </a:r>
             <a:r>
-              <a:rPr kumimoji="0" lang="en-US" altLang="en-US" sz="1400" b="0" i="0" u="none" strike="noStrike" cap="none" normalizeH="0" baseline="0" dirty="0">
+              <a:rPr kumimoji="0" lang="en-US" altLang="en-US" sz="1600" b="0" i="0" u="none" strike="noStrike" cap="none" normalizeH="0" baseline="0" dirty="0">
                 <a:ln>
                   <a:noFill/>
                 </a:ln>
@@ -13811,7 +13798,7 @@
               <a:t> = </a:t>
             </a:r>
             <a:r>
-              <a:rPr kumimoji="0" lang="en-US" altLang="en-US" sz="1400" b="1" i="0" u="none" strike="noStrike" cap="none" normalizeH="0" baseline="0" dirty="0">
+              <a:rPr kumimoji="0" lang="en-US" altLang="en-US" sz="1600" b="1" i="0" u="none" strike="noStrike" cap="none" normalizeH="0" baseline="0" dirty="0">
                 <a:ln>
                   <a:noFill/>
                 </a:ln>
@@ -13824,7 +13811,7 @@
               <a:t>new </a:t>
             </a:r>
             <a:r>
-              <a:rPr kumimoji="0" lang="en-US" altLang="en-US" sz="1400" b="0" i="0" u="none" strike="noStrike" cap="none" normalizeH="0" baseline="0" dirty="0">
+              <a:rPr kumimoji="0" lang="en-US" altLang="en-US" sz="1600" b="0" i="0" u="none" strike="noStrike" cap="none" normalizeH="0" baseline="0" dirty="0">
                 <a:ln>
                   <a:noFill/>
                 </a:ln>
@@ -13837,7 +13824,7 @@
               <a:t>Rectangle(</a:t>
             </a:r>
             <a:r>
-              <a:rPr kumimoji="0" lang="en-US" altLang="en-US" sz="1400" b="0" i="0" u="none" strike="noStrike" cap="none" normalizeH="0" baseline="0" dirty="0" err="1">
+              <a:rPr kumimoji="0" lang="en-US" altLang="en-US" sz="1600" b="0" i="0" u="none" strike="noStrike" cap="none" normalizeH="0" baseline="0" dirty="0" err="1">
                 <a:ln>
                   <a:noFill/>
                 </a:ln>
@@ -13850,7 +13837,7 @@
               <a:t>w,l</a:t>
             </a:r>
             <a:r>
-              <a:rPr kumimoji="0" lang="en-US" altLang="en-US" sz="1400" b="0" i="0" u="none" strike="noStrike" cap="none" normalizeH="0" baseline="0" dirty="0">
+              <a:rPr kumimoji="0" lang="en-US" altLang="en-US" sz="1600" b="0" i="0" u="none" strike="noStrike" cap="none" normalizeH="0" baseline="0" dirty="0">
                 <a:ln>
                   <a:noFill/>
                 </a:ln>
@@ -13863,7 +13850,7 @@
               <a:t>);</a:t>
             </a:r>
             <a:br>
-              <a:rPr kumimoji="0" lang="en-US" altLang="en-US" sz="1400" b="0" i="0" u="none" strike="noStrike" cap="none" normalizeH="0" baseline="0" dirty="0">
+              <a:rPr kumimoji="0" lang="en-US" altLang="en-US" sz="1600" b="0" i="0" u="none" strike="noStrike" cap="none" normalizeH="0" baseline="0" dirty="0">
                 <a:ln>
                   <a:noFill/>
                 </a:ln>
@@ -13875,7 +13862,7 @@
               </a:rPr>
             </a:br>
             <a:r>
-              <a:rPr kumimoji="0" lang="en-US" altLang="en-US" sz="1400" b="0" i="0" u="none" strike="noStrike" cap="none" normalizeH="0" baseline="0" dirty="0">
+              <a:rPr kumimoji="0" lang="en-US" altLang="en-US" sz="1600" b="0" i="0" u="none" strike="noStrike" cap="none" normalizeH="0" baseline="0" dirty="0">
                 <a:ln>
                   <a:noFill/>
                 </a:ln>
@@ -13888,7 +13875,7 @@
               <a:t>        </a:t>
             </a:r>
             <a:r>
-              <a:rPr kumimoji="0" lang="en-US" altLang="en-US" sz="1400" b="0" i="1" u="none" strike="noStrike" cap="none" normalizeH="0" baseline="0" dirty="0" err="1">
+              <a:rPr kumimoji="0" lang="en-US" altLang="en-US" sz="1600" b="0" i="1" u="none" strike="noStrike" cap="none" normalizeH="0" baseline="0" dirty="0" err="1">
                 <a:ln>
                   <a:noFill/>
                 </a:ln>
@@ -13901,7 +13888,7 @@
               <a:t>printValues</a:t>
             </a:r>
             <a:r>
-              <a:rPr kumimoji="0" lang="en-US" altLang="en-US" sz="1400" b="0" i="0" u="none" strike="noStrike" cap="none" normalizeH="0" baseline="0" dirty="0">
+              <a:rPr kumimoji="0" lang="en-US" altLang="en-US" sz="1600" b="0" i="0" u="none" strike="noStrike" cap="none" normalizeH="0" baseline="0" dirty="0">
                 <a:ln>
                   <a:noFill/>
                 </a:ln>
@@ -13914,7 +13901,7 @@
               <a:t>(rectangle, w, l);</a:t>
             </a:r>
             <a:br>
-              <a:rPr kumimoji="0" lang="en-US" altLang="en-US" sz="1400" b="0" i="0" u="none" strike="noStrike" cap="none" normalizeH="0" baseline="0" dirty="0">
+              <a:rPr kumimoji="0" lang="en-US" altLang="en-US" sz="1600" b="0" i="0" u="none" strike="noStrike" cap="none" normalizeH="0" baseline="0" dirty="0">
                 <a:ln>
                   <a:noFill/>
                 </a:ln>
@@ -13926,7 +13913,7 @@
               </a:rPr>
             </a:br>
             <a:r>
-              <a:rPr kumimoji="0" lang="en-US" altLang="en-US" sz="1400" b="0" i="0" u="none" strike="noStrike" cap="none" normalizeH="0" baseline="0" dirty="0">
+              <a:rPr kumimoji="0" lang="en-US" altLang="en-US" sz="1600" b="0" i="0" u="none" strike="noStrike" cap="none" normalizeH="0" baseline="0" dirty="0">
                 <a:ln>
                   <a:noFill/>
                 </a:ln>
@@ -13939,7 +13926,7 @@
               <a:t>        </a:t>
             </a:r>
             <a:r>
-              <a:rPr kumimoji="0" lang="en-US" altLang="en-US" sz="1400" b="0" i="1" u="none" strike="noStrike" cap="none" normalizeH="0" baseline="0" dirty="0" err="1">
+              <a:rPr kumimoji="0" lang="en-US" altLang="en-US" sz="1600" b="0" i="1" u="none" strike="noStrike" cap="none" normalizeH="0" baseline="0" dirty="0" err="1">
                 <a:ln>
                   <a:noFill/>
                 </a:ln>
@@ -13952,7 +13939,7 @@
               <a:t>modifyValues</a:t>
             </a:r>
             <a:r>
-              <a:rPr kumimoji="0" lang="en-US" altLang="en-US" sz="1400" b="0" i="0" u="none" strike="noStrike" cap="none" normalizeH="0" baseline="0" dirty="0">
+              <a:rPr kumimoji="0" lang="en-US" altLang="en-US" sz="1600" b="0" i="0" u="none" strike="noStrike" cap="none" normalizeH="0" baseline="0" dirty="0">
                 <a:ln>
                   <a:noFill/>
                 </a:ln>
@@ -13965,7 +13952,7 @@
               <a:t>(rectangle, w, l);</a:t>
             </a:r>
             <a:br>
-              <a:rPr kumimoji="0" lang="en-US" altLang="en-US" sz="1400" b="0" i="0" u="none" strike="noStrike" cap="none" normalizeH="0" baseline="0" dirty="0">
+              <a:rPr kumimoji="0" lang="en-US" altLang="en-US" sz="1600" b="0" i="0" u="none" strike="noStrike" cap="none" normalizeH="0" baseline="0" dirty="0">
                 <a:ln>
                   <a:noFill/>
                 </a:ln>
@@ -13977,7 +13964,7 @@
               </a:rPr>
             </a:br>
             <a:r>
-              <a:rPr kumimoji="0" lang="en-US" altLang="en-US" sz="1400" b="0" i="0" u="none" strike="noStrike" cap="none" normalizeH="0" baseline="0" dirty="0">
+              <a:rPr kumimoji="0" lang="en-US" altLang="en-US" sz="1600" b="0" i="0" u="none" strike="noStrike" cap="none" normalizeH="0" baseline="0" dirty="0">
                 <a:ln>
                   <a:noFill/>
                 </a:ln>
@@ -13990,7 +13977,7 @@
               <a:t>        </a:t>
             </a:r>
             <a:r>
-              <a:rPr kumimoji="0" lang="en-US" altLang="en-US" sz="1400" b="0" i="0" u="none" strike="noStrike" cap="none" normalizeH="0" baseline="0" dirty="0" err="1">
+              <a:rPr kumimoji="0" lang="en-US" altLang="en-US" sz="1600" b="0" i="0" u="none" strike="noStrike" cap="none" normalizeH="0" baseline="0" dirty="0" err="1">
                 <a:ln>
                   <a:noFill/>
                 </a:ln>
@@ -14003,7 +13990,7 @@
               <a:t>System.</a:t>
             </a:r>
             <a:r>
-              <a:rPr kumimoji="0" lang="en-US" altLang="en-US" sz="1400" b="1" i="1" u="none" strike="noStrike" cap="none" normalizeH="0" baseline="0" dirty="0" err="1">
+              <a:rPr kumimoji="0" lang="en-US" altLang="en-US" sz="1600" b="1" i="1" u="none" strike="noStrike" cap="none" normalizeH="0" baseline="0" dirty="0" err="1">
                 <a:ln>
                   <a:noFill/>
                 </a:ln>
@@ -14016,7 +14003,7 @@
               <a:t>out</a:t>
             </a:r>
             <a:r>
-              <a:rPr kumimoji="0" lang="en-US" altLang="en-US" sz="1400" b="0" i="0" u="none" strike="noStrike" cap="none" normalizeH="0" baseline="0" dirty="0" err="1">
+              <a:rPr kumimoji="0" lang="en-US" altLang="en-US" sz="1600" b="0" i="0" u="none" strike="noStrike" cap="none" normalizeH="0" baseline="0" dirty="0" err="1">
                 <a:ln>
                   <a:noFill/>
                 </a:ln>
@@ -14029,7 +14016,7 @@
               <a:t>.println</a:t>
             </a:r>
             <a:r>
-              <a:rPr kumimoji="0" lang="en-US" altLang="en-US" sz="1400" b="0" i="0" u="none" strike="noStrike" cap="none" normalizeH="0" baseline="0" dirty="0">
+              <a:rPr kumimoji="0" lang="en-US" altLang="en-US" sz="1600" b="0" i="0" u="none" strike="noStrike" cap="none" normalizeH="0" baseline="0" dirty="0">
                 <a:ln>
                   <a:noFill/>
                 </a:ln>
@@ -14042,7 +14029,7 @@
               <a:t>(</a:t>
             </a:r>
             <a:r>
-              <a:rPr kumimoji="0" lang="en-US" altLang="en-US" sz="1400" b="1" i="0" u="none" strike="noStrike" cap="none" normalizeH="0" baseline="0" dirty="0">
+              <a:rPr kumimoji="0" lang="en-US" altLang="en-US" sz="1600" b="1" i="0" u="none" strike="noStrike" cap="none" normalizeH="0" baseline="0" dirty="0">
                 <a:ln>
                   <a:noFill/>
                 </a:ln>
@@ -14055,7 +14042,7 @@
               <a:t>"Values Modified!"</a:t>
             </a:r>
             <a:r>
-              <a:rPr kumimoji="0" lang="en-US" altLang="en-US" sz="1400" b="0" i="0" u="none" strike="noStrike" cap="none" normalizeH="0" baseline="0" dirty="0">
+              <a:rPr kumimoji="0" lang="en-US" altLang="en-US" sz="1600" b="0" i="0" u="none" strike="noStrike" cap="none" normalizeH="0" baseline="0" dirty="0">
                 <a:ln>
                   <a:noFill/>
                 </a:ln>
@@ -14068,7 +14055,7 @@
               <a:t>);</a:t>
             </a:r>
             <a:br>
-              <a:rPr kumimoji="0" lang="en-US" altLang="en-US" sz="1400" b="0" i="0" u="none" strike="noStrike" cap="none" normalizeH="0" baseline="0" dirty="0">
+              <a:rPr kumimoji="0" lang="en-US" altLang="en-US" sz="1600" b="0" i="0" u="none" strike="noStrike" cap="none" normalizeH="0" baseline="0" dirty="0">
                 <a:ln>
                   <a:noFill/>
                 </a:ln>
@@ -14080,7 +14067,7 @@
               </a:rPr>
             </a:br>
             <a:r>
-              <a:rPr kumimoji="0" lang="en-US" altLang="en-US" sz="1400" b="0" i="0" u="none" strike="noStrike" cap="none" normalizeH="0" baseline="0" dirty="0">
+              <a:rPr kumimoji="0" lang="en-US" altLang="en-US" sz="1600" b="0" i="0" u="none" strike="noStrike" cap="none" normalizeH="0" baseline="0" dirty="0">
                 <a:ln>
                   <a:noFill/>
                 </a:ln>
@@ -14093,7 +14080,7 @@
               <a:t>        </a:t>
             </a:r>
             <a:r>
-              <a:rPr kumimoji="0" lang="en-US" altLang="en-US" sz="1400" b="0" i="1" u="none" strike="noStrike" cap="none" normalizeH="0" baseline="0" dirty="0" err="1">
+              <a:rPr kumimoji="0" lang="en-US" altLang="en-US" sz="1600" b="0" i="1" u="none" strike="noStrike" cap="none" normalizeH="0" baseline="0" dirty="0" err="1">
                 <a:ln>
                   <a:noFill/>
                 </a:ln>
@@ -14106,7 +14093,7 @@
               <a:t>printValues</a:t>
             </a:r>
             <a:r>
-              <a:rPr kumimoji="0" lang="en-US" altLang="en-US" sz="1400" b="0" i="0" u="none" strike="noStrike" cap="none" normalizeH="0" baseline="0" dirty="0">
+              <a:rPr kumimoji="0" lang="en-US" altLang="en-US" sz="1600" b="0" i="0" u="none" strike="noStrike" cap="none" normalizeH="0" baseline="0" dirty="0">
                 <a:ln>
                   <a:noFill/>
                 </a:ln>
@@ -14119,7 +14106,7 @@
               <a:t>(rectangle, w, l);</a:t>
             </a:r>
             <a:br>
-              <a:rPr kumimoji="0" lang="en-US" altLang="en-US" sz="1400" b="0" i="0" u="none" strike="noStrike" cap="none" normalizeH="0" baseline="0" dirty="0">
+              <a:rPr kumimoji="0" lang="en-US" altLang="en-US" sz="1600" b="0" i="0" u="none" strike="noStrike" cap="none" normalizeH="0" baseline="0" dirty="0">
                 <a:ln>
                   <a:noFill/>
                 </a:ln>
@@ -14131,7 +14118,7 @@
               </a:rPr>
             </a:br>
             <a:r>
-              <a:rPr kumimoji="0" lang="en-US" altLang="en-US" sz="1400" b="0" i="0" u="none" strike="noStrike" cap="none" normalizeH="0" baseline="0" dirty="0">
+              <a:rPr kumimoji="0" lang="en-US" altLang="en-US" sz="1600" b="0" i="0" u="none" strike="noStrike" cap="none" normalizeH="0" baseline="0" dirty="0">
                 <a:ln>
                   <a:noFill/>
                 </a:ln>
@@ -14144,7 +14131,7 @@
               <a:t>    }</a:t>
             </a:r>
             <a:br>
-              <a:rPr kumimoji="0" lang="en-US" altLang="en-US" sz="1400" b="0" i="0" u="none" strike="noStrike" cap="none" normalizeH="0" baseline="0" dirty="0">
+              <a:rPr kumimoji="0" lang="en-US" altLang="en-US" sz="1600" b="0" i="0" u="none" strike="noStrike" cap="none" normalizeH="0" baseline="0" dirty="0">
                 <a:ln>
                   <a:noFill/>
                 </a:ln>
@@ -14156,7 +14143,7 @@
               </a:rPr>
             </a:br>
             <a:r>
-              <a:rPr kumimoji="0" lang="en-US" altLang="en-US" sz="1400" b="0" i="0" u="none" strike="noStrike" cap="none" normalizeH="0" baseline="0" dirty="0">
+              <a:rPr kumimoji="0" lang="en-US" altLang="en-US" sz="1600" b="0" i="0" u="none" strike="noStrike" cap="none" normalizeH="0" baseline="0" dirty="0">
                 <a:ln>
                   <a:noFill/>
                 </a:ln>
@@ -14168,7 +14155,7 @@
               </a:rPr>
               <a:t>}</a:t>
             </a:r>
-            <a:endParaRPr kumimoji="0" lang="en-US" altLang="en-US" sz="1400" b="0" i="0" u="none" strike="noStrike" cap="none" normalizeH="0" baseline="0" dirty="0">
+            <a:endParaRPr kumimoji="0" lang="en-US" altLang="en-US" sz="1600" b="0" i="0" u="none" strike="noStrike" cap="none" normalizeH="0" baseline="0" dirty="0">
               <a:ln>
                 <a:noFill/>
               </a:ln>
@@ -25118,7 +25105,7 @@
           <p:nvPr>
             <p:extLst>
               <p:ext uri="{D42A27DB-BD31-4B8C-83A1-F6EECF244321}">
-                <p14:modId xmlns:p14="http://schemas.microsoft.com/office/powerpoint/2010/main" val="2957314257"/>
+                <p14:modId xmlns:p14="http://schemas.microsoft.com/office/powerpoint/2010/main" val="687976248"/>
               </p:ext>
             </p:extLst>
           </p:nvPr>
@@ -25337,7 +25324,7 @@
                         <a:rPr lang="en-US" sz="1700">
                           <a:effectLst/>
                         </a:rPr>
-                        <a:t>12 PM - 2 PM : CSB 120</a:t>
+                        <a:t>3 PM - 5 PM : CSB 120</a:t>
                       </a:r>
                     </a:p>
                   </a:txBody>
@@ -27055,8 +27042,8 @@
         </p:blipFill>
         <p:spPr bwMode="auto">
           <a:xfrm>
-            <a:off x="491992" y="1614012"/>
-            <a:ext cx="6073252" cy="1915629"/>
+            <a:off x="15517" y="1463722"/>
+            <a:ext cx="7238634" cy="2283214"/>
           </a:xfrm>
           <a:prstGeom prst="rect">
             <a:avLst/>
@@ -27100,8 +27087,8 @@
         </p:blipFill>
         <p:spPr bwMode="auto">
           <a:xfrm>
-            <a:off x="628073" y="3752952"/>
-            <a:ext cx="5924471" cy="1256378"/>
+            <a:off x="15517" y="3752952"/>
+            <a:ext cx="7219149" cy="1530935"/>
           </a:xfrm>
           <a:prstGeom prst="rect">
             <a:avLst/>
@@ -29708,7 +29695,7 @@
               <a:tabLst/>
             </a:pPr>
             <a:r>
-              <a:rPr kumimoji="0" lang="en-US" altLang="en-US" b="0" i="0" u="none" strike="noStrike" cap="none" normalizeH="0" baseline="0">
+              <a:rPr kumimoji="0" lang="en-US" altLang="en-US" b="0" i="0" u="none" strike="noStrike" cap="none" normalizeH="0" baseline="0" dirty="0">
                 <a:ln>
                   <a:noFill/>
                 </a:ln>
@@ -29721,7 +29708,7 @@
               <a:t>public class </a:t>
             </a:r>
             <a:r>
-              <a:rPr kumimoji="0" lang="en-US" altLang="en-US" b="0" i="0" u="none" strike="noStrike" cap="none" normalizeH="0" baseline="0">
+              <a:rPr kumimoji="0" lang="en-US" altLang="en-US" b="0" i="0" u="none" strike="noStrike" cap="none" normalizeH="0" baseline="0" dirty="0" err="1">
                 <a:ln>
                   <a:noFill/>
                 </a:ln>
@@ -29731,10 +29718,23 @@
                 <a:effectLst/>
                 <a:latin typeface="JetBrains Mono"/>
               </a:rPr>
-              <a:t>AppDatePrinter </a:t>
-            </a:r>
-            <a:r>
-              <a:rPr kumimoji="0" lang="en-US" altLang="en-US" b="0" i="0" u="none" strike="noStrike" cap="none" normalizeH="0" baseline="0">
+              <a:t>AppDatePrinter</a:t>
+            </a:r>
+            <a:r>
+              <a:rPr kumimoji="0" lang="en-US" altLang="en-US" b="0" i="0" u="none" strike="noStrike" cap="none" normalizeH="0" baseline="0" dirty="0">
+                <a:ln>
+                  <a:noFill/>
+                </a:ln>
+                <a:solidFill>
+                  <a:srgbClr val="000000"/>
+                </a:solidFill>
+                <a:effectLst/>
+                <a:latin typeface="JetBrains Mono"/>
+              </a:rPr>
+              <a:t> </a:t>
+            </a:r>
+            <a:r>
+              <a:rPr kumimoji="0" lang="en-US" altLang="en-US" b="0" i="0" u="none" strike="noStrike" cap="none" normalizeH="0" baseline="0" dirty="0">
                 <a:ln>
                   <a:noFill/>
                 </a:ln>
@@ -29747,7 +29747,7 @@
               <a:t>{</a:t>
             </a:r>
             <a:br>
-              <a:rPr kumimoji="0" lang="en-US" altLang="en-US" b="0" i="0" u="none" strike="noStrike" cap="none" normalizeH="0" baseline="0">
+              <a:rPr kumimoji="0" lang="en-US" altLang="en-US" b="0" i="0" u="none" strike="noStrike" cap="none" normalizeH="0" baseline="0" dirty="0">
                 <a:ln>
                   <a:noFill/>
                 </a:ln>
@@ -29759,7 +29759,7 @@
               </a:rPr>
             </a:br>
             <a:r>
-              <a:rPr kumimoji="0" lang="en-US" altLang="en-US" b="0" i="0" u="none" strike="noStrike" cap="none" normalizeH="0" baseline="0">
+              <a:rPr kumimoji="0" lang="en-US" altLang="en-US" b="0" i="0" u="none" strike="noStrike" cap="none" normalizeH="0" baseline="0" dirty="0">
                 <a:ln>
                   <a:noFill/>
                 </a:ln>
@@ -29772,7 +29772,7 @@
               <a:t>    </a:t>
             </a:r>
             <a:r>
-              <a:rPr kumimoji="0" lang="en-US" altLang="en-US" b="0" i="0" u="none" strike="noStrike" cap="none" normalizeH="0" baseline="0">
+              <a:rPr kumimoji="0" lang="en-US" altLang="en-US" b="0" i="0" u="none" strike="noStrike" cap="none" normalizeH="0" baseline="0" dirty="0">
                 <a:ln>
                   <a:noFill/>
                 </a:ln>
@@ -29785,7 +29785,7 @@
               <a:t>public static void </a:t>
             </a:r>
             <a:r>
-              <a:rPr kumimoji="0" lang="en-US" altLang="en-US" b="0" i="0" u="none" strike="noStrike" cap="none" normalizeH="0" baseline="0">
+              <a:rPr kumimoji="0" lang="en-US" altLang="en-US" b="0" i="0" u="none" strike="noStrike" cap="none" normalizeH="0" baseline="0" dirty="0">
                 <a:ln>
                   <a:noFill/>
                 </a:ln>
@@ -29798,7 +29798,7 @@
               <a:t>main</a:t>
             </a:r>
             <a:r>
-              <a:rPr kumimoji="0" lang="en-US" altLang="en-US" b="0" i="0" u="none" strike="noStrike" cap="none" normalizeH="0" baseline="0">
+              <a:rPr kumimoji="0" lang="en-US" altLang="en-US" b="0" i="0" u="none" strike="noStrike" cap="none" normalizeH="0" baseline="0" dirty="0">
                 <a:ln>
                   <a:noFill/>
                 </a:ln>
@@ -29811,7 +29811,7 @@
               <a:t>(</a:t>
             </a:r>
             <a:r>
-              <a:rPr kumimoji="0" lang="en-US" altLang="en-US" b="0" i="0" u="none" strike="noStrike" cap="none" normalizeH="0" baseline="0">
+              <a:rPr kumimoji="0" lang="en-US" altLang="en-US" b="0" i="0" u="none" strike="noStrike" cap="none" normalizeH="0" baseline="0" dirty="0">
                 <a:ln>
                   <a:noFill/>
                 </a:ln>
@@ -29824,20 +29824,33 @@
               <a:t>String </a:t>
             </a:r>
             <a:r>
-              <a:rPr kumimoji="0" lang="en-US" altLang="en-US" b="0" i="0" u="none" strike="noStrike" cap="none" normalizeH="0" baseline="0">
-                <a:ln>
-                  <a:noFill/>
-                </a:ln>
-                <a:solidFill>
-                  <a:srgbClr val="080808"/>
-                </a:solidFill>
-                <a:effectLst/>
-                <a:latin typeface="JetBrains Mono"/>
-              </a:rPr>
-              <a:t>args[]){</a:t>
+              <a:rPr kumimoji="0" lang="en-US" altLang="en-US" b="0" i="0" u="none" strike="noStrike" cap="none" normalizeH="0" baseline="0" dirty="0" err="1">
+                <a:ln>
+                  <a:noFill/>
+                </a:ln>
+                <a:solidFill>
+                  <a:srgbClr val="080808"/>
+                </a:solidFill>
+                <a:effectLst/>
+                <a:latin typeface="JetBrains Mono"/>
+              </a:rPr>
+              <a:t>args</a:t>
+            </a:r>
+            <a:r>
+              <a:rPr kumimoji="0" lang="en-US" altLang="en-US" b="0" i="0" u="none" strike="noStrike" cap="none" normalizeH="0" baseline="0" dirty="0">
+                <a:ln>
+                  <a:noFill/>
+                </a:ln>
+                <a:solidFill>
+                  <a:srgbClr val="080808"/>
+                </a:solidFill>
+                <a:effectLst/>
+                <a:latin typeface="JetBrains Mono"/>
+              </a:rPr>
+              <a:t>[]){</a:t>
             </a:r>
             <a:br>
-              <a:rPr kumimoji="0" lang="en-US" altLang="en-US" b="0" i="0" u="none" strike="noStrike" cap="none" normalizeH="0" baseline="0">
+              <a:rPr kumimoji="0" lang="en-US" altLang="en-US" b="0" i="0" u="none" strike="noStrike" cap="none" normalizeH="0" baseline="0" dirty="0">
                 <a:ln>
                   <a:noFill/>
                 </a:ln>
@@ -29849,7 +29862,7 @@
               </a:rPr>
             </a:br>
             <a:r>
-              <a:rPr kumimoji="0" lang="en-US" altLang="en-US" b="0" i="0" u="none" strike="noStrike" cap="none" normalizeH="0" baseline="0">
+              <a:rPr kumimoji="0" lang="en-US" altLang="en-US" b="0" i="0" u="none" strike="noStrike" cap="none" normalizeH="0" baseline="0" dirty="0">
                 <a:ln>
                   <a:noFill/>
                 </a:ln>
@@ -29862,7 +29875,7 @@
               <a:t>        </a:t>
             </a:r>
             <a:r>
-              <a:rPr kumimoji="0" lang="en-US" altLang="en-US" b="0" i="0" u="none" strike="noStrike" cap="none" normalizeH="0" baseline="0">
+              <a:rPr kumimoji="0" lang="en-US" altLang="en-US" b="0" i="0" u="none" strike="noStrike" cap="none" normalizeH="0" baseline="0" dirty="0" err="1">
                 <a:ln>
                   <a:noFill/>
                 </a:ln>
@@ -29872,10 +29885,49 @@
                 <a:effectLst/>
                 <a:latin typeface="JetBrains Mono"/>
               </a:rPr>
-              <a:t>DatePrinter dp </a:t>
-            </a:r>
-            <a:r>
-              <a:rPr kumimoji="0" lang="en-US" altLang="en-US" b="0" i="0" u="none" strike="noStrike" cap="none" normalizeH="0" baseline="0">
+              <a:t>DatePrinter</a:t>
+            </a:r>
+            <a:r>
+              <a:rPr kumimoji="0" lang="en-US" altLang="en-US" b="0" i="0" u="none" strike="noStrike" cap="none" normalizeH="0" baseline="0" dirty="0">
+                <a:ln>
+                  <a:noFill/>
+                </a:ln>
+                <a:solidFill>
+                  <a:srgbClr val="000000"/>
+                </a:solidFill>
+                <a:effectLst/>
+                <a:latin typeface="JetBrains Mono"/>
+              </a:rPr>
+              <a:t> </a:t>
+            </a:r>
+            <a:r>
+              <a:rPr kumimoji="0" lang="en-US" altLang="en-US" b="0" i="0" u="none" strike="noStrike" cap="none" normalizeH="0" baseline="0" dirty="0" err="1">
+                <a:ln>
+                  <a:noFill/>
+                </a:ln>
+                <a:solidFill>
+                  <a:srgbClr val="000000"/>
+                </a:solidFill>
+                <a:effectLst/>
+                <a:latin typeface="JetBrains Mono"/>
+              </a:rPr>
+              <a:t>dp</a:t>
+            </a:r>
+            <a:r>
+              <a:rPr kumimoji="0" lang="en-US" altLang="en-US" b="0" i="0" u="none" strike="noStrike" cap="none" normalizeH="0" baseline="0" dirty="0">
+                <a:ln>
+                  <a:noFill/>
+                </a:ln>
+                <a:solidFill>
+                  <a:srgbClr val="000000"/>
+                </a:solidFill>
+                <a:effectLst/>
+                <a:latin typeface="JetBrains Mono"/>
+              </a:rPr>
+              <a:t> </a:t>
+            </a:r>
+            <a:r>
+              <a:rPr kumimoji="0" lang="en-US" altLang="en-US" b="0" i="0" u="none" strike="noStrike" cap="none" normalizeH="0" baseline="0" dirty="0">
                 <a:ln>
                   <a:noFill/>
                 </a:ln>
@@ -29888,7 +29940,7 @@
               <a:t>= </a:t>
             </a:r>
             <a:r>
-              <a:rPr kumimoji="0" lang="en-US" altLang="en-US" b="0" i="0" u="none" strike="noStrike" cap="none" normalizeH="0" baseline="0">
+              <a:rPr kumimoji="0" lang="en-US" altLang="en-US" b="0" i="0" u="none" strike="noStrike" cap="none" normalizeH="0" baseline="0" dirty="0">
                 <a:ln>
                   <a:noFill/>
                 </a:ln>
@@ -29901,20 +29953,33 @@
               <a:t>new </a:t>
             </a:r>
             <a:r>
-              <a:rPr kumimoji="0" lang="en-US" altLang="en-US" b="0" i="0" u="none" strike="noStrike" cap="none" normalizeH="0" baseline="0">
-                <a:ln>
-                  <a:noFill/>
-                </a:ln>
-                <a:solidFill>
-                  <a:srgbClr val="080808"/>
-                </a:solidFill>
-                <a:effectLst/>
-                <a:latin typeface="JetBrains Mono"/>
-              </a:rPr>
-              <a:t>DatePrinter();</a:t>
+              <a:rPr kumimoji="0" lang="en-US" altLang="en-US" b="0" i="0" u="none" strike="noStrike" cap="none" normalizeH="0" baseline="0" dirty="0" err="1">
+                <a:ln>
+                  <a:noFill/>
+                </a:ln>
+                <a:solidFill>
+                  <a:srgbClr val="080808"/>
+                </a:solidFill>
+                <a:effectLst/>
+                <a:latin typeface="JetBrains Mono"/>
+              </a:rPr>
+              <a:t>DatePrinter</a:t>
+            </a:r>
+            <a:r>
+              <a:rPr kumimoji="0" lang="en-US" altLang="en-US" b="0" i="0" u="none" strike="noStrike" cap="none" normalizeH="0" baseline="0" dirty="0">
+                <a:ln>
+                  <a:noFill/>
+                </a:ln>
+                <a:solidFill>
+                  <a:srgbClr val="080808"/>
+                </a:solidFill>
+                <a:effectLst/>
+                <a:latin typeface="JetBrains Mono"/>
+              </a:rPr>
+              <a:t>();</a:t>
             </a:r>
             <a:br>
-              <a:rPr kumimoji="0" lang="en-US" altLang="en-US" b="0" i="0" u="none" strike="noStrike" cap="none" normalizeH="0" baseline="0">
+              <a:rPr kumimoji="0" lang="en-US" altLang="en-US" b="0" i="0" u="none" strike="noStrike" cap="none" normalizeH="0" baseline="0" dirty="0">
                 <a:ln>
                   <a:noFill/>
                 </a:ln>
@@ -29926,7 +29991,7 @@
               </a:rPr>
             </a:br>
             <a:r>
-              <a:rPr kumimoji="0" lang="en-US" altLang="en-US" b="0" i="0" u="none" strike="noStrike" cap="none" normalizeH="0" baseline="0">
+              <a:rPr kumimoji="0" lang="en-US" altLang="en-US" b="0" i="0" u="none" strike="noStrike" cap="none" normalizeH="0" baseline="0" dirty="0">
                 <a:ln>
                   <a:noFill/>
                 </a:ln>
@@ -29939,7 +30004,7 @@
               <a:t>        </a:t>
             </a:r>
             <a:r>
-              <a:rPr kumimoji="0" lang="en-US" altLang="en-US" b="0" i="0" u="none" strike="noStrike" cap="none" normalizeH="0" baseline="0">
+              <a:rPr kumimoji="0" lang="en-US" altLang="en-US" b="0" i="0" u="none" strike="noStrike" cap="none" normalizeH="0" baseline="0" dirty="0" err="1">
                 <a:ln>
                   <a:noFill/>
                 </a:ln>
@@ -29952,20 +30017,33 @@
               <a:t>dp</a:t>
             </a:r>
             <a:r>
-              <a:rPr kumimoji="0" lang="en-US" altLang="en-US" b="0" i="0" u="none" strike="noStrike" cap="none" normalizeH="0" baseline="0">
-                <a:ln>
-                  <a:noFill/>
-                </a:ln>
-                <a:solidFill>
-                  <a:srgbClr val="080808"/>
-                </a:solidFill>
-                <a:effectLst/>
-                <a:latin typeface="JetBrains Mono"/>
-              </a:rPr>
-              <a:t>.datePrint(</a:t>
-            </a:r>
-            <a:r>
-              <a:rPr kumimoji="0" lang="en-US" altLang="en-US" b="0" i="0" u="none" strike="noStrike" cap="none" normalizeH="0" baseline="0">
+              <a:rPr kumimoji="0" lang="en-US" altLang="en-US" b="0" i="0" u="none" strike="noStrike" cap="none" normalizeH="0" baseline="0" dirty="0" err="1">
+                <a:ln>
+                  <a:noFill/>
+                </a:ln>
+                <a:solidFill>
+                  <a:srgbClr val="080808"/>
+                </a:solidFill>
+                <a:effectLst/>
+                <a:latin typeface="JetBrains Mono"/>
+              </a:rPr>
+              <a:t>.datePrint</a:t>
+            </a:r>
+            <a:r>
+              <a:rPr kumimoji="0" lang="en-US" altLang="en-US" b="0" i="0" u="none" strike="noStrike" cap="none" normalizeH="0" baseline="0" dirty="0">
+                <a:ln>
+                  <a:noFill/>
+                </a:ln>
+                <a:solidFill>
+                  <a:srgbClr val="080808"/>
+                </a:solidFill>
+                <a:effectLst/>
+                <a:latin typeface="JetBrains Mono"/>
+              </a:rPr>
+              <a:t>(</a:t>
+            </a:r>
+            <a:r>
+              <a:rPr kumimoji="0" lang="en-US" altLang="en-US" b="0" i="0" u="none" strike="noStrike" cap="none" normalizeH="0" baseline="0" dirty="0">
                 <a:ln>
                   <a:noFill/>
                 </a:ln>
@@ -29978,7 +30056,7 @@
               <a:t>22</a:t>
             </a:r>
             <a:r>
-              <a:rPr kumimoji="0" lang="en-US" altLang="en-US" b="0" i="0" u="none" strike="noStrike" cap="none" normalizeH="0" baseline="0">
+              <a:rPr kumimoji="0" lang="en-US" altLang="en-US" b="0" i="0" u="none" strike="noStrike" cap="none" normalizeH="0" baseline="0" dirty="0">
                 <a:ln>
                   <a:noFill/>
                 </a:ln>
@@ -29991,7 +30069,7 @@
               <a:t>,</a:t>
             </a:r>
             <a:r>
-              <a:rPr kumimoji="0" lang="en-US" altLang="en-US" b="0" i="0" u="none" strike="noStrike" cap="none" normalizeH="0" baseline="0">
+              <a:rPr kumimoji="0" lang="en-US" altLang="en-US" b="0" i="0" u="none" strike="noStrike" cap="none" normalizeH="0" baseline="0" dirty="0">
                 <a:ln>
                   <a:noFill/>
                 </a:ln>
@@ -30004,7 +30082,7 @@
               <a:t>2</a:t>
             </a:r>
             <a:r>
-              <a:rPr kumimoji="0" lang="en-US" altLang="en-US" b="0" i="0" u="none" strike="noStrike" cap="none" normalizeH="0" baseline="0">
+              <a:rPr kumimoji="0" lang="en-US" altLang="en-US" b="0" i="0" u="none" strike="noStrike" cap="none" normalizeH="0" baseline="0" dirty="0">
                 <a:ln>
                   <a:noFill/>
                 </a:ln>
@@ -30017,7 +30095,7 @@
               <a:t>, </a:t>
             </a:r>
             <a:r>
-              <a:rPr kumimoji="0" lang="en-US" altLang="en-US" b="0" i="0" u="none" strike="noStrike" cap="none" normalizeH="0" baseline="0">
+              <a:rPr kumimoji="0" lang="en-US" altLang="en-US" b="0" i="0" u="none" strike="noStrike" cap="none" normalizeH="0" baseline="0" dirty="0">
                 <a:ln>
                   <a:noFill/>
                 </a:ln>
@@ -30030,7 +30108,7 @@
               <a:t>2023</a:t>
             </a:r>
             <a:r>
-              <a:rPr kumimoji="0" lang="en-US" altLang="en-US" b="0" i="0" u="none" strike="noStrike" cap="none" normalizeH="0" baseline="0">
+              <a:rPr kumimoji="0" lang="en-US" altLang="en-US" b="0" i="0" u="none" strike="noStrike" cap="none" normalizeH="0" baseline="0" dirty="0">
                 <a:ln>
                   <a:noFill/>
                 </a:ln>
@@ -30043,7 +30121,7 @@
               <a:t>);</a:t>
             </a:r>
             <a:br>
-              <a:rPr kumimoji="0" lang="en-US" altLang="en-US" b="0" i="0" u="none" strike="noStrike" cap="none" normalizeH="0" baseline="0">
+              <a:rPr kumimoji="0" lang="en-US" altLang="en-US" b="0" i="0" u="none" strike="noStrike" cap="none" normalizeH="0" baseline="0" dirty="0">
                 <a:ln>
                   <a:noFill/>
                 </a:ln>
@@ -30055,7 +30133,7 @@
               </a:rPr>
             </a:br>
             <a:r>
-              <a:rPr kumimoji="0" lang="en-US" altLang="en-US" b="0" i="0" u="none" strike="noStrike" cap="none" normalizeH="0" baseline="0">
+              <a:rPr kumimoji="0" lang="en-US" altLang="en-US" b="0" i="0" u="none" strike="noStrike" cap="none" normalizeH="0" baseline="0" dirty="0">
                 <a:ln>
                   <a:noFill/>
                 </a:ln>
@@ -30068,7 +30146,7 @@
               <a:t>        </a:t>
             </a:r>
             <a:r>
-              <a:rPr kumimoji="0" lang="en-US" altLang="en-US" b="0" i="0" u="none" strike="noStrike" cap="none" normalizeH="0" baseline="0">
+              <a:rPr kumimoji="0" lang="en-US" altLang="en-US" b="0" i="0" u="none" strike="noStrike" cap="none" normalizeH="0" baseline="0" dirty="0" err="1">
                 <a:ln>
                   <a:noFill/>
                 </a:ln>
@@ -30081,7 +30159,7 @@
               <a:t>System</a:t>
             </a:r>
             <a:r>
-              <a:rPr kumimoji="0" lang="en-US" altLang="en-US" b="0" i="0" u="none" strike="noStrike" cap="none" normalizeH="0" baseline="0">
+              <a:rPr kumimoji="0" lang="en-US" altLang="en-US" b="0" i="0" u="none" strike="noStrike" cap="none" normalizeH="0" baseline="0" dirty="0" err="1">
                 <a:ln>
                   <a:noFill/>
                 </a:ln>
@@ -30094,7 +30172,7 @@
               <a:t>.</a:t>
             </a:r>
             <a:r>
-              <a:rPr kumimoji="0" lang="en-US" altLang="en-US" b="0" i="1" u="none" strike="noStrike" cap="none" normalizeH="0" baseline="0">
+              <a:rPr kumimoji="0" lang="en-US" altLang="en-US" b="0" i="1" u="none" strike="noStrike" cap="none" normalizeH="0" baseline="0" dirty="0" err="1">
                 <a:ln>
                   <a:noFill/>
                 </a:ln>
@@ -30107,20 +30185,33 @@
               <a:t>out</a:t>
             </a:r>
             <a:r>
-              <a:rPr kumimoji="0" lang="en-US" altLang="en-US" b="0" i="0" u="none" strike="noStrike" cap="none" normalizeH="0" baseline="0">
-                <a:ln>
-                  <a:noFill/>
-                </a:ln>
-                <a:solidFill>
-                  <a:srgbClr val="080808"/>
-                </a:solidFill>
-                <a:effectLst/>
-                <a:latin typeface="JetBrains Mono"/>
-              </a:rPr>
-              <a:t>.println();</a:t>
+              <a:rPr kumimoji="0" lang="en-US" altLang="en-US" b="0" i="0" u="none" strike="noStrike" cap="none" normalizeH="0" baseline="0" dirty="0" err="1">
+                <a:ln>
+                  <a:noFill/>
+                </a:ln>
+                <a:solidFill>
+                  <a:srgbClr val="080808"/>
+                </a:solidFill>
+                <a:effectLst/>
+                <a:latin typeface="JetBrains Mono"/>
+              </a:rPr>
+              <a:t>.println</a:t>
+            </a:r>
+            <a:r>
+              <a:rPr kumimoji="0" lang="en-US" altLang="en-US" b="0" i="0" u="none" strike="noStrike" cap="none" normalizeH="0" baseline="0" dirty="0">
+                <a:ln>
+                  <a:noFill/>
+                </a:ln>
+                <a:solidFill>
+                  <a:srgbClr val="080808"/>
+                </a:solidFill>
+                <a:effectLst/>
+                <a:latin typeface="JetBrains Mono"/>
+              </a:rPr>
+              <a:t>();</a:t>
             </a:r>
             <a:br>
-              <a:rPr kumimoji="0" lang="en-US" altLang="en-US" b="0" i="0" u="none" strike="noStrike" cap="none" normalizeH="0" baseline="0">
+              <a:rPr kumimoji="0" lang="en-US" altLang="en-US" b="0" i="0" u="none" strike="noStrike" cap="none" normalizeH="0" baseline="0" dirty="0">
                 <a:ln>
                   <a:noFill/>
                 </a:ln>
@@ -30132,7 +30223,7 @@
               </a:rPr>
             </a:br>
             <a:r>
-              <a:rPr kumimoji="0" lang="en-US" altLang="en-US" b="0" i="0" u="none" strike="noStrike" cap="none" normalizeH="0" baseline="0">
+              <a:rPr kumimoji="0" lang="en-US" altLang="en-US" b="0" i="0" u="none" strike="noStrike" cap="none" normalizeH="0" baseline="0" dirty="0">
                 <a:ln>
                   <a:noFill/>
                 </a:ln>
@@ -30145,7 +30236,7 @@
               <a:t>        </a:t>
             </a:r>
             <a:r>
-              <a:rPr kumimoji="0" lang="en-US" altLang="en-US" b="0" i="0" u="none" strike="noStrike" cap="none" normalizeH="0" baseline="0">
+              <a:rPr kumimoji="0" lang="en-US" altLang="en-US" b="0" i="0" u="none" strike="noStrike" cap="none" normalizeH="0" baseline="0" dirty="0" err="1">
                 <a:ln>
                   <a:noFill/>
                 </a:ln>
@@ -30158,20 +30249,33 @@
               <a:t>dp</a:t>
             </a:r>
             <a:r>
-              <a:rPr kumimoji="0" lang="en-US" altLang="en-US" b="0" i="0" u="none" strike="noStrike" cap="none" normalizeH="0" baseline="0">
-                <a:ln>
-                  <a:noFill/>
-                </a:ln>
-                <a:solidFill>
-                  <a:srgbClr val="080808"/>
-                </a:solidFill>
-                <a:effectLst/>
-                <a:latin typeface="JetBrains Mono"/>
-              </a:rPr>
-              <a:t>.datePrint(</a:t>
-            </a:r>
-            <a:r>
-              <a:rPr kumimoji="0" lang="en-US" altLang="en-US" b="0" i="0" u="none" strike="noStrike" cap="none" normalizeH="0" baseline="0">
+              <a:rPr kumimoji="0" lang="en-US" altLang="en-US" b="0" i="0" u="none" strike="noStrike" cap="none" normalizeH="0" baseline="0" dirty="0" err="1">
+                <a:ln>
+                  <a:noFill/>
+                </a:ln>
+                <a:solidFill>
+                  <a:srgbClr val="080808"/>
+                </a:solidFill>
+                <a:effectLst/>
+                <a:latin typeface="JetBrains Mono"/>
+              </a:rPr>
+              <a:t>.datePrint</a:t>
+            </a:r>
+            <a:r>
+              <a:rPr kumimoji="0" lang="en-US" altLang="en-US" b="0" i="0" u="none" strike="noStrike" cap="none" normalizeH="0" baseline="0" dirty="0">
+                <a:ln>
+                  <a:noFill/>
+                </a:ln>
+                <a:solidFill>
+                  <a:srgbClr val="080808"/>
+                </a:solidFill>
+                <a:effectLst/>
+                <a:latin typeface="JetBrains Mono"/>
+              </a:rPr>
+              <a:t>(</a:t>
+            </a:r>
+            <a:r>
+              <a:rPr kumimoji="0" lang="en-US" altLang="en-US" b="0" i="0" u="none" strike="noStrike" cap="none" normalizeH="0" baseline="0" dirty="0">
                 <a:ln>
                   <a:noFill/>
                 </a:ln>
@@ -30184,7 +30288,7 @@
               <a:t>22</a:t>
             </a:r>
             <a:r>
-              <a:rPr kumimoji="0" lang="en-US" altLang="en-US" b="0" i="0" u="none" strike="noStrike" cap="none" normalizeH="0" baseline="0">
+              <a:rPr kumimoji="0" lang="en-US" altLang="en-US" b="0" i="0" u="none" strike="noStrike" cap="none" normalizeH="0" baseline="0" dirty="0">
                 <a:ln>
                   <a:noFill/>
                 </a:ln>
@@ -30197,7 +30301,7 @@
               <a:t>,</a:t>
             </a:r>
             <a:r>
-              <a:rPr kumimoji="0" lang="en-US" altLang="en-US" b="0" i="0" u="none" strike="noStrike" cap="none" normalizeH="0" baseline="0">
+              <a:rPr kumimoji="0" lang="en-US" altLang="en-US" b="0" i="0" u="none" strike="noStrike" cap="none" normalizeH="0" baseline="0" dirty="0">
                 <a:ln>
                   <a:noFill/>
                 </a:ln>
@@ -30210,7 +30314,7 @@
               <a:t>"2"</a:t>
             </a:r>
             <a:r>
-              <a:rPr kumimoji="0" lang="en-US" altLang="en-US" b="0" i="0" u="none" strike="noStrike" cap="none" normalizeH="0" baseline="0">
+              <a:rPr kumimoji="0" lang="en-US" altLang="en-US" b="0" i="0" u="none" strike="noStrike" cap="none" normalizeH="0" baseline="0" dirty="0">
                 <a:ln>
                   <a:noFill/>
                 </a:ln>
@@ -30223,7 +30327,7 @@
               <a:t>, </a:t>
             </a:r>
             <a:r>
-              <a:rPr kumimoji="0" lang="en-US" altLang="en-US" b="0" i="0" u="none" strike="noStrike" cap="none" normalizeH="0" baseline="0">
+              <a:rPr kumimoji="0" lang="en-US" altLang="en-US" b="0" i="0" u="none" strike="noStrike" cap="none" normalizeH="0" baseline="0" dirty="0">
                 <a:ln>
                   <a:noFill/>
                 </a:ln>
@@ -30236,7 +30340,7 @@
               <a:t>2023</a:t>
             </a:r>
             <a:r>
-              <a:rPr kumimoji="0" lang="en-US" altLang="en-US" b="0" i="0" u="none" strike="noStrike" cap="none" normalizeH="0" baseline="0">
+              <a:rPr kumimoji="0" lang="en-US" altLang="en-US" b="0" i="0" u="none" strike="noStrike" cap="none" normalizeH="0" baseline="0" dirty="0">
                 <a:ln>
                   <a:noFill/>
                 </a:ln>
@@ -30249,7 +30353,7 @@
               <a:t>);</a:t>
             </a:r>
             <a:br>
-              <a:rPr kumimoji="0" lang="en-US" altLang="en-US" b="0" i="0" u="none" strike="noStrike" cap="none" normalizeH="0" baseline="0">
+              <a:rPr kumimoji="0" lang="en-US" altLang="en-US" b="0" i="0" u="none" strike="noStrike" cap="none" normalizeH="0" baseline="0" dirty="0">
                 <a:ln>
                   <a:noFill/>
                 </a:ln>
@@ -30261,7 +30365,7 @@
               </a:rPr>
             </a:br>
             <a:r>
-              <a:rPr kumimoji="0" lang="en-US" altLang="en-US" b="0" i="0" u="none" strike="noStrike" cap="none" normalizeH="0" baseline="0">
+              <a:rPr kumimoji="0" lang="en-US" altLang="en-US" b="0" i="0" u="none" strike="noStrike" cap="none" normalizeH="0" baseline="0" dirty="0">
                 <a:ln>
                   <a:noFill/>
                 </a:ln>
@@ -30274,7 +30378,7 @@
               <a:t>        </a:t>
             </a:r>
             <a:r>
-              <a:rPr kumimoji="0" lang="en-US" altLang="en-US" b="0" i="0" u="none" strike="noStrike" cap="none" normalizeH="0" baseline="0">
+              <a:rPr kumimoji="0" lang="en-US" altLang="en-US" b="0" i="0" u="none" strike="noStrike" cap="none" normalizeH="0" baseline="0" dirty="0" err="1">
                 <a:ln>
                   <a:noFill/>
                 </a:ln>
@@ -30287,7 +30391,7 @@
               <a:t>System</a:t>
             </a:r>
             <a:r>
-              <a:rPr kumimoji="0" lang="en-US" altLang="en-US" b="0" i="0" u="none" strike="noStrike" cap="none" normalizeH="0" baseline="0">
+              <a:rPr kumimoji="0" lang="en-US" altLang="en-US" b="0" i="0" u="none" strike="noStrike" cap="none" normalizeH="0" baseline="0" dirty="0" err="1">
                 <a:ln>
                   <a:noFill/>
                 </a:ln>
@@ -30300,7 +30404,7 @@
               <a:t>.</a:t>
             </a:r>
             <a:r>
-              <a:rPr kumimoji="0" lang="en-US" altLang="en-US" b="0" i="1" u="none" strike="noStrike" cap="none" normalizeH="0" baseline="0">
+              <a:rPr kumimoji="0" lang="en-US" altLang="en-US" b="0" i="1" u="none" strike="noStrike" cap="none" normalizeH="0" baseline="0" dirty="0" err="1">
                 <a:ln>
                   <a:noFill/>
                 </a:ln>
@@ -30313,20 +30417,33 @@
               <a:t>out</a:t>
             </a:r>
             <a:r>
-              <a:rPr kumimoji="0" lang="en-US" altLang="en-US" b="0" i="0" u="none" strike="noStrike" cap="none" normalizeH="0" baseline="0">
-                <a:ln>
-                  <a:noFill/>
-                </a:ln>
-                <a:solidFill>
-                  <a:srgbClr val="080808"/>
-                </a:solidFill>
-                <a:effectLst/>
-                <a:latin typeface="JetBrains Mono"/>
-              </a:rPr>
-              <a:t>.println();</a:t>
+              <a:rPr kumimoji="0" lang="en-US" altLang="en-US" b="0" i="0" u="none" strike="noStrike" cap="none" normalizeH="0" baseline="0" dirty="0" err="1">
+                <a:ln>
+                  <a:noFill/>
+                </a:ln>
+                <a:solidFill>
+                  <a:srgbClr val="080808"/>
+                </a:solidFill>
+                <a:effectLst/>
+                <a:latin typeface="JetBrains Mono"/>
+              </a:rPr>
+              <a:t>.println</a:t>
+            </a:r>
+            <a:r>
+              <a:rPr kumimoji="0" lang="en-US" altLang="en-US" b="0" i="0" u="none" strike="noStrike" cap="none" normalizeH="0" baseline="0" dirty="0">
+                <a:ln>
+                  <a:noFill/>
+                </a:ln>
+                <a:solidFill>
+                  <a:srgbClr val="080808"/>
+                </a:solidFill>
+                <a:effectLst/>
+                <a:latin typeface="JetBrains Mono"/>
+              </a:rPr>
+              <a:t>();</a:t>
             </a:r>
             <a:br>
-              <a:rPr kumimoji="0" lang="en-US" altLang="en-US" b="0" i="0" u="none" strike="noStrike" cap="none" normalizeH="0" baseline="0">
+              <a:rPr kumimoji="0" lang="en-US" altLang="en-US" b="0" i="0" u="none" strike="noStrike" cap="none" normalizeH="0" baseline="0" dirty="0">
                 <a:ln>
                   <a:noFill/>
                 </a:ln>
@@ -30338,7 +30455,7 @@
               </a:rPr>
             </a:br>
             <a:r>
-              <a:rPr kumimoji="0" lang="en-US" altLang="en-US" b="0" i="0" u="none" strike="noStrike" cap="none" normalizeH="0" baseline="0">
+              <a:rPr kumimoji="0" lang="en-US" altLang="en-US" b="0" i="0" u="none" strike="noStrike" cap="none" normalizeH="0" baseline="0" dirty="0">
                 <a:ln>
                   <a:noFill/>
                 </a:ln>
@@ -30351,7 +30468,7 @@
               <a:t>        </a:t>
             </a:r>
             <a:r>
-              <a:rPr kumimoji="0" lang="en-US" altLang="en-US" b="0" i="0" u="none" strike="noStrike" cap="none" normalizeH="0" baseline="0">
+              <a:rPr kumimoji="0" lang="en-US" altLang="en-US" b="0" i="0" u="none" strike="noStrike" cap="none" normalizeH="0" baseline="0" dirty="0" err="1">
                 <a:ln>
                   <a:noFill/>
                 </a:ln>
@@ -30364,7 +30481,7 @@
               <a:t>ArrayList</a:t>
             </a:r>
             <a:r>
-              <a:rPr kumimoji="0" lang="en-US" altLang="en-US" b="0" i="0" u="none" strike="noStrike" cap="none" normalizeH="0" baseline="0">
+              <a:rPr kumimoji="0" lang="en-US" altLang="en-US" b="0" i="0" u="none" strike="noStrike" cap="none" normalizeH="0" baseline="0" dirty="0">
                 <a:ln>
                   <a:noFill/>
                 </a:ln>
@@ -30377,7 +30494,7 @@
               <a:t>&lt;</a:t>
             </a:r>
             <a:r>
-              <a:rPr kumimoji="0" lang="en-US" altLang="en-US" b="0" i="0" u="none" strike="noStrike" cap="none" normalizeH="0" baseline="0">
+              <a:rPr kumimoji="0" lang="en-US" altLang="en-US" b="0" i="0" u="none" strike="noStrike" cap="none" normalizeH="0" baseline="0" dirty="0">
                 <a:ln>
                   <a:noFill/>
                 </a:ln>
@@ -30390,7 +30507,7 @@
               <a:t>String</a:t>
             </a:r>
             <a:r>
-              <a:rPr kumimoji="0" lang="en-US" altLang="en-US" b="0" i="0" u="none" strike="noStrike" cap="none" normalizeH="0" baseline="0">
+              <a:rPr kumimoji="0" lang="en-US" altLang="en-US" b="0" i="0" u="none" strike="noStrike" cap="none" normalizeH="0" baseline="0" dirty="0">
                 <a:ln>
                   <a:noFill/>
                 </a:ln>
@@ -30403,7 +30520,7 @@
               <a:t>&gt; </a:t>
             </a:r>
             <a:r>
-              <a:rPr kumimoji="0" lang="en-US" altLang="en-US" b="0" i="0" u="none" strike="noStrike" cap="none" normalizeH="0" baseline="0">
+              <a:rPr kumimoji="0" lang="en-US" altLang="en-US" b="0" i="0" u="none" strike="noStrike" cap="none" normalizeH="0" baseline="0" dirty="0">
                 <a:ln>
                   <a:noFill/>
                 </a:ln>
@@ -30416,7 +30533,7 @@
               <a:t>months </a:t>
             </a:r>
             <a:r>
-              <a:rPr kumimoji="0" lang="en-US" altLang="en-US" b="0" i="0" u="none" strike="noStrike" cap="none" normalizeH="0" baseline="0">
+              <a:rPr kumimoji="0" lang="en-US" altLang="en-US" b="0" i="0" u="none" strike="noStrike" cap="none" normalizeH="0" baseline="0" dirty="0">
                 <a:ln>
                   <a:noFill/>
                 </a:ln>
@@ -30429,7 +30546,7 @@
               <a:t>= </a:t>
             </a:r>
             <a:r>
-              <a:rPr kumimoji="0" lang="en-US" altLang="en-US" b="0" i="0" u="none" strike="noStrike" cap="none" normalizeH="0" baseline="0">
+              <a:rPr kumimoji="0" lang="en-US" altLang="en-US" b="0" i="0" u="none" strike="noStrike" cap="none" normalizeH="0" baseline="0" dirty="0">
                 <a:ln>
                   <a:noFill/>
                 </a:ln>
@@ -30442,20 +30559,33 @@
               <a:t>new </a:t>
             </a:r>
             <a:r>
-              <a:rPr kumimoji="0" lang="en-US" altLang="en-US" b="0" i="0" u="none" strike="noStrike" cap="none" normalizeH="0" baseline="0">
-                <a:ln>
-                  <a:noFill/>
-                </a:ln>
-                <a:solidFill>
-                  <a:srgbClr val="080808"/>
-                </a:solidFill>
-                <a:effectLst/>
-                <a:latin typeface="JetBrains Mono"/>
-              </a:rPr>
-              <a:t>ArrayList&lt;&gt;();</a:t>
+              <a:rPr kumimoji="0" lang="en-US" altLang="en-US" b="0" i="0" u="none" strike="noStrike" cap="none" normalizeH="0" baseline="0" dirty="0" err="1">
+                <a:ln>
+                  <a:noFill/>
+                </a:ln>
+                <a:solidFill>
+                  <a:srgbClr val="080808"/>
+                </a:solidFill>
+                <a:effectLst/>
+                <a:latin typeface="JetBrains Mono"/>
+              </a:rPr>
+              <a:t>ArrayList</a:t>
+            </a:r>
+            <a:r>
+              <a:rPr kumimoji="0" lang="en-US" altLang="en-US" b="0" i="0" u="none" strike="noStrike" cap="none" normalizeH="0" baseline="0" dirty="0">
+                <a:ln>
+                  <a:noFill/>
+                </a:ln>
+                <a:solidFill>
+                  <a:srgbClr val="080808"/>
+                </a:solidFill>
+                <a:effectLst/>
+                <a:latin typeface="JetBrains Mono"/>
+              </a:rPr>
+              <a:t>&lt;&gt;();</a:t>
             </a:r>
             <a:br>
-              <a:rPr kumimoji="0" lang="en-US" altLang="en-US" b="0" i="0" u="none" strike="noStrike" cap="none" normalizeH="0" baseline="0">
+              <a:rPr kumimoji="0" lang="en-US" altLang="en-US" b="0" i="0" u="none" strike="noStrike" cap="none" normalizeH="0" baseline="0" dirty="0">
                 <a:ln>
                   <a:noFill/>
                 </a:ln>
@@ -30467,7 +30597,7 @@
               </a:rPr>
             </a:br>
             <a:r>
-              <a:rPr kumimoji="0" lang="en-US" altLang="en-US" b="0" i="0" u="none" strike="noStrike" cap="none" normalizeH="0" baseline="0">
+              <a:rPr kumimoji="0" lang="en-US" altLang="en-US" b="0" i="0" u="none" strike="noStrike" cap="none" normalizeH="0" baseline="0" dirty="0">
                 <a:ln>
                   <a:noFill/>
                 </a:ln>
@@ -30480,7 +30610,7 @@
               <a:t>        </a:t>
             </a:r>
             <a:r>
-              <a:rPr kumimoji="0" lang="en-US" altLang="en-US" b="0" i="0" u="none" strike="noStrike" cap="none" normalizeH="0" baseline="0">
+              <a:rPr kumimoji="0" lang="en-US" altLang="en-US" b="0" i="0" u="none" strike="noStrike" cap="none" normalizeH="0" baseline="0" dirty="0" err="1">
                 <a:ln>
                   <a:noFill/>
                 </a:ln>
@@ -30493,20 +30623,33 @@
               <a:t>months</a:t>
             </a:r>
             <a:r>
-              <a:rPr kumimoji="0" lang="en-US" altLang="en-US" b="0" i="0" u="none" strike="noStrike" cap="none" normalizeH="0" baseline="0">
-                <a:ln>
-                  <a:noFill/>
-                </a:ln>
-                <a:solidFill>
-                  <a:srgbClr val="080808"/>
-                </a:solidFill>
-                <a:effectLst/>
-                <a:latin typeface="JetBrains Mono"/>
-              </a:rPr>
-              <a:t>.add(</a:t>
-            </a:r>
-            <a:r>
-              <a:rPr kumimoji="0" lang="en-US" altLang="en-US" b="0" i="0" u="none" strike="noStrike" cap="none" normalizeH="0" baseline="0">
+              <a:rPr kumimoji="0" lang="en-US" altLang="en-US" b="0" i="0" u="none" strike="noStrike" cap="none" normalizeH="0" baseline="0" dirty="0" err="1">
+                <a:ln>
+                  <a:noFill/>
+                </a:ln>
+                <a:solidFill>
+                  <a:srgbClr val="080808"/>
+                </a:solidFill>
+                <a:effectLst/>
+                <a:latin typeface="JetBrains Mono"/>
+              </a:rPr>
+              <a:t>.add</a:t>
+            </a:r>
+            <a:r>
+              <a:rPr kumimoji="0" lang="en-US" altLang="en-US" b="0" i="0" u="none" strike="noStrike" cap="none" normalizeH="0" baseline="0" dirty="0">
+                <a:ln>
+                  <a:noFill/>
+                </a:ln>
+                <a:solidFill>
+                  <a:srgbClr val="080808"/>
+                </a:solidFill>
+                <a:effectLst/>
+                <a:latin typeface="JetBrains Mono"/>
+              </a:rPr>
+              <a:t>(</a:t>
+            </a:r>
+            <a:r>
+              <a:rPr kumimoji="0" lang="en-US" altLang="en-US" b="0" i="0" u="none" strike="noStrike" cap="none" normalizeH="0" baseline="0" dirty="0">
                 <a:ln>
                   <a:noFill/>
                 </a:ln>
@@ -30519,7 +30662,7 @@
               <a:t>"January"</a:t>
             </a:r>
             <a:r>
-              <a:rPr kumimoji="0" lang="en-US" altLang="en-US" b="0" i="0" u="none" strike="noStrike" cap="none" normalizeH="0" baseline="0">
+              <a:rPr kumimoji="0" lang="en-US" altLang="en-US" b="0" i="0" u="none" strike="noStrike" cap="none" normalizeH="0" baseline="0" dirty="0">
                 <a:ln>
                   <a:noFill/>
                 </a:ln>
@@ -30532,7 +30675,7 @@
               <a:t>); </a:t>
             </a:r>
             <a:r>
-              <a:rPr kumimoji="0" lang="en-US" altLang="en-US" b="0" i="0" u="none" strike="noStrike" cap="none" normalizeH="0" baseline="0">
+              <a:rPr kumimoji="0" lang="en-US" altLang="en-US" b="0" i="0" u="none" strike="noStrike" cap="none" normalizeH="0" baseline="0" dirty="0" err="1">
                 <a:ln>
                   <a:noFill/>
                 </a:ln>
@@ -30545,20 +30688,33 @@
               <a:t>months</a:t>
             </a:r>
             <a:r>
-              <a:rPr kumimoji="0" lang="en-US" altLang="en-US" b="0" i="0" u="none" strike="noStrike" cap="none" normalizeH="0" baseline="0">
-                <a:ln>
-                  <a:noFill/>
-                </a:ln>
-                <a:solidFill>
-                  <a:srgbClr val="080808"/>
-                </a:solidFill>
-                <a:effectLst/>
-                <a:latin typeface="JetBrains Mono"/>
-              </a:rPr>
-              <a:t>.add(</a:t>
-            </a:r>
-            <a:r>
-              <a:rPr kumimoji="0" lang="en-US" altLang="en-US" b="0" i="0" u="none" strike="noStrike" cap="none" normalizeH="0" baseline="0">
+              <a:rPr kumimoji="0" lang="en-US" altLang="en-US" b="0" i="0" u="none" strike="noStrike" cap="none" normalizeH="0" baseline="0" dirty="0" err="1">
+                <a:ln>
+                  <a:noFill/>
+                </a:ln>
+                <a:solidFill>
+                  <a:srgbClr val="080808"/>
+                </a:solidFill>
+                <a:effectLst/>
+                <a:latin typeface="JetBrains Mono"/>
+              </a:rPr>
+              <a:t>.add</a:t>
+            </a:r>
+            <a:r>
+              <a:rPr kumimoji="0" lang="en-US" altLang="en-US" b="0" i="0" u="none" strike="noStrike" cap="none" normalizeH="0" baseline="0" dirty="0">
+                <a:ln>
+                  <a:noFill/>
+                </a:ln>
+                <a:solidFill>
+                  <a:srgbClr val="080808"/>
+                </a:solidFill>
+                <a:effectLst/>
+                <a:latin typeface="JetBrains Mono"/>
+              </a:rPr>
+              <a:t>(</a:t>
+            </a:r>
+            <a:r>
+              <a:rPr kumimoji="0" lang="en-US" altLang="en-US" b="0" i="0" u="none" strike="noStrike" cap="none" normalizeH="0" baseline="0" dirty="0">
                 <a:ln>
                   <a:noFill/>
                 </a:ln>
@@ -30571,7 +30727,7 @@
               <a:t>"February"</a:t>
             </a:r>
             <a:r>
-              <a:rPr kumimoji="0" lang="en-US" altLang="en-US" b="0" i="0" u="none" strike="noStrike" cap="none" normalizeH="0" baseline="0">
+              <a:rPr kumimoji="0" lang="en-US" altLang="en-US" b="0" i="0" u="none" strike="noStrike" cap="none" normalizeH="0" baseline="0" dirty="0">
                 <a:ln>
                   <a:noFill/>
                 </a:ln>
@@ -30584,7 +30740,7 @@
               <a:t>);</a:t>
             </a:r>
             <a:br>
-              <a:rPr kumimoji="0" lang="en-US" altLang="en-US" b="0" i="0" u="none" strike="noStrike" cap="none" normalizeH="0" baseline="0">
+              <a:rPr kumimoji="0" lang="en-US" altLang="en-US" b="0" i="0" u="none" strike="noStrike" cap="none" normalizeH="0" baseline="0" dirty="0">
                 <a:ln>
                   <a:noFill/>
                 </a:ln>
@@ -30596,7 +30752,7 @@
               </a:rPr>
             </a:br>
             <a:r>
-              <a:rPr kumimoji="0" lang="en-US" altLang="en-US" b="0" i="0" u="none" strike="noStrike" cap="none" normalizeH="0" baseline="0">
+              <a:rPr kumimoji="0" lang="en-US" altLang="en-US" b="0" i="0" u="none" strike="noStrike" cap="none" normalizeH="0" baseline="0" dirty="0">
                 <a:ln>
                   <a:noFill/>
                 </a:ln>
@@ -30609,7 +30765,7 @@
               <a:t>        </a:t>
             </a:r>
             <a:r>
-              <a:rPr kumimoji="0" lang="en-US" altLang="en-US" b="0" i="0" u="none" strike="noStrike" cap="none" normalizeH="0" baseline="0">
+              <a:rPr kumimoji="0" lang="en-US" altLang="en-US" b="0" i="0" u="none" strike="noStrike" cap="none" normalizeH="0" baseline="0" dirty="0" err="1">
                 <a:ln>
                   <a:noFill/>
                 </a:ln>
@@ -30622,20 +30778,33 @@
               <a:t>dp</a:t>
             </a:r>
             <a:r>
-              <a:rPr kumimoji="0" lang="en-US" altLang="en-US" b="0" i="0" u="none" strike="noStrike" cap="none" normalizeH="0" baseline="0">
-                <a:ln>
-                  <a:noFill/>
-                </a:ln>
-                <a:solidFill>
-                  <a:srgbClr val="080808"/>
-                </a:solidFill>
-                <a:effectLst/>
-                <a:latin typeface="JetBrains Mono"/>
-              </a:rPr>
-              <a:t>.datePrint(</a:t>
-            </a:r>
-            <a:r>
-              <a:rPr kumimoji="0" lang="en-US" altLang="en-US" b="0" i="0" u="none" strike="noStrike" cap="none" normalizeH="0" baseline="0">
+              <a:rPr kumimoji="0" lang="en-US" altLang="en-US" b="0" i="0" u="none" strike="noStrike" cap="none" normalizeH="0" baseline="0" dirty="0" err="1">
+                <a:ln>
+                  <a:noFill/>
+                </a:ln>
+                <a:solidFill>
+                  <a:srgbClr val="080808"/>
+                </a:solidFill>
+                <a:effectLst/>
+                <a:latin typeface="JetBrains Mono"/>
+              </a:rPr>
+              <a:t>.datePrint</a:t>
+            </a:r>
+            <a:r>
+              <a:rPr kumimoji="0" lang="en-US" altLang="en-US" b="0" i="0" u="none" strike="noStrike" cap="none" normalizeH="0" baseline="0" dirty="0">
+                <a:ln>
+                  <a:noFill/>
+                </a:ln>
+                <a:solidFill>
+                  <a:srgbClr val="080808"/>
+                </a:solidFill>
+                <a:effectLst/>
+                <a:latin typeface="JetBrains Mono"/>
+              </a:rPr>
+              <a:t>(</a:t>
+            </a:r>
+            <a:r>
+              <a:rPr kumimoji="0" lang="en-US" altLang="en-US" b="0" i="0" u="none" strike="noStrike" cap="none" normalizeH="0" baseline="0" dirty="0" err="1">
                 <a:ln>
                   <a:noFill/>
                 </a:ln>
@@ -30648,20 +30817,33 @@
               <a:t>months</a:t>
             </a:r>
             <a:r>
-              <a:rPr kumimoji="0" lang="en-US" altLang="en-US" b="0" i="0" u="none" strike="noStrike" cap="none" normalizeH="0" baseline="0">
-                <a:ln>
-                  <a:noFill/>
-                </a:ln>
-                <a:solidFill>
-                  <a:srgbClr val="080808"/>
-                </a:solidFill>
-                <a:effectLst/>
-                <a:latin typeface="JetBrains Mono"/>
-              </a:rPr>
-              <a:t>.indexOf(</a:t>
-            </a:r>
-            <a:r>
-              <a:rPr kumimoji="0" lang="en-US" altLang="en-US" b="0" i="0" u="none" strike="noStrike" cap="none" normalizeH="0" baseline="0">
+              <a:rPr kumimoji="0" lang="en-US" altLang="en-US" b="0" i="0" u="none" strike="noStrike" cap="none" normalizeH="0" baseline="0" dirty="0" err="1">
+                <a:ln>
+                  <a:noFill/>
+                </a:ln>
+                <a:solidFill>
+                  <a:srgbClr val="080808"/>
+                </a:solidFill>
+                <a:effectLst/>
+                <a:latin typeface="JetBrains Mono"/>
+              </a:rPr>
+              <a:t>.indexOf</a:t>
+            </a:r>
+            <a:r>
+              <a:rPr kumimoji="0" lang="en-US" altLang="en-US" b="0" i="0" u="none" strike="noStrike" cap="none" normalizeH="0" baseline="0" dirty="0">
+                <a:ln>
+                  <a:noFill/>
+                </a:ln>
+                <a:solidFill>
+                  <a:srgbClr val="080808"/>
+                </a:solidFill>
+                <a:effectLst/>
+                <a:latin typeface="JetBrains Mono"/>
+              </a:rPr>
+              <a:t>(</a:t>
+            </a:r>
+            <a:r>
+              <a:rPr kumimoji="0" lang="en-US" altLang="en-US" b="0" i="0" u="none" strike="noStrike" cap="none" normalizeH="0" baseline="0" dirty="0">
                 <a:ln>
                   <a:noFill/>
                 </a:ln>
@@ -30674,7 +30856,7 @@
               <a:t>"January"</a:t>
             </a:r>
             <a:r>
-              <a:rPr kumimoji="0" lang="en-US" altLang="en-US" b="0" i="0" u="none" strike="noStrike" cap="none" normalizeH="0" baseline="0">
+              <a:rPr kumimoji="0" lang="en-US" altLang="en-US" b="0" i="0" u="none" strike="noStrike" cap="none" normalizeH="0" baseline="0" dirty="0">
                 <a:ln>
                   <a:noFill/>
                 </a:ln>
@@ -30687,7 +30869,7 @@
               <a:t>), </a:t>
             </a:r>
             <a:r>
-              <a:rPr kumimoji="0" lang="en-US" altLang="en-US" b="0" i="0" u="none" strike="noStrike" cap="none" normalizeH="0" baseline="0">
+              <a:rPr kumimoji="0" lang="en-US" altLang="en-US" b="0" i="0" u="none" strike="noStrike" cap="none" normalizeH="0" baseline="0" dirty="0">
                 <a:ln>
                   <a:noFill/>
                 </a:ln>
@@ -30700,7 +30882,7 @@
               <a:t>2023</a:t>
             </a:r>
             <a:r>
-              <a:rPr kumimoji="0" lang="en-US" altLang="en-US" b="0" i="0" u="none" strike="noStrike" cap="none" normalizeH="0" baseline="0">
+              <a:rPr kumimoji="0" lang="en-US" altLang="en-US" b="0" i="0" u="none" strike="noStrike" cap="none" normalizeH="0" baseline="0" dirty="0">
                 <a:ln>
                   <a:noFill/>
                 </a:ln>
@@ -30713,7 +30895,7 @@
               <a:t>);</a:t>
             </a:r>
             <a:br>
-              <a:rPr kumimoji="0" lang="en-US" altLang="en-US" b="0" i="0" u="none" strike="noStrike" cap="none" normalizeH="0" baseline="0">
+              <a:rPr kumimoji="0" lang="en-US" altLang="en-US" b="0" i="0" u="none" strike="noStrike" cap="none" normalizeH="0" baseline="0" dirty="0">
                 <a:ln>
                   <a:noFill/>
                 </a:ln>
@@ -30725,7 +30907,7 @@
               </a:rPr>
             </a:br>
             <a:r>
-              <a:rPr kumimoji="0" lang="en-US" altLang="en-US" b="0" i="0" u="none" strike="noStrike" cap="none" normalizeH="0" baseline="0">
+              <a:rPr kumimoji="0" lang="en-US" altLang="en-US" b="0" i="0" u="none" strike="noStrike" cap="none" normalizeH="0" baseline="0" dirty="0">
                 <a:ln>
                   <a:noFill/>
                 </a:ln>
@@ -30738,7 +30920,7 @@
               <a:t>    }</a:t>
             </a:r>
             <a:br>
-              <a:rPr kumimoji="0" lang="en-US" altLang="en-US" b="0" i="0" u="none" strike="noStrike" cap="none" normalizeH="0" baseline="0">
+              <a:rPr kumimoji="0" lang="en-US" altLang="en-US" b="0" i="0" u="none" strike="noStrike" cap="none" normalizeH="0" baseline="0" dirty="0">
                 <a:ln>
                   <a:noFill/>
                 </a:ln>
@@ -30750,7 +30932,7 @@
               </a:rPr>
             </a:br>
             <a:r>
-              <a:rPr kumimoji="0" lang="en-US" altLang="en-US" b="0" i="0" u="none" strike="noStrike" cap="none" normalizeH="0" baseline="0">
+              <a:rPr kumimoji="0" lang="en-US" altLang="en-US" b="0" i="0" u="none" strike="noStrike" cap="none" normalizeH="0" baseline="0" dirty="0">
                 <a:ln>
                   <a:noFill/>
                 </a:ln>
@@ -30763,7 +30945,7 @@
               <a:t>}</a:t>
             </a:r>
             <a:br>
-              <a:rPr kumimoji="0" lang="en-US" altLang="en-US" b="0" i="0" u="none" strike="noStrike" cap="none" normalizeH="0" baseline="0">
+              <a:rPr kumimoji="0" lang="en-US" altLang="en-US" b="0" i="0" u="none" strike="noStrike" cap="none" normalizeH="0" baseline="0" dirty="0">
                 <a:ln>
                   <a:noFill/>
                 </a:ln>
@@ -30774,7 +30956,7 @@
                 <a:latin typeface="JetBrains Mono"/>
               </a:rPr>
             </a:br>
-            <a:endParaRPr kumimoji="0" lang="en-US" altLang="en-US" b="0" i="0" u="none" strike="noStrike" cap="none" normalizeH="0" baseline="0">
+            <a:endParaRPr kumimoji="0" lang="en-US" altLang="en-US" b="0" i="0" u="none" strike="noStrike" cap="none" normalizeH="0" baseline="0" dirty="0">
               <a:ln>
                 <a:noFill/>
               </a:ln>
@@ -36926,20 +37108,20 @@
 </file>
 
 <file path=customXml/item1.xml><?xml version="1.0" encoding="utf-8"?>
-<p:properties xmlns:p="http://schemas.microsoft.com/office/2006/metadata/properties" xmlns:xsi="http://www.w3.org/2001/XMLSchema-instance" xmlns:pc="http://schemas.microsoft.com/office/infopath/2007/PartnerControls">
-  <documentManagement>
-    <_activity xmlns="92c41bee-f0ee-4aa6-9399-a35fbb883510" xsi:nil="true"/>
-  </documentManagement>
-</p:properties>
-</file>
-
-<file path=customXml/item2.xml><?xml version="1.0" encoding="utf-8"?>
 <?mso-contentType ?>
 <FormTemplates xmlns="http://schemas.microsoft.com/sharepoint/v3/contenttype/forms">
   <Display>DocumentLibraryForm</Display>
   <Edit>DocumentLibraryForm</Edit>
   <New>DocumentLibraryForm</New>
 </FormTemplates>
+</file>
+
+<file path=customXml/item2.xml><?xml version="1.0" encoding="utf-8"?>
+<p:properties xmlns:p="http://schemas.microsoft.com/office/2006/metadata/properties" xmlns:xsi="http://www.w3.org/2001/XMLSchema-instance" xmlns:pc="http://schemas.microsoft.com/office/infopath/2007/PartnerControls">
+  <documentManagement>
+    <_activity xmlns="92c41bee-f0ee-4aa6-9399-a35fbb883510" xsi:nil="true"/>
+  </documentManagement>
+</p:properties>
 </file>
 
 <file path=customXml/item3.xml><?xml version="1.0" encoding="utf-8"?>
@@ -37178,26 +37360,26 @@
 </file>
 
 <file path=customXml/itemProps1.xml><?xml version="1.0" encoding="utf-8"?>
-<ds:datastoreItem xmlns:ds="http://schemas.openxmlformats.org/officeDocument/2006/customXml" ds:itemID="{9423A8D4-FAC8-4B50-A3C8-807432B3C479}">
+<ds:datastoreItem xmlns:ds="http://schemas.openxmlformats.org/officeDocument/2006/customXml" ds:itemID="{0C9173E0-AB42-42DD-92E5-0A7B56862C56}">
   <ds:schemaRefs>
-    <ds:schemaRef ds:uri="http://purl.org/dc/dcmitype/"/>
-    <ds:schemaRef ds:uri="http://www.w3.org/XML/1998/namespace"/>
-    <ds:schemaRef ds:uri="http://schemas.microsoft.com/office/infopath/2007/PartnerControls"/>
-    <ds:schemaRef ds:uri="http://purl.org/dc/elements/1.1/"/>
-    <ds:schemaRef ds:uri="http://schemas.microsoft.com/office/2006/metadata/properties"/>
-    <ds:schemaRef ds:uri="92c41bee-f0ee-4aa6-9399-a35fbb883510"/>
-    <ds:schemaRef ds:uri="e06ed288-fd75-4b50-bbed-f5a5df88c31c"/>
-    <ds:schemaRef ds:uri="http://schemas.microsoft.com/office/2006/documentManagement/types"/>
-    <ds:schemaRef ds:uri="http://schemas.openxmlformats.org/package/2006/metadata/core-properties"/>
-    <ds:schemaRef ds:uri="http://purl.org/dc/terms/"/>
+    <ds:schemaRef ds:uri="http://schemas.microsoft.com/sharepoint/v3/contenttype/forms"/>
   </ds:schemaRefs>
 </ds:datastoreItem>
 </file>
 
 <file path=customXml/itemProps2.xml><?xml version="1.0" encoding="utf-8"?>
-<ds:datastoreItem xmlns:ds="http://schemas.openxmlformats.org/officeDocument/2006/customXml" ds:itemID="{0C9173E0-AB42-42DD-92E5-0A7B56862C56}">
+<ds:datastoreItem xmlns:ds="http://schemas.openxmlformats.org/officeDocument/2006/customXml" ds:itemID="{9423A8D4-FAC8-4B50-A3C8-807432B3C479}">
   <ds:schemaRefs>
-    <ds:schemaRef ds:uri="http://schemas.microsoft.com/sharepoint/v3/contenttype/forms"/>
+    <ds:schemaRef ds:uri="http://www.w3.org/XML/1998/namespace"/>
+    <ds:schemaRef ds:uri="http://schemas.microsoft.com/office/2006/metadata/properties"/>
+    <ds:schemaRef ds:uri="http://schemas.microsoft.com/office/2006/documentManagement/types"/>
+    <ds:schemaRef ds:uri="http://schemas.microsoft.com/office/infopath/2007/PartnerControls"/>
+    <ds:schemaRef ds:uri="http://purl.org/dc/dcmitype/"/>
+    <ds:schemaRef ds:uri="92c41bee-f0ee-4aa6-9399-a35fbb883510"/>
+    <ds:schemaRef ds:uri="http://purl.org/dc/elements/1.1/"/>
+    <ds:schemaRef ds:uri="e06ed288-fd75-4b50-bbed-f5a5df88c31c"/>
+    <ds:schemaRef ds:uri="http://schemas.openxmlformats.org/package/2006/metadata/core-properties"/>
+    <ds:schemaRef ds:uri="http://purl.org/dc/terms/"/>
   </ds:schemaRefs>
 </ds:datastoreItem>
 </file>

</xml_diff>